<commit_message>
upload chapters 2 & 6
</commit_message>
<xml_diff>
--- a/20210422_輪読会スライド_share_Osawa.pptx
+++ b/20210422_輪読会スライド_share_Osawa.pptx
@@ -549,30 +549,6 @@
           <a:bodyPr/>
           <a:lstStyle/>
           <a:p>
-            <a:pPr marL="0" marR="0" lvl="0" indent="0" algn="l" defTabSz="914400" rtl="0" eaLnBrk="1" fontAlgn="auto" latinLnBrk="0" hangingPunct="1">
-              <a:lnSpc>
-                <a:spcPct val="100000"/>
-              </a:lnSpc>
-              <a:spcBef>
-                <a:spcPts val="0"/>
-              </a:spcBef>
-              <a:spcAft>
-                <a:spcPts val="0"/>
-              </a:spcAft>
-              <a:buClrTx/>
-              <a:buSzTx/>
-              <a:buFont typeface="Wingdings" panose="05000000000000000000" pitchFamily="2" charset="2"/>
-              <a:buNone/>
-              <a:tabLst/>
-              <a:defRPr/>
-            </a:pPr>
-            <a:endParaRPr lang="en-US" altLang="ja-JP" sz="1200" dirty="0"/>
-          </a:p>
-          <a:p>
-            <a:pPr marL="0" indent="0">
-              <a:buFont typeface="Wingdings" panose="05000000000000000000" pitchFamily="2" charset="2"/>
-              <a:buNone/>
-            </a:pPr>
             <a:endParaRPr kumimoji="1" lang="ja-JP" altLang="en-US" dirty="0"/>
           </a:p>
         </p:txBody>
@@ -594,7 +570,7 @@
           <a:p>
             <a:fld id="{25C21582-0744-41BF-AEDC-579D869D1A17}" type="slidenum">
               <a:rPr kumimoji="1" lang="ja-JP" altLang="en-US" smtClean="0"/>
-              <a:t>4</a:t>
+              <a:t>1</a:t>
             </a:fld>
             <a:endParaRPr kumimoji="1" lang="ja-JP" altLang="en-US"/>
           </a:p>
@@ -603,7 +579,7 @@
     </p:spTree>
     <p:extLst>
       <p:ext uri="{BB962C8B-B14F-4D97-AF65-F5344CB8AC3E}">
-        <p14:creationId xmlns:p14="http://schemas.microsoft.com/office/powerpoint/2010/main" val="4154328091"/>
+        <p14:creationId xmlns:p14="http://schemas.microsoft.com/office/powerpoint/2010/main" val="1703538049"/>
       </p:ext>
     </p:extLst>
   </p:cSld>
@@ -678,7 +654,7 @@
           <a:p>
             <a:fld id="{25C21582-0744-41BF-AEDC-579D869D1A17}" type="slidenum">
               <a:rPr kumimoji="1" lang="ja-JP" altLang="en-US" smtClean="0"/>
-              <a:t>5</a:t>
+              <a:t>2</a:t>
             </a:fld>
             <a:endParaRPr kumimoji="1" lang="ja-JP" altLang="en-US"/>
           </a:p>
@@ -687,7 +663,7 @@
     </p:spTree>
     <p:extLst>
       <p:ext uri="{BB962C8B-B14F-4D97-AF65-F5344CB8AC3E}">
-        <p14:creationId xmlns:p14="http://schemas.microsoft.com/office/powerpoint/2010/main" val="3230767495"/>
+        <p14:creationId xmlns:p14="http://schemas.microsoft.com/office/powerpoint/2010/main" val="1119326724"/>
       </p:ext>
     </p:extLst>
   </p:cSld>
@@ -741,7 +717,7 @@
           <a:bodyPr/>
           <a:lstStyle/>
           <a:p>
-            <a:endParaRPr kumimoji="1" lang="en-US" altLang="ja-JP" dirty="0"/>
+            <a:endParaRPr kumimoji="1" lang="ja-JP" altLang="en-US" dirty="0"/>
           </a:p>
         </p:txBody>
       </p:sp>
@@ -762,7 +738,7 @@
           <a:p>
             <a:fld id="{25C21582-0744-41BF-AEDC-579D869D1A17}" type="slidenum">
               <a:rPr kumimoji="1" lang="ja-JP" altLang="en-US" smtClean="0"/>
-              <a:t>6</a:t>
+              <a:t>3</a:t>
             </a:fld>
             <a:endParaRPr kumimoji="1" lang="ja-JP" altLang="en-US"/>
           </a:p>
@@ -771,7 +747,7 @@
     </p:spTree>
     <p:extLst>
       <p:ext uri="{BB962C8B-B14F-4D97-AF65-F5344CB8AC3E}">
-        <p14:creationId xmlns:p14="http://schemas.microsoft.com/office/powerpoint/2010/main" val="2410717991"/>
+        <p14:creationId xmlns:p14="http://schemas.microsoft.com/office/powerpoint/2010/main" val="3442602897"/>
       </p:ext>
     </p:extLst>
   </p:cSld>
@@ -825,6 +801,10 @@
           <a:bodyPr/>
           <a:lstStyle/>
           <a:p>
+            <a:pPr marL="0" indent="0">
+              <a:buFont typeface="Wingdings" panose="05000000000000000000" pitchFamily="2" charset="2"/>
+              <a:buNone/>
+            </a:pPr>
             <a:endParaRPr kumimoji="1" lang="ja-JP" altLang="en-US" dirty="0"/>
           </a:p>
         </p:txBody>
@@ -846,7 +826,7 @@
           <a:p>
             <a:fld id="{25C21582-0744-41BF-AEDC-579D869D1A17}" type="slidenum">
               <a:rPr kumimoji="1" lang="ja-JP" altLang="en-US" smtClean="0"/>
-              <a:t>7</a:t>
+              <a:t>4</a:t>
             </a:fld>
             <a:endParaRPr kumimoji="1" lang="ja-JP" altLang="en-US"/>
           </a:p>
@@ -855,7 +835,7 @@
     </p:spTree>
     <p:extLst>
       <p:ext uri="{BB962C8B-B14F-4D97-AF65-F5344CB8AC3E}">
-        <p14:creationId xmlns:p14="http://schemas.microsoft.com/office/powerpoint/2010/main" val="1739070228"/>
+        <p14:creationId xmlns:p14="http://schemas.microsoft.com/office/powerpoint/2010/main" val="4154328091"/>
       </p:ext>
     </p:extLst>
   </p:cSld>
@@ -909,12 +889,257 @@
           <a:bodyPr/>
           <a:lstStyle/>
           <a:p>
-            <a:endParaRPr kumimoji="1" lang="en-US" altLang="ja-JP" dirty="0">
-              <a:solidFill>
-                <a:srgbClr val="00B0F0"/>
-              </a:solidFill>
-            </a:endParaRPr>
-          </a:p>
+            <a:endParaRPr kumimoji="1" lang="ja-JP" altLang="en-US" dirty="0"/>
+          </a:p>
+        </p:txBody>
+      </p:sp>
+      <p:sp>
+        <p:nvSpPr>
+          <p:cNvPr id="4" name="スライド番号プレースホルダー 3"/>
+          <p:cNvSpPr>
+            <a:spLocks noGrp="1"/>
+          </p:cNvSpPr>
+          <p:nvPr>
+            <p:ph type="sldNum" sz="quarter" idx="5"/>
+          </p:nvPr>
+        </p:nvSpPr>
+        <p:spPr/>
+        <p:txBody>
+          <a:bodyPr/>
+          <a:lstStyle/>
+          <a:p>
+            <a:fld id="{25C21582-0744-41BF-AEDC-579D869D1A17}" type="slidenum">
+              <a:rPr kumimoji="1" lang="ja-JP" altLang="en-US" smtClean="0"/>
+              <a:t>5</a:t>
+            </a:fld>
+            <a:endParaRPr kumimoji="1" lang="ja-JP" altLang="en-US"/>
+          </a:p>
+        </p:txBody>
+      </p:sp>
+    </p:spTree>
+    <p:extLst>
+      <p:ext uri="{BB962C8B-B14F-4D97-AF65-F5344CB8AC3E}">
+        <p14:creationId xmlns:p14="http://schemas.microsoft.com/office/powerpoint/2010/main" val="3230767495"/>
+      </p:ext>
+    </p:extLst>
+  </p:cSld>
+  <p:clrMapOvr>
+    <a:masterClrMapping/>
+  </p:clrMapOvr>
+</p:notes>
+</file>
+
+<file path=ppt/notesSlides/notesSlide6.xml><?xml version="1.0" encoding="utf-8"?>
+<p:notes xmlns:a="http://schemas.openxmlformats.org/drawingml/2006/main" xmlns:r="http://schemas.openxmlformats.org/officeDocument/2006/relationships" xmlns:p="http://schemas.openxmlformats.org/presentationml/2006/main">
+  <p:cSld>
+    <p:spTree>
+      <p:nvGrpSpPr>
+        <p:cNvPr id="1" name=""/>
+        <p:cNvGrpSpPr/>
+        <p:nvPr/>
+      </p:nvGrpSpPr>
+      <p:grpSpPr>
+        <a:xfrm>
+          <a:off x="0" y="0"/>
+          <a:ext cx="0" cy="0"/>
+          <a:chOff x="0" y="0"/>
+          <a:chExt cx="0" cy="0"/>
+        </a:xfrm>
+      </p:grpSpPr>
+      <p:sp>
+        <p:nvSpPr>
+          <p:cNvPr id="2" name="スライド イメージ プレースホルダー 1"/>
+          <p:cNvSpPr>
+            <a:spLocks noGrp="1" noRot="1" noChangeAspect="1"/>
+          </p:cNvSpPr>
+          <p:nvPr>
+            <p:ph type="sldImg"/>
+          </p:nvPr>
+        </p:nvSpPr>
+        <p:spPr/>
+      </p:sp>
+      <p:sp>
+        <p:nvSpPr>
+          <p:cNvPr id="3" name="ノート プレースホルダー 2"/>
+          <p:cNvSpPr>
+            <a:spLocks noGrp="1"/>
+          </p:cNvSpPr>
+          <p:nvPr>
+            <p:ph type="body" idx="1"/>
+          </p:nvPr>
+        </p:nvSpPr>
+        <p:spPr/>
+        <p:txBody>
+          <a:bodyPr/>
+          <a:lstStyle/>
+          <a:p>
+            <a:endParaRPr kumimoji="1" lang="en-US" altLang="ja-JP" dirty="0"/>
+          </a:p>
+        </p:txBody>
+      </p:sp>
+      <p:sp>
+        <p:nvSpPr>
+          <p:cNvPr id="4" name="スライド番号プレースホルダー 3"/>
+          <p:cNvSpPr>
+            <a:spLocks noGrp="1"/>
+          </p:cNvSpPr>
+          <p:nvPr>
+            <p:ph type="sldNum" sz="quarter" idx="5"/>
+          </p:nvPr>
+        </p:nvSpPr>
+        <p:spPr/>
+        <p:txBody>
+          <a:bodyPr/>
+          <a:lstStyle/>
+          <a:p>
+            <a:fld id="{25C21582-0744-41BF-AEDC-579D869D1A17}" type="slidenum">
+              <a:rPr kumimoji="1" lang="ja-JP" altLang="en-US" smtClean="0"/>
+              <a:t>6</a:t>
+            </a:fld>
+            <a:endParaRPr kumimoji="1" lang="ja-JP" altLang="en-US"/>
+          </a:p>
+        </p:txBody>
+      </p:sp>
+    </p:spTree>
+    <p:extLst>
+      <p:ext uri="{BB962C8B-B14F-4D97-AF65-F5344CB8AC3E}">
+        <p14:creationId xmlns:p14="http://schemas.microsoft.com/office/powerpoint/2010/main" val="2410717991"/>
+      </p:ext>
+    </p:extLst>
+  </p:cSld>
+  <p:clrMapOvr>
+    <a:masterClrMapping/>
+  </p:clrMapOvr>
+</p:notes>
+</file>
+
+<file path=ppt/notesSlides/notesSlide7.xml><?xml version="1.0" encoding="utf-8"?>
+<p:notes xmlns:a="http://schemas.openxmlformats.org/drawingml/2006/main" xmlns:r="http://schemas.openxmlformats.org/officeDocument/2006/relationships" xmlns:p="http://schemas.openxmlformats.org/presentationml/2006/main">
+  <p:cSld>
+    <p:spTree>
+      <p:nvGrpSpPr>
+        <p:cNvPr id="1" name=""/>
+        <p:cNvGrpSpPr/>
+        <p:nvPr/>
+      </p:nvGrpSpPr>
+      <p:grpSpPr>
+        <a:xfrm>
+          <a:off x="0" y="0"/>
+          <a:ext cx="0" cy="0"/>
+          <a:chOff x="0" y="0"/>
+          <a:chExt cx="0" cy="0"/>
+        </a:xfrm>
+      </p:grpSpPr>
+      <p:sp>
+        <p:nvSpPr>
+          <p:cNvPr id="2" name="スライド イメージ プレースホルダー 1"/>
+          <p:cNvSpPr>
+            <a:spLocks noGrp="1" noRot="1" noChangeAspect="1"/>
+          </p:cNvSpPr>
+          <p:nvPr>
+            <p:ph type="sldImg"/>
+          </p:nvPr>
+        </p:nvSpPr>
+        <p:spPr/>
+      </p:sp>
+      <p:sp>
+        <p:nvSpPr>
+          <p:cNvPr id="3" name="ノート プレースホルダー 2"/>
+          <p:cNvSpPr>
+            <a:spLocks noGrp="1"/>
+          </p:cNvSpPr>
+          <p:nvPr>
+            <p:ph type="body" idx="1"/>
+          </p:nvPr>
+        </p:nvSpPr>
+        <p:spPr/>
+        <p:txBody>
+          <a:bodyPr/>
+          <a:lstStyle/>
+          <a:p>
+            <a:endParaRPr kumimoji="1" lang="ja-JP" altLang="en-US" dirty="0"/>
+          </a:p>
+        </p:txBody>
+      </p:sp>
+      <p:sp>
+        <p:nvSpPr>
+          <p:cNvPr id="4" name="スライド番号プレースホルダー 3"/>
+          <p:cNvSpPr>
+            <a:spLocks noGrp="1"/>
+          </p:cNvSpPr>
+          <p:nvPr>
+            <p:ph type="sldNum" sz="quarter" idx="5"/>
+          </p:nvPr>
+        </p:nvSpPr>
+        <p:spPr/>
+        <p:txBody>
+          <a:bodyPr/>
+          <a:lstStyle/>
+          <a:p>
+            <a:fld id="{25C21582-0744-41BF-AEDC-579D869D1A17}" type="slidenum">
+              <a:rPr kumimoji="1" lang="ja-JP" altLang="en-US" smtClean="0"/>
+              <a:t>7</a:t>
+            </a:fld>
+            <a:endParaRPr kumimoji="1" lang="ja-JP" altLang="en-US"/>
+          </a:p>
+        </p:txBody>
+      </p:sp>
+    </p:spTree>
+    <p:extLst>
+      <p:ext uri="{BB962C8B-B14F-4D97-AF65-F5344CB8AC3E}">
+        <p14:creationId xmlns:p14="http://schemas.microsoft.com/office/powerpoint/2010/main" val="1739070228"/>
+      </p:ext>
+    </p:extLst>
+  </p:cSld>
+  <p:clrMapOvr>
+    <a:masterClrMapping/>
+  </p:clrMapOvr>
+</p:notes>
+</file>
+
+<file path=ppt/notesSlides/notesSlide8.xml><?xml version="1.0" encoding="utf-8"?>
+<p:notes xmlns:a="http://schemas.openxmlformats.org/drawingml/2006/main" xmlns:r="http://schemas.openxmlformats.org/officeDocument/2006/relationships" xmlns:p="http://schemas.openxmlformats.org/presentationml/2006/main">
+  <p:cSld>
+    <p:spTree>
+      <p:nvGrpSpPr>
+        <p:cNvPr id="1" name=""/>
+        <p:cNvGrpSpPr/>
+        <p:nvPr/>
+      </p:nvGrpSpPr>
+      <p:grpSpPr>
+        <a:xfrm>
+          <a:off x="0" y="0"/>
+          <a:ext cx="0" cy="0"/>
+          <a:chOff x="0" y="0"/>
+          <a:chExt cx="0" cy="0"/>
+        </a:xfrm>
+      </p:grpSpPr>
+      <p:sp>
+        <p:nvSpPr>
+          <p:cNvPr id="2" name="スライド イメージ プレースホルダー 1"/>
+          <p:cNvSpPr>
+            <a:spLocks noGrp="1" noRot="1" noChangeAspect="1"/>
+          </p:cNvSpPr>
+          <p:nvPr>
+            <p:ph type="sldImg"/>
+          </p:nvPr>
+        </p:nvSpPr>
+        <p:spPr/>
+      </p:sp>
+      <p:sp>
+        <p:nvSpPr>
+          <p:cNvPr id="3" name="ノート プレースホルダー 2"/>
+          <p:cNvSpPr>
+            <a:spLocks noGrp="1"/>
+          </p:cNvSpPr>
+          <p:nvPr>
+            <p:ph type="body" idx="1"/>
+          </p:nvPr>
+        </p:nvSpPr>
+        <p:spPr/>
+        <p:txBody>
+          <a:bodyPr/>
+          <a:lstStyle/>
           <a:p>
             <a:endParaRPr kumimoji="1" lang="ja-JP" altLang="en-US" dirty="0"/>
           </a:p>
@@ -6108,7 +6333,7 @@
                                           </p:stCondLst>
                                         </p:cTn>
                                         <p:tgtEl>
-                                          <p:spTgt spid="23"/>
+                                          <p:spTgt spid="119"/>
                                         </p:tgtEl>
                                         <p:attrNameLst>
                                           <p:attrName>style.visibility</p:attrName>
@@ -6135,7 +6360,52 @@
                                           </p:stCondLst>
                                         </p:cTn>
                                         <p:tgtEl>
-                                          <p:spTgt spid="24"/>
+                                          <p:spTgt spid="64"/>
+                                        </p:tgtEl>
+                                        <p:attrNameLst>
+                                          <p:attrName>style.visibility</p:attrName>
+                                        </p:attrNameLst>
+                                      </p:cBhvr>
+                                      <p:to>
+                                        <p:strVal val="visible"/>
+                                      </p:to>
+                                    </p:set>
+                                  </p:childTnLst>
+                                </p:cTn>
+                              </p:par>
+                            </p:childTnLst>
+                          </p:cTn>
+                        </p:par>
+                      </p:childTnLst>
+                    </p:cTn>
+                  </p:par>
+                  <p:par>
+                    <p:cTn id="9" fill="hold">
+                      <p:stCondLst>
+                        <p:cond delay="indefinite"/>
+                      </p:stCondLst>
+                      <p:childTnLst>
+                        <p:par>
+                          <p:cTn id="10" fill="hold">
+                            <p:stCondLst>
+                              <p:cond delay="0"/>
+                            </p:stCondLst>
+                            <p:childTnLst>
+                              <p:par>
+                                <p:cTn id="11" presetID="1" presetClass="entr" presetSubtype="0" fill="hold" grpId="0" nodeType="clickEffect">
+                                  <p:stCondLst>
+                                    <p:cond delay="0"/>
+                                  </p:stCondLst>
+                                  <p:childTnLst>
+                                    <p:set>
+                                      <p:cBhvr>
+                                        <p:cTn id="12" dur="1" fill="hold">
+                                          <p:stCondLst>
+                                            <p:cond delay="0"/>
+                                          </p:stCondLst>
+                                        </p:cTn>
+                                        <p:tgtEl>
+                                          <p:spTgt spid="23"/>
                                         </p:tgtEl>
                                         <p:attrNameLst>
                                           <p:attrName>style.visibility</p:attrName>
@@ -6149,47 +6419,20 @@
                                 </p:cTn>
                               </p:par>
                               <p:par>
-                                <p:cTn id="9" presetID="1" presetClass="entr" presetSubtype="0" fill="hold" grpId="0" nodeType="withEffect">
+                                <p:cTn id="13" presetID="1" presetClass="entr" presetSubtype="0" fill="hold" grpId="0" nodeType="withEffect">
                                   <p:stCondLst>
                                     <p:cond delay="0"/>
                                   </p:stCondLst>
                                   <p:childTnLst>
                                     <p:set>
                                       <p:cBhvr>
-                                        <p:cTn id="10" dur="1" fill="hold">
+                                        <p:cTn id="14" dur="1" fill="hold">
                                           <p:stCondLst>
                                             <p:cond delay="0"/>
                                           </p:stCondLst>
                                         </p:cTn>
                                         <p:tgtEl>
-                                          <p:spTgt spid="119"/>
-                                        </p:tgtEl>
-                                        <p:attrNameLst>
-                                          <p:attrName>style.visibility</p:attrName>
-                                        </p:attrNameLst>
-                                      </p:cBhvr>
-                                      <p:to>
-                                        <p:strVal val="visible"/>
-                                      </p:to>
-                                    </p:set>
-                                  </p:childTnLst>
-                                </p:cTn>
-                              </p:par>
-                              <p:par>
-                                <p:cTn id="11" presetID="1" presetClass="entr" presetSubtype="0" fill="hold" grpId="0" nodeType="withEffect">
-                                  <p:stCondLst>
-                                    <p:cond delay="0"/>
-                                  </p:stCondLst>
-                                  <p:childTnLst>
-                                    <p:set>
-                                      <p:cBhvr>
-                                        <p:cTn id="12" dur="1" fill="hold">
-                                          <p:stCondLst>
-                                            <p:cond delay="0"/>
-                                          </p:stCondLst>
-                                        </p:cTn>
-                                        <p:tgtEl>
-                                          <p:spTgt spid="64"/>
+                                          <p:spTgt spid="24"/>
                                         </p:tgtEl>
                                         <p:attrNameLst>
                                           <p:attrName>style.visibility</p:attrName>
@@ -6429,7 +6672,7 @@
                     <a:srgbClr val="FF0000"/>
                   </a:solidFill>
                 </a:rPr>
-                <a:t>異なる適応性</a:t>
+                <a:t>異なる可塑性</a:t>
               </a:r>
             </a:p>
           </p:txBody>
@@ -8810,8 +9053,8 @@
         </p:nvSpPr>
         <p:spPr>
           <a:xfrm>
-            <a:off x="369743" y="1267411"/>
-            <a:ext cx="8235254" cy="935198"/>
+            <a:off x="513208" y="1253705"/>
+            <a:ext cx="8080921" cy="935198"/>
           </a:xfrm>
           <a:ln w="25400">
             <a:solidFill>
@@ -8827,7 +9070,7 @@
           </a:bodyPr>
           <a:lstStyle/>
           <a:p>
-            <a:pPr>
+            <a:pPr algn="ctr">
               <a:spcBef>
                 <a:spcPts val="1200"/>
               </a:spcBef>
@@ -8838,15 +9081,7 @@
             </a:r>
             <a:r>
               <a:rPr lang="ja-JP" altLang="en-US" sz="2400" dirty="0"/>
-              <a:t>新たな環境に対して</a:t>
-            </a:r>
-            <a:r>
-              <a:rPr kumimoji="1" lang="ja-JP" altLang="en-US" sz="2400" dirty="0"/>
-              <a:t>発展</a:t>
-            </a:r>
-            <a:r>
-              <a:rPr lang="ja-JP" altLang="en-US" sz="2400" dirty="0"/>
-              <a:t>し、適応するのか</a:t>
+              <a:t>新たな環境に適応するのか</a:t>
             </a:r>
             <a:r>
               <a:rPr kumimoji="1" lang="ja-JP" altLang="en-US" sz="2400" dirty="0"/>
@@ -9075,12 +9310,1847 @@
           </a:p>
         </p:txBody>
       </p:sp>
+      <p:sp>
+        <p:nvSpPr>
+          <p:cNvPr id="14" name="コンテンツ プレースホルダー 2">
+            <a:extLst>
+              <a:ext uri="{FF2B5EF4-FFF2-40B4-BE49-F238E27FC236}">
+                <a16:creationId xmlns:a16="http://schemas.microsoft.com/office/drawing/2014/main" id="{5B4413EC-5953-4A7F-A2A3-445588703EBD}"/>
+              </a:ext>
+            </a:extLst>
+          </p:cNvPr>
+          <p:cNvSpPr txBox="1">
+            <a:spLocks/>
+          </p:cNvSpPr>
+          <p:nvPr/>
+        </p:nvSpPr>
+        <p:spPr>
+          <a:xfrm>
+            <a:off x="436248" y="4057955"/>
+            <a:ext cx="7687682" cy="542922"/>
+          </a:xfrm>
+          <a:prstGeom prst="rect">
+            <a:avLst/>
+          </a:prstGeom>
+        </p:spPr>
+        <p:txBody>
+          <a:bodyPr vert="horz" lIns="91440" tIns="45720" rIns="91440" bIns="45720" rtlCol="0">
+            <a:normAutofit/>
+          </a:bodyPr>
+          <a:lstStyle>
+            <a:lvl1pPr marL="228600" indent="-228600" algn="l" defTabSz="914400" rtl="0" eaLnBrk="1" latinLnBrk="0" hangingPunct="1">
+              <a:lnSpc>
+                <a:spcPct val="90000"/>
+              </a:lnSpc>
+              <a:spcBef>
+                <a:spcPts val="1000"/>
+              </a:spcBef>
+              <a:buFont typeface="Arial" panose="020B0604020202020204" pitchFamily="34" charset="0"/>
+              <a:buChar char="•"/>
+              <a:defRPr kumimoji="1" sz="2800" kern="1200">
+                <a:solidFill>
+                  <a:schemeClr val="tx1"/>
+                </a:solidFill>
+                <a:latin typeface="+mn-lt"/>
+                <a:ea typeface="+mn-ea"/>
+                <a:cs typeface="+mn-cs"/>
+              </a:defRPr>
+            </a:lvl1pPr>
+            <a:lvl2pPr marL="685800" indent="-228600" algn="l" defTabSz="914400" rtl="0" eaLnBrk="1" latinLnBrk="0" hangingPunct="1">
+              <a:lnSpc>
+                <a:spcPct val="90000"/>
+              </a:lnSpc>
+              <a:spcBef>
+                <a:spcPts val="500"/>
+              </a:spcBef>
+              <a:buFont typeface="Arial" panose="020B0604020202020204" pitchFamily="34" charset="0"/>
+              <a:buChar char="•"/>
+              <a:defRPr kumimoji="1" sz="2400" kern="1200">
+                <a:solidFill>
+                  <a:schemeClr val="tx1"/>
+                </a:solidFill>
+                <a:latin typeface="+mn-lt"/>
+                <a:ea typeface="+mn-ea"/>
+                <a:cs typeface="+mn-cs"/>
+              </a:defRPr>
+            </a:lvl2pPr>
+            <a:lvl3pPr marL="1143000" indent="-228600" algn="l" defTabSz="914400" rtl="0" eaLnBrk="1" latinLnBrk="0" hangingPunct="1">
+              <a:lnSpc>
+                <a:spcPct val="90000"/>
+              </a:lnSpc>
+              <a:spcBef>
+                <a:spcPts val="500"/>
+              </a:spcBef>
+              <a:buFont typeface="Arial" panose="020B0604020202020204" pitchFamily="34" charset="0"/>
+              <a:buChar char="•"/>
+              <a:defRPr kumimoji="1" sz="2000" kern="1200">
+                <a:solidFill>
+                  <a:schemeClr val="tx1"/>
+                </a:solidFill>
+                <a:latin typeface="+mn-lt"/>
+                <a:ea typeface="+mn-ea"/>
+                <a:cs typeface="+mn-cs"/>
+              </a:defRPr>
+            </a:lvl3pPr>
+            <a:lvl4pPr marL="1600200" indent="-228600" algn="l" defTabSz="914400" rtl="0" eaLnBrk="1" latinLnBrk="0" hangingPunct="1">
+              <a:lnSpc>
+                <a:spcPct val="90000"/>
+              </a:lnSpc>
+              <a:spcBef>
+                <a:spcPts val="500"/>
+              </a:spcBef>
+              <a:buFont typeface="Arial" panose="020B0604020202020204" pitchFamily="34" charset="0"/>
+              <a:buChar char="•"/>
+              <a:defRPr kumimoji="1" sz="1800" kern="1200">
+                <a:solidFill>
+                  <a:schemeClr val="tx1"/>
+                </a:solidFill>
+                <a:latin typeface="+mn-lt"/>
+                <a:ea typeface="+mn-ea"/>
+                <a:cs typeface="+mn-cs"/>
+              </a:defRPr>
+            </a:lvl4pPr>
+            <a:lvl5pPr marL="2057400" indent="-228600" algn="l" defTabSz="914400" rtl="0" eaLnBrk="1" latinLnBrk="0" hangingPunct="1">
+              <a:lnSpc>
+                <a:spcPct val="90000"/>
+              </a:lnSpc>
+              <a:spcBef>
+                <a:spcPts val="500"/>
+              </a:spcBef>
+              <a:buFont typeface="Arial" panose="020B0604020202020204" pitchFamily="34" charset="0"/>
+              <a:buChar char="•"/>
+              <a:defRPr kumimoji="1" sz="1800" kern="1200">
+                <a:solidFill>
+                  <a:schemeClr val="tx1"/>
+                </a:solidFill>
+                <a:latin typeface="+mn-lt"/>
+                <a:ea typeface="+mn-ea"/>
+                <a:cs typeface="+mn-cs"/>
+              </a:defRPr>
+            </a:lvl5pPr>
+            <a:lvl6pPr marL="2514600" indent="-228600" algn="l" defTabSz="914400" rtl="0" eaLnBrk="1" latinLnBrk="0" hangingPunct="1">
+              <a:lnSpc>
+                <a:spcPct val="90000"/>
+              </a:lnSpc>
+              <a:spcBef>
+                <a:spcPts val="500"/>
+              </a:spcBef>
+              <a:buFont typeface="Arial" panose="020B0604020202020204" pitchFamily="34" charset="0"/>
+              <a:buChar char="•"/>
+              <a:defRPr kumimoji="1" sz="1800" kern="1200">
+                <a:solidFill>
+                  <a:schemeClr val="tx1"/>
+                </a:solidFill>
+                <a:latin typeface="+mn-lt"/>
+                <a:ea typeface="+mn-ea"/>
+                <a:cs typeface="+mn-cs"/>
+              </a:defRPr>
+            </a:lvl6pPr>
+            <a:lvl7pPr marL="2971800" indent="-228600" algn="l" defTabSz="914400" rtl="0" eaLnBrk="1" latinLnBrk="0" hangingPunct="1">
+              <a:lnSpc>
+                <a:spcPct val="90000"/>
+              </a:lnSpc>
+              <a:spcBef>
+                <a:spcPts val="500"/>
+              </a:spcBef>
+              <a:buFont typeface="Arial" panose="020B0604020202020204" pitchFamily="34" charset="0"/>
+              <a:buChar char="•"/>
+              <a:defRPr kumimoji="1" sz="1800" kern="1200">
+                <a:solidFill>
+                  <a:schemeClr val="tx1"/>
+                </a:solidFill>
+                <a:latin typeface="+mn-lt"/>
+                <a:ea typeface="+mn-ea"/>
+                <a:cs typeface="+mn-cs"/>
+              </a:defRPr>
+            </a:lvl7pPr>
+            <a:lvl8pPr marL="3429000" indent="-228600" algn="l" defTabSz="914400" rtl="0" eaLnBrk="1" latinLnBrk="0" hangingPunct="1">
+              <a:lnSpc>
+                <a:spcPct val="90000"/>
+              </a:lnSpc>
+              <a:spcBef>
+                <a:spcPts val="500"/>
+              </a:spcBef>
+              <a:buFont typeface="Arial" panose="020B0604020202020204" pitchFamily="34" charset="0"/>
+              <a:buChar char="•"/>
+              <a:defRPr kumimoji="1" sz="1800" kern="1200">
+                <a:solidFill>
+                  <a:schemeClr val="tx1"/>
+                </a:solidFill>
+                <a:latin typeface="+mn-lt"/>
+                <a:ea typeface="+mn-ea"/>
+                <a:cs typeface="+mn-cs"/>
+              </a:defRPr>
+            </a:lvl8pPr>
+            <a:lvl9pPr marL="3886200" indent="-228600" algn="l" defTabSz="914400" rtl="0" eaLnBrk="1" latinLnBrk="0" hangingPunct="1">
+              <a:lnSpc>
+                <a:spcPct val="90000"/>
+              </a:lnSpc>
+              <a:spcBef>
+                <a:spcPts val="500"/>
+              </a:spcBef>
+              <a:buFont typeface="Arial" panose="020B0604020202020204" pitchFamily="34" charset="0"/>
+              <a:buChar char="•"/>
+              <a:defRPr kumimoji="1" sz="1800" kern="1200">
+                <a:solidFill>
+                  <a:schemeClr val="tx1"/>
+                </a:solidFill>
+                <a:latin typeface="+mn-lt"/>
+                <a:ea typeface="+mn-ea"/>
+                <a:cs typeface="+mn-cs"/>
+              </a:defRPr>
+            </a:lvl9pPr>
+          </a:lstStyle>
+          <a:p>
+            <a:pPr marL="457200" indent="-457200">
+              <a:buFont typeface="+mj-lt"/>
+              <a:buAutoNum type="arabicPeriod"/>
+            </a:pPr>
+            <a:r>
+              <a:rPr lang="ja-JP" altLang="en-US" sz="2200" b="1" dirty="0">
+                <a:solidFill>
+                  <a:srgbClr val="0070C0"/>
+                </a:solidFill>
+              </a:rPr>
+              <a:t>反応規格の </a:t>
+            </a:r>
+            <a:r>
+              <a:rPr lang="en-US" altLang="ja-JP" sz="2200" b="1" dirty="0">
+                <a:solidFill>
+                  <a:srgbClr val="0070C0"/>
+                </a:solidFill>
+              </a:rPr>
+              <a:t>“</a:t>
+            </a:r>
+            <a:r>
+              <a:rPr lang="ja-JP" altLang="en-US" sz="2200" b="1" dirty="0">
+                <a:solidFill>
+                  <a:srgbClr val="0070C0"/>
+                </a:solidFill>
+              </a:rPr>
+              <a:t>強化</a:t>
+            </a:r>
+            <a:r>
+              <a:rPr lang="en-US" altLang="ja-JP" sz="2200" b="1" dirty="0">
+                <a:solidFill>
+                  <a:srgbClr val="0070C0"/>
+                </a:solidFill>
+              </a:rPr>
+              <a:t>”</a:t>
+            </a:r>
+            <a:r>
+              <a:rPr lang="ja-JP" altLang="en-US" sz="2200" b="1" dirty="0">
+                <a:solidFill>
+                  <a:srgbClr val="0070C0"/>
+                </a:solidFill>
+              </a:rPr>
+              <a:t>・</a:t>
+            </a:r>
+            <a:r>
+              <a:rPr lang="en-US" altLang="ja-JP" sz="2200" b="1" dirty="0">
+                <a:solidFill>
+                  <a:srgbClr val="0070C0"/>
+                </a:solidFill>
+              </a:rPr>
+              <a:t> ”</a:t>
+            </a:r>
+            <a:r>
+              <a:rPr lang="ja-JP" altLang="en-US" sz="2200" b="1" dirty="0">
+                <a:solidFill>
+                  <a:srgbClr val="0070C0"/>
+                </a:solidFill>
+              </a:rPr>
+              <a:t>拡張</a:t>
+            </a:r>
+            <a:r>
+              <a:rPr lang="en-US" altLang="ja-JP" sz="2200" b="1" dirty="0">
+                <a:solidFill>
+                  <a:srgbClr val="0070C0"/>
+                </a:solidFill>
+              </a:rPr>
+              <a:t>”</a:t>
+            </a:r>
+            <a:r>
+              <a:rPr lang="ja-JP" altLang="en-US" sz="2200" b="1" dirty="0">
+                <a:solidFill>
+                  <a:srgbClr val="0070C0"/>
+                </a:solidFill>
+              </a:rPr>
+              <a:t>　</a:t>
+            </a:r>
+            <a:r>
+              <a:rPr lang="en-US" altLang="ja-JP" sz="2000" dirty="0">
+                <a:solidFill>
+                  <a:srgbClr val="0070C0"/>
+                </a:solidFill>
+              </a:rPr>
+              <a:t>(</a:t>
+            </a:r>
+            <a:r>
+              <a:rPr lang="ja-JP" altLang="en-US" sz="2000" dirty="0">
+                <a:solidFill>
+                  <a:srgbClr val="0070C0"/>
+                </a:solidFill>
+              </a:rPr>
+              <a:t>例</a:t>
+            </a:r>
+            <a:r>
+              <a:rPr lang="en-US" altLang="ja-JP" sz="2000" dirty="0">
+                <a:solidFill>
+                  <a:srgbClr val="0070C0"/>
+                </a:solidFill>
+              </a:rPr>
+              <a:t>)</a:t>
+            </a:r>
+            <a:r>
+              <a:rPr lang="ja-JP" altLang="en-US" sz="2000" dirty="0">
+                <a:solidFill>
+                  <a:srgbClr val="0070C0"/>
+                </a:solidFill>
+              </a:rPr>
+              <a:t> 気温に対する反応</a:t>
+            </a:r>
+            <a:endParaRPr lang="en-US" altLang="ja-JP" sz="2400" dirty="0">
+              <a:solidFill>
+                <a:srgbClr val="0070C0"/>
+              </a:solidFill>
+            </a:endParaRPr>
+          </a:p>
+          <a:p>
+            <a:pPr marL="457200" indent="-457200">
+              <a:buFont typeface="+mj-lt"/>
+              <a:buAutoNum type="arabicPeriod"/>
+            </a:pPr>
+            <a:endParaRPr lang="en-US" altLang="ja-JP" sz="2200" b="1" dirty="0">
+              <a:solidFill>
+                <a:srgbClr val="0070C0"/>
+              </a:solidFill>
+            </a:endParaRPr>
+          </a:p>
+        </p:txBody>
+      </p:sp>
+      <p:sp>
+        <p:nvSpPr>
+          <p:cNvPr id="15" name="コンテンツ プレースホルダー 2">
+            <a:extLst>
+              <a:ext uri="{FF2B5EF4-FFF2-40B4-BE49-F238E27FC236}">
+                <a16:creationId xmlns:a16="http://schemas.microsoft.com/office/drawing/2014/main" id="{7A63DED9-D411-48D9-869C-10DA45EDE468}"/>
+              </a:ext>
+            </a:extLst>
+          </p:cNvPr>
+          <p:cNvSpPr txBox="1">
+            <a:spLocks/>
+          </p:cNvSpPr>
+          <p:nvPr/>
+        </p:nvSpPr>
+        <p:spPr>
+          <a:xfrm>
+            <a:off x="953757" y="4447371"/>
+            <a:ext cx="7170173" cy="542922"/>
+          </a:xfrm>
+          <a:prstGeom prst="rect">
+            <a:avLst/>
+          </a:prstGeom>
+        </p:spPr>
+        <p:txBody>
+          <a:bodyPr vert="horz" lIns="91440" tIns="45720" rIns="91440" bIns="45720" rtlCol="0">
+            <a:normAutofit fontScale="92500"/>
+          </a:bodyPr>
+          <a:lstStyle>
+            <a:lvl1pPr marL="228600" indent="-228600" algn="l" defTabSz="914400" rtl="0" eaLnBrk="1" latinLnBrk="0" hangingPunct="1">
+              <a:lnSpc>
+                <a:spcPct val="90000"/>
+              </a:lnSpc>
+              <a:spcBef>
+                <a:spcPts val="1000"/>
+              </a:spcBef>
+              <a:buFont typeface="Arial" panose="020B0604020202020204" pitchFamily="34" charset="0"/>
+              <a:buChar char="•"/>
+              <a:defRPr kumimoji="1" sz="2800" kern="1200">
+                <a:solidFill>
+                  <a:schemeClr val="tx1"/>
+                </a:solidFill>
+                <a:latin typeface="+mn-lt"/>
+                <a:ea typeface="+mn-ea"/>
+                <a:cs typeface="+mn-cs"/>
+              </a:defRPr>
+            </a:lvl1pPr>
+            <a:lvl2pPr marL="685800" indent="-228600" algn="l" defTabSz="914400" rtl="0" eaLnBrk="1" latinLnBrk="0" hangingPunct="1">
+              <a:lnSpc>
+                <a:spcPct val="90000"/>
+              </a:lnSpc>
+              <a:spcBef>
+                <a:spcPts val="500"/>
+              </a:spcBef>
+              <a:buFont typeface="Arial" panose="020B0604020202020204" pitchFamily="34" charset="0"/>
+              <a:buChar char="•"/>
+              <a:defRPr kumimoji="1" sz="2400" kern="1200">
+                <a:solidFill>
+                  <a:schemeClr val="tx1"/>
+                </a:solidFill>
+                <a:latin typeface="+mn-lt"/>
+                <a:ea typeface="+mn-ea"/>
+                <a:cs typeface="+mn-cs"/>
+              </a:defRPr>
+            </a:lvl2pPr>
+            <a:lvl3pPr marL="1143000" indent="-228600" algn="l" defTabSz="914400" rtl="0" eaLnBrk="1" latinLnBrk="0" hangingPunct="1">
+              <a:lnSpc>
+                <a:spcPct val="90000"/>
+              </a:lnSpc>
+              <a:spcBef>
+                <a:spcPts val="500"/>
+              </a:spcBef>
+              <a:buFont typeface="Arial" panose="020B0604020202020204" pitchFamily="34" charset="0"/>
+              <a:buChar char="•"/>
+              <a:defRPr kumimoji="1" sz="2000" kern="1200">
+                <a:solidFill>
+                  <a:schemeClr val="tx1"/>
+                </a:solidFill>
+                <a:latin typeface="+mn-lt"/>
+                <a:ea typeface="+mn-ea"/>
+                <a:cs typeface="+mn-cs"/>
+              </a:defRPr>
+            </a:lvl3pPr>
+            <a:lvl4pPr marL="1600200" indent="-228600" algn="l" defTabSz="914400" rtl="0" eaLnBrk="1" latinLnBrk="0" hangingPunct="1">
+              <a:lnSpc>
+                <a:spcPct val="90000"/>
+              </a:lnSpc>
+              <a:spcBef>
+                <a:spcPts val="500"/>
+              </a:spcBef>
+              <a:buFont typeface="Arial" panose="020B0604020202020204" pitchFamily="34" charset="0"/>
+              <a:buChar char="•"/>
+              <a:defRPr kumimoji="1" sz="1800" kern="1200">
+                <a:solidFill>
+                  <a:schemeClr val="tx1"/>
+                </a:solidFill>
+                <a:latin typeface="+mn-lt"/>
+                <a:ea typeface="+mn-ea"/>
+                <a:cs typeface="+mn-cs"/>
+              </a:defRPr>
+            </a:lvl4pPr>
+            <a:lvl5pPr marL="2057400" indent="-228600" algn="l" defTabSz="914400" rtl="0" eaLnBrk="1" latinLnBrk="0" hangingPunct="1">
+              <a:lnSpc>
+                <a:spcPct val="90000"/>
+              </a:lnSpc>
+              <a:spcBef>
+                <a:spcPts val="500"/>
+              </a:spcBef>
+              <a:buFont typeface="Arial" panose="020B0604020202020204" pitchFamily="34" charset="0"/>
+              <a:buChar char="•"/>
+              <a:defRPr kumimoji="1" sz="1800" kern="1200">
+                <a:solidFill>
+                  <a:schemeClr val="tx1"/>
+                </a:solidFill>
+                <a:latin typeface="+mn-lt"/>
+                <a:ea typeface="+mn-ea"/>
+                <a:cs typeface="+mn-cs"/>
+              </a:defRPr>
+            </a:lvl5pPr>
+            <a:lvl6pPr marL="2514600" indent="-228600" algn="l" defTabSz="914400" rtl="0" eaLnBrk="1" latinLnBrk="0" hangingPunct="1">
+              <a:lnSpc>
+                <a:spcPct val="90000"/>
+              </a:lnSpc>
+              <a:spcBef>
+                <a:spcPts val="500"/>
+              </a:spcBef>
+              <a:buFont typeface="Arial" panose="020B0604020202020204" pitchFamily="34" charset="0"/>
+              <a:buChar char="•"/>
+              <a:defRPr kumimoji="1" sz="1800" kern="1200">
+                <a:solidFill>
+                  <a:schemeClr val="tx1"/>
+                </a:solidFill>
+                <a:latin typeface="+mn-lt"/>
+                <a:ea typeface="+mn-ea"/>
+                <a:cs typeface="+mn-cs"/>
+              </a:defRPr>
+            </a:lvl6pPr>
+            <a:lvl7pPr marL="2971800" indent="-228600" algn="l" defTabSz="914400" rtl="0" eaLnBrk="1" latinLnBrk="0" hangingPunct="1">
+              <a:lnSpc>
+                <a:spcPct val="90000"/>
+              </a:lnSpc>
+              <a:spcBef>
+                <a:spcPts val="500"/>
+              </a:spcBef>
+              <a:buFont typeface="Arial" panose="020B0604020202020204" pitchFamily="34" charset="0"/>
+              <a:buChar char="•"/>
+              <a:defRPr kumimoji="1" sz="1800" kern="1200">
+                <a:solidFill>
+                  <a:schemeClr val="tx1"/>
+                </a:solidFill>
+                <a:latin typeface="+mn-lt"/>
+                <a:ea typeface="+mn-ea"/>
+                <a:cs typeface="+mn-cs"/>
+              </a:defRPr>
+            </a:lvl7pPr>
+            <a:lvl8pPr marL="3429000" indent="-228600" algn="l" defTabSz="914400" rtl="0" eaLnBrk="1" latinLnBrk="0" hangingPunct="1">
+              <a:lnSpc>
+                <a:spcPct val="90000"/>
+              </a:lnSpc>
+              <a:spcBef>
+                <a:spcPts val="500"/>
+              </a:spcBef>
+              <a:buFont typeface="Arial" panose="020B0604020202020204" pitchFamily="34" charset="0"/>
+              <a:buChar char="•"/>
+              <a:defRPr kumimoji="1" sz="1800" kern="1200">
+                <a:solidFill>
+                  <a:schemeClr val="tx1"/>
+                </a:solidFill>
+                <a:latin typeface="+mn-lt"/>
+                <a:ea typeface="+mn-ea"/>
+                <a:cs typeface="+mn-cs"/>
+              </a:defRPr>
+            </a:lvl8pPr>
+            <a:lvl9pPr marL="3886200" indent="-228600" algn="l" defTabSz="914400" rtl="0" eaLnBrk="1" latinLnBrk="0" hangingPunct="1">
+              <a:lnSpc>
+                <a:spcPct val="90000"/>
+              </a:lnSpc>
+              <a:spcBef>
+                <a:spcPts val="500"/>
+              </a:spcBef>
+              <a:buFont typeface="Arial" panose="020B0604020202020204" pitchFamily="34" charset="0"/>
+              <a:buChar char="•"/>
+              <a:defRPr kumimoji="1" sz="1800" kern="1200">
+                <a:solidFill>
+                  <a:schemeClr val="tx1"/>
+                </a:solidFill>
+                <a:latin typeface="+mn-lt"/>
+                <a:ea typeface="+mn-ea"/>
+                <a:cs typeface="+mn-cs"/>
+              </a:defRPr>
+            </a:lvl9pPr>
+          </a:lstStyle>
+          <a:p>
+            <a:pPr marL="0" indent="0">
+              <a:buNone/>
+            </a:pPr>
+            <a:r>
+              <a:rPr lang="ja-JP" altLang="en-US" sz="2000" dirty="0"/>
+              <a:t>→ 反応規格の </a:t>
+            </a:r>
+            <a:r>
+              <a:rPr lang="en-US" altLang="ja-JP" sz="2000" dirty="0"/>
+              <a:t>“</a:t>
+            </a:r>
+            <a:r>
+              <a:rPr lang="ja-JP" altLang="en-US" sz="2000" dirty="0"/>
+              <a:t>余白</a:t>
+            </a:r>
+            <a:r>
+              <a:rPr lang="en-US" altLang="ja-JP" sz="2000" dirty="0"/>
+              <a:t>” : </a:t>
+            </a:r>
+            <a:r>
+              <a:rPr lang="ja-JP" altLang="en-US" sz="2000" dirty="0"/>
+              <a:t>進化の過程で生じてきた環境変動に起因？</a:t>
+            </a:r>
+            <a:endParaRPr lang="en-US" altLang="ja-JP" sz="2000" dirty="0"/>
+          </a:p>
+        </p:txBody>
+      </p:sp>
+      <p:sp>
+        <p:nvSpPr>
+          <p:cNvPr id="18" name="コンテンツ プレースホルダー 2">
+            <a:extLst>
+              <a:ext uri="{FF2B5EF4-FFF2-40B4-BE49-F238E27FC236}">
+                <a16:creationId xmlns:a16="http://schemas.microsoft.com/office/drawing/2014/main" id="{23D5E859-D93D-440E-8E28-3D2EE5C46754}"/>
+              </a:ext>
+            </a:extLst>
+          </p:cNvPr>
+          <p:cNvSpPr txBox="1">
+            <a:spLocks/>
+          </p:cNvSpPr>
+          <p:nvPr/>
+        </p:nvSpPr>
+        <p:spPr>
+          <a:xfrm>
+            <a:off x="455979" y="4850385"/>
+            <a:ext cx="7687682" cy="542922"/>
+          </a:xfrm>
+          <a:prstGeom prst="rect">
+            <a:avLst/>
+          </a:prstGeom>
+        </p:spPr>
+        <p:txBody>
+          <a:bodyPr vert="horz" lIns="91440" tIns="45720" rIns="91440" bIns="45720" rtlCol="0">
+            <a:normAutofit/>
+          </a:bodyPr>
+          <a:lstStyle>
+            <a:lvl1pPr marL="228600" indent="-228600" algn="l" defTabSz="914400" rtl="0" eaLnBrk="1" latinLnBrk="0" hangingPunct="1">
+              <a:lnSpc>
+                <a:spcPct val="90000"/>
+              </a:lnSpc>
+              <a:spcBef>
+                <a:spcPts val="1000"/>
+              </a:spcBef>
+              <a:buFont typeface="Arial" panose="020B0604020202020204" pitchFamily="34" charset="0"/>
+              <a:buChar char="•"/>
+              <a:defRPr kumimoji="1" sz="2800" kern="1200">
+                <a:solidFill>
+                  <a:schemeClr val="tx1"/>
+                </a:solidFill>
+                <a:latin typeface="+mn-lt"/>
+                <a:ea typeface="+mn-ea"/>
+                <a:cs typeface="+mn-cs"/>
+              </a:defRPr>
+            </a:lvl1pPr>
+            <a:lvl2pPr marL="685800" indent="-228600" algn="l" defTabSz="914400" rtl="0" eaLnBrk="1" latinLnBrk="0" hangingPunct="1">
+              <a:lnSpc>
+                <a:spcPct val="90000"/>
+              </a:lnSpc>
+              <a:spcBef>
+                <a:spcPts val="500"/>
+              </a:spcBef>
+              <a:buFont typeface="Arial" panose="020B0604020202020204" pitchFamily="34" charset="0"/>
+              <a:buChar char="•"/>
+              <a:defRPr kumimoji="1" sz="2400" kern="1200">
+                <a:solidFill>
+                  <a:schemeClr val="tx1"/>
+                </a:solidFill>
+                <a:latin typeface="+mn-lt"/>
+                <a:ea typeface="+mn-ea"/>
+                <a:cs typeface="+mn-cs"/>
+              </a:defRPr>
+            </a:lvl2pPr>
+            <a:lvl3pPr marL="1143000" indent="-228600" algn="l" defTabSz="914400" rtl="0" eaLnBrk="1" latinLnBrk="0" hangingPunct="1">
+              <a:lnSpc>
+                <a:spcPct val="90000"/>
+              </a:lnSpc>
+              <a:spcBef>
+                <a:spcPts val="500"/>
+              </a:spcBef>
+              <a:buFont typeface="Arial" panose="020B0604020202020204" pitchFamily="34" charset="0"/>
+              <a:buChar char="•"/>
+              <a:defRPr kumimoji="1" sz="2000" kern="1200">
+                <a:solidFill>
+                  <a:schemeClr val="tx1"/>
+                </a:solidFill>
+                <a:latin typeface="+mn-lt"/>
+                <a:ea typeface="+mn-ea"/>
+                <a:cs typeface="+mn-cs"/>
+              </a:defRPr>
+            </a:lvl3pPr>
+            <a:lvl4pPr marL="1600200" indent="-228600" algn="l" defTabSz="914400" rtl="0" eaLnBrk="1" latinLnBrk="0" hangingPunct="1">
+              <a:lnSpc>
+                <a:spcPct val="90000"/>
+              </a:lnSpc>
+              <a:spcBef>
+                <a:spcPts val="500"/>
+              </a:spcBef>
+              <a:buFont typeface="Arial" panose="020B0604020202020204" pitchFamily="34" charset="0"/>
+              <a:buChar char="•"/>
+              <a:defRPr kumimoji="1" sz="1800" kern="1200">
+                <a:solidFill>
+                  <a:schemeClr val="tx1"/>
+                </a:solidFill>
+                <a:latin typeface="+mn-lt"/>
+                <a:ea typeface="+mn-ea"/>
+                <a:cs typeface="+mn-cs"/>
+              </a:defRPr>
+            </a:lvl4pPr>
+            <a:lvl5pPr marL="2057400" indent="-228600" algn="l" defTabSz="914400" rtl="0" eaLnBrk="1" latinLnBrk="0" hangingPunct="1">
+              <a:lnSpc>
+                <a:spcPct val="90000"/>
+              </a:lnSpc>
+              <a:spcBef>
+                <a:spcPts val="500"/>
+              </a:spcBef>
+              <a:buFont typeface="Arial" panose="020B0604020202020204" pitchFamily="34" charset="0"/>
+              <a:buChar char="•"/>
+              <a:defRPr kumimoji="1" sz="1800" kern="1200">
+                <a:solidFill>
+                  <a:schemeClr val="tx1"/>
+                </a:solidFill>
+                <a:latin typeface="+mn-lt"/>
+                <a:ea typeface="+mn-ea"/>
+                <a:cs typeface="+mn-cs"/>
+              </a:defRPr>
+            </a:lvl5pPr>
+            <a:lvl6pPr marL="2514600" indent="-228600" algn="l" defTabSz="914400" rtl="0" eaLnBrk="1" latinLnBrk="0" hangingPunct="1">
+              <a:lnSpc>
+                <a:spcPct val="90000"/>
+              </a:lnSpc>
+              <a:spcBef>
+                <a:spcPts val="500"/>
+              </a:spcBef>
+              <a:buFont typeface="Arial" panose="020B0604020202020204" pitchFamily="34" charset="0"/>
+              <a:buChar char="•"/>
+              <a:defRPr kumimoji="1" sz="1800" kern="1200">
+                <a:solidFill>
+                  <a:schemeClr val="tx1"/>
+                </a:solidFill>
+                <a:latin typeface="+mn-lt"/>
+                <a:ea typeface="+mn-ea"/>
+                <a:cs typeface="+mn-cs"/>
+              </a:defRPr>
+            </a:lvl6pPr>
+            <a:lvl7pPr marL="2971800" indent="-228600" algn="l" defTabSz="914400" rtl="0" eaLnBrk="1" latinLnBrk="0" hangingPunct="1">
+              <a:lnSpc>
+                <a:spcPct val="90000"/>
+              </a:lnSpc>
+              <a:spcBef>
+                <a:spcPts val="500"/>
+              </a:spcBef>
+              <a:buFont typeface="Arial" panose="020B0604020202020204" pitchFamily="34" charset="0"/>
+              <a:buChar char="•"/>
+              <a:defRPr kumimoji="1" sz="1800" kern="1200">
+                <a:solidFill>
+                  <a:schemeClr val="tx1"/>
+                </a:solidFill>
+                <a:latin typeface="+mn-lt"/>
+                <a:ea typeface="+mn-ea"/>
+                <a:cs typeface="+mn-cs"/>
+              </a:defRPr>
+            </a:lvl7pPr>
+            <a:lvl8pPr marL="3429000" indent="-228600" algn="l" defTabSz="914400" rtl="0" eaLnBrk="1" latinLnBrk="0" hangingPunct="1">
+              <a:lnSpc>
+                <a:spcPct val="90000"/>
+              </a:lnSpc>
+              <a:spcBef>
+                <a:spcPts val="500"/>
+              </a:spcBef>
+              <a:buFont typeface="Arial" panose="020B0604020202020204" pitchFamily="34" charset="0"/>
+              <a:buChar char="•"/>
+              <a:defRPr kumimoji="1" sz="1800" kern="1200">
+                <a:solidFill>
+                  <a:schemeClr val="tx1"/>
+                </a:solidFill>
+                <a:latin typeface="+mn-lt"/>
+                <a:ea typeface="+mn-ea"/>
+                <a:cs typeface="+mn-cs"/>
+              </a:defRPr>
+            </a:lvl8pPr>
+            <a:lvl9pPr marL="3886200" indent="-228600" algn="l" defTabSz="914400" rtl="0" eaLnBrk="1" latinLnBrk="0" hangingPunct="1">
+              <a:lnSpc>
+                <a:spcPct val="90000"/>
+              </a:lnSpc>
+              <a:spcBef>
+                <a:spcPts val="500"/>
+              </a:spcBef>
+              <a:buFont typeface="Arial" panose="020B0604020202020204" pitchFamily="34" charset="0"/>
+              <a:buChar char="•"/>
+              <a:defRPr kumimoji="1" sz="1800" kern="1200">
+                <a:solidFill>
+                  <a:schemeClr val="tx1"/>
+                </a:solidFill>
+                <a:latin typeface="+mn-lt"/>
+                <a:ea typeface="+mn-ea"/>
+                <a:cs typeface="+mn-cs"/>
+              </a:defRPr>
+            </a:lvl9pPr>
+          </a:lstStyle>
+          <a:p>
+            <a:pPr marL="457200" indent="-457200">
+              <a:buFont typeface="+mj-lt"/>
+              <a:buAutoNum type="arabicPeriod" startAt="2"/>
+            </a:pPr>
+            <a:r>
+              <a:rPr lang="en-US" altLang="ja-JP" sz="2200" b="1" dirty="0">
+                <a:solidFill>
+                  <a:srgbClr val="0070C0"/>
+                </a:solidFill>
+              </a:rPr>
+              <a:t>“</a:t>
+            </a:r>
+            <a:r>
+              <a:rPr lang="ja-JP" altLang="en-US" sz="2200" b="1" dirty="0">
+                <a:solidFill>
+                  <a:srgbClr val="0070C0"/>
+                </a:solidFill>
+              </a:rPr>
+              <a:t>多目的</a:t>
+            </a:r>
+            <a:r>
+              <a:rPr lang="en-US" altLang="ja-JP" sz="2200" b="1" dirty="0">
+                <a:solidFill>
+                  <a:srgbClr val="0070C0"/>
+                </a:solidFill>
+              </a:rPr>
+              <a:t>” </a:t>
+            </a:r>
+            <a:r>
+              <a:rPr lang="ja-JP" altLang="en-US" sz="2200" b="1" dirty="0">
+                <a:solidFill>
+                  <a:srgbClr val="0070C0"/>
+                </a:solidFill>
+              </a:rPr>
+              <a:t>な形質　</a:t>
+            </a:r>
+            <a:r>
+              <a:rPr lang="en-US" altLang="ja-JP" sz="2000" dirty="0">
+                <a:solidFill>
+                  <a:srgbClr val="0070C0"/>
+                </a:solidFill>
+              </a:rPr>
+              <a:t>(</a:t>
+            </a:r>
+            <a:r>
+              <a:rPr lang="ja-JP" altLang="en-US" sz="2000" dirty="0">
+                <a:solidFill>
+                  <a:srgbClr val="0070C0"/>
+                </a:solidFill>
+              </a:rPr>
+              <a:t>例</a:t>
+            </a:r>
+            <a:r>
+              <a:rPr lang="en-US" altLang="ja-JP" sz="2000" dirty="0">
+                <a:solidFill>
+                  <a:srgbClr val="0070C0"/>
+                </a:solidFill>
+              </a:rPr>
+              <a:t>)</a:t>
+            </a:r>
+            <a:r>
+              <a:rPr lang="ja-JP" altLang="en-US" sz="2000" dirty="0">
+                <a:solidFill>
+                  <a:srgbClr val="0070C0"/>
+                </a:solidFill>
+              </a:rPr>
+              <a:t> 毒物に対する交差耐性</a:t>
+            </a:r>
+            <a:endParaRPr lang="en-US" altLang="ja-JP" sz="2400" dirty="0">
+              <a:solidFill>
+                <a:srgbClr val="0070C0"/>
+              </a:solidFill>
+            </a:endParaRPr>
+          </a:p>
+          <a:p>
+            <a:pPr marL="457200" indent="-457200">
+              <a:buFont typeface="+mj-lt"/>
+              <a:buAutoNum type="arabicPeriod" startAt="2"/>
+            </a:pPr>
+            <a:endParaRPr lang="en-US" altLang="ja-JP" sz="2200" b="1" dirty="0">
+              <a:solidFill>
+                <a:srgbClr val="0070C0"/>
+              </a:solidFill>
+            </a:endParaRPr>
+          </a:p>
+        </p:txBody>
+      </p:sp>
+      <p:sp>
+        <p:nvSpPr>
+          <p:cNvPr id="19" name="正方形/長方形 18">
+            <a:extLst>
+              <a:ext uri="{FF2B5EF4-FFF2-40B4-BE49-F238E27FC236}">
+                <a16:creationId xmlns:a16="http://schemas.microsoft.com/office/drawing/2014/main" id="{63478F3D-8869-4C2E-A8CF-88620DDE6D68}"/>
+              </a:ext>
+            </a:extLst>
+          </p:cNvPr>
+          <p:cNvSpPr/>
+          <p:nvPr/>
+        </p:nvSpPr>
+        <p:spPr>
+          <a:xfrm>
+            <a:off x="6586845" y="7540"/>
+            <a:ext cx="1648410" cy="573197"/>
+          </a:xfrm>
+          <a:prstGeom prst="rect">
+            <a:avLst/>
+          </a:prstGeom>
+          <a:noFill/>
+          <a:ln w="53975">
+            <a:solidFill>
+              <a:srgbClr val="FF0000"/>
+            </a:solidFill>
+          </a:ln>
+        </p:spPr>
+        <p:style>
+          <a:lnRef idx="2">
+            <a:schemeClr val="accent1">
+              <a:shade val="50000"/>
+            </a:schemeClr>
+          </a:lnRef>
+          <a:fillRef idx="1">
+            <a:schemeClr val="accent1"/>
+          </a:fillRef>
+          <a:effectRef idx="0">
+            <a:schemeClr val="accent1"/>
+          </a:effectRef>
+          <a:fontRef idx="minor">
+            <a:schemeClr val="lt1"/>
+          </a:fontRef>
+        </p:style>
+        <p:txBody>
+          <a:bodyPr rtlCol="0" anchor="ctr"/>
+          <a:lstStyle/>
+          <a:p>
+            <a:pPr algn="ctr"/>
+            <a:endParaRPr kumimoji="1" lang="ja-JP" altLang="en-US"/>
+          </a:p>
+        </p:txBody>
+      </p:sp>
+      <p:sp>
+        <p:nvSpPr>
+          <p:cNvPr id="21" name="矢印: 上カーブ 20">
+            <a:extLst>
+              <a:ext uri="{FF2B5EF4-FFF2-40B4-BE49-F238E27FC236}">
+                <a16:creationId xmlns:a16="http://schemas.microsoft.com/office/drawing/2014/main" id="{9374FE68-62FB-42D6-B0A5-5048E79746DC}"/>
+              </a:ext>
+            </a:extLst>
+          </p:cNvPr>
+          <p:cNvSpPr/>
+          <p:nvPr/>
+        </p:nvSpPr>
+        <p:spPr>
+          <a:xfrm rot="16200000">
+            <a:off x="6472836" y="2083799"/>
+            <a:ext cx="4381152" cy="762033"/>
+          </a:xfrm>
+          <a:prstGeom prst="curvedUpArrow">
+            <a:avLst>
+              <a:gd name="adj1" fmla="val 13338"/>
+              <a:gd name="adj2" fmla="val 50000"/>
+              <a:gd name="adj3" fmla="val 25000"/>
+            </a:avLst>
+          </a:prstGeom>
+          <a:solidFill>
+            <a:srgbClr val="FF0000"/>
+          </a:solidFill>
+          <a:ln>
+            <a:solidFill>
+              <a:srgbClr val="C00000"/>
+            </a:solidFill>
+          </a:ln>
+        </p:spPr>
+        <p:style>
+          <a:lnRef idx="2">
+            <a:schemeClr val="accent1">
+              <a:shade val="50000"/>
+            </a:schemeClr>
+          </a:lnRef>
+          <a:fillRef idx="1">
+            <a:schemeClr val="accent1"/>
+          </a:fillRef>
+          <a:effectRef idx="0">
+            <a:schemeClr val="accent1"/>
+          </a:effectRef>
+          <a:fontRef idx="minor">
+            <a:schemeClr val="lt1"/>
+          </a:fontRef>
+        </p:style>
+        <p:txBody>
+          <a:bodyPr rtlCol="0" anchor="ctr"/>
+          <a:lstStyle/>
+          <a:p>
+            <a:pPr algn="ctr"/>
+            <a:endParaRPr kumimoji="1" lang="ja-JP" altLang="en-US">
+              <a:solidFill>
+                <a:schemeClr val="tx1"/>
+              </a:solidFill>
+            </a:endParaRPr>
+          </a:p>
+        </p:txBody>
+      </p:sp>
+      <p:sp>
+        <p:nvSpPr>
+          <p:cNvPr id="22" name="コンテンツ プレースホルダー 2">
+            <a:extLst>
+              <a:ext uri="{FF2B5EF4-FFF2-40B4-BE49-F238E27FC236}">
+                <a16:creationId xmlns:a16="http://schemas.microsoft.com/office/drawing/2014/main" id="{915B2620-B105-4CA6-9567-2343CDE94500}"/>
+              </a:ext>
+            </a:extLst>
+          </p:cNvPr>
+          <p:cNvSpPr txBox="1">
+            <a:spLocks/>
+          </p:cNvSpPr>
+          <p:nvPr/>
+        </p:nvSpPr>
+        <p:spPr>
+          <a:xfrm>
+            <a:off x="7922983" y="3934092"/>
+            <a:ext cx="843887" cy="2212023"/>
+          </a:xfrm>
+          <a:prstGeom prst="rect">
+            <a:avLst/>
+          </a:prstGeom>
+        </p:spPr>
+        <p:txBody>
+          <a:bodyPr vert="horz" lIns="91440" tIns="45720" rIns="91440" bIns="45720" rtlCol="0">
+            <a:noAutofit/>
+          </a:bodyPr>
+          <a:lstStyle>
+            <a:lvl1pPr marL="228600" indent="-228600" algn="l" defTabSz="914400" rtl="0" eaLnBrk="1" latinLnBrk="0" hangingPunct="1">
+              <a:lnSpc>
+                <a:spcPct val="90000"/>
+              </a:lnSpc>
+              <a:spcBef>
+                <a:spcPts val="1000"/>
+              </a:spcBef>
+              <a:buFont typeface="Arial" panose="020B0604020202020204" pitchFamily="34" charset="0"/>
+              <a:buChar char="•"/>
+              <a:defRPr kumimoji="1" sz="2800" kern="1200">
+                <a:solidFill>
+                  <a:schemeClr val="tx1"/>
+                </a:solidFill>
+                <a:latin typeface="+mn-lt"/>
+                <a:ea typeface="+mn-ea"/>
+                <a:cs typeface="+mn-cs"/>
+              </a:defRPr>
+            </a:lvl1pPr>
+            <a:lvl2pPr marL="685800" indent="-228600" algn="l" defTabSz="914400" rtl="0" eaLnBrk="1" latinLnBrk="0" hangingPunct="1">
+              <a:lnSpc>
+                <a:spcPct val="90000"/>
+              </a:lnSpc>
+              <a:spcBef>
+                <a:spcPts val="500"/>
+              </a:spcBef>
+              <a:buFont typeface="Arial" panose="020B0604020202020204" pitchFamily="34" charset="0"/>
+              <a:buChar char="•"/>
+              <a:defRPr kumimoji="1" sz="2400" kern="1200">
+                <a:solidFill>
+                  <a:schemeClr val="tx1"/>
+                </a:solidFill>
+                <a:latin typeface="+mn-lt"/>
+                <a:ea typeface="+mn-ea"/>
+                <a:cs typeface="+mn-cs"/>
+              </a:defRPr>
+            </a:lvl2pPr>
+            <a:lvl3pPr marL="1143000" indent="-228600" algn="l" defTabSz="914400" rtl="0" eaLnBrk="1" latinLnBrk="0" hangingPunct="1">
+              <a:lnSpc>
+                <a:spcPct val="90000"/>
+              </a:lnSpc>
+              <a:spcBef>
+                <a:spcPts val="500"/>
+              </a:spcBef>
+              <a:buFont typeface="Arial" panose="020B0604020202020204" pitchFamily="34" charset="0"/>
+              <a:buChar char="•"/>
+              <a:defRPr kumimoji="1" sz="2000" kern="1200">
+                <a:solidFill>
+                  <a:schemeClr val="tx1"/>
+                </a:solidFill>
+                <a:latin typeface="+mn-lt"/>
+                <a:ea typeface="+mn-ea"/>
+                <a:cs typeface="+mn-cs"/>
+              </a:defRPr>
+            </a:lvl3pPr>
+            <a:lvl4pPr marL="1600200" indent="-228600" algn="l" defTabSz="914400" rtl="0" eaLnBrk="1" latinLnBrk="0" hangingPunct="1">
+              <a:lnSpc>
+                <a:spcPct val="90000"/>
+              </a:lnSpc>
+              <a:spcBef>
+                <a:spcPts val="500"/>
+              </a:spcBef>
+              <a:buFont typeface="Arial" panose="020B0604020202020204" pitchFamily="34" charset="0"/>
+              <a:buChar char="•"/>
+              <a:defRPr kumimoji="1" sz="1800" kern="1200">
+                <a:solidFill>
+                  <a:schemeClr val="tx1"/>
+                </a:solidFill>
+                <a:latin typeface="+mn-lt"/>
+                <a:ea typeface="+mn-ea"/>
+                <a:cs typeface="+mn-cs"/>
+              </a:defRPr>
+            </a:lvl4pPr>
+            <a:lvl5pPr marL="2057400" indent="-228600" algn="l" defTabSz="914400" rtl="0" eaLnBrk="1" latinLnBrk="0" hangingPunct="1">
+              <a:lnSpc>
+                <a:spcPct val="90000"/>
+              </a:lnSpc>
+              <a:spcBef>
+                <a:spcPts val="500"/>
+              </a:spcBef>
+              <a:buFont typeface="Arial" panose="020B0604020202020204" pitchFamily="34" charset="0"/>
+              <a:buChar char="•"/>
+              <a:defRPr kumimoji="1" sz="1800" kern="1200">
+                <a:solidFill>
+                  <a:schemeClr val="tx1"/>
+                </a:solidFill>
+                <a:latin typeface="+mn-lt"/>
+                <a:ea typeface="+mn-ea"/>
+                <a:cs typeface="+mn-cs"/>
+              </a:defRPr>
+            </a:lvl5pPr>
+            <a:lvl6pPr marL="2514600" indent="-228600" algn="l" defTabSz="914400" rtl="0" eaLnBrk="1" latinLnBrk="0" hangingPunct="1">
+              <a:lnSpc>
+                <a:spcPct val="90000"/>
+              </a:lnSpc>
+              <a:spcBef>
+                <a:spcPts val="500"/>
+              </a:spcBef>
+              <a:buFont typeface="Arial" panose="020B0604020202020204" pitchFamily="34" charset="0"/>
+              <a:buChar char="•"/>
+              <a:defRPr kumimoji="1" sz="1800" kern="1200">
+                <a:solidFill>
+                  <a:schemeClr val="tx1"/>
+                </a:solidFill>
+                <a:latin typeface="+mn-lt"/>
+                <a:ea typeface="+mn-ea"/>
+                <a:cs typeface="+mn-cs"/>
+              </a:defRPr>
+            </a:lvl6pPr>
+            <a:lvl7pPr marL="2971800" indent="-228600" algn="l" defTabSz="914400" rtl="0" eaLnBrk="1" latinLnBrk="0" hangingPunct="1">
+              <a:lnSpc>
+                <a:spcPct val="90000"/>
+              </a:lnSpc>
+              <a:spcBef>
+                <a:spcPts val="500"/>
+              </a:spcBef>
+              <a:buFont typeface="Arial" panose="020B0604020202020204" pitchFamily="34" charset="0"/>
+              <a:buChar char="•"/>
+              <a:defRPr kumimoji="1" sz="1800" kern="1200">
+                <a:solidFill>
+                  <a:schemeClr val="tx1"/>
+                </a:solidFill>
+                <a:latin typeface="+mn-lt"/>
+                <a:ea typeface="+mn-ea"/>
+                <a:cs typeface="+mn-cs"/>
+              </a:defRPr>
+            </a:lvl7pPr>
+            <a:lvl8pPr marL="3429000" indent="-228600" algn="l" defTabSz="914400" rtl="0" eaLnBrk="1" latinLnBrk="0" hangingPunct="1">
+              <a:lnSpc>
+                <a:spcPct val="90000"/>
+              </a:lnSpc>
+              <a:spcBef>
+                <a:spcPts val="500"/>
+              </a:spcBef>
+              <a:buFont typeface="Arial" panose="020B0604020202020204" pitchFamily="34" charset="0"/>
+              <a:buChar char="•"/>
+              <a:defRPr kumimoji="1" sz="1800" kern="1200">
+                <a:solidFill>
+                  <a:schemeClr val="tx1"/>
+                </a:solidFill>
+                <a:latin typeface="+mn-lt"/>
+                <a:ea typeface="+mn-ea"/>
+                <a:cs typeface="+mn-cs"/>
+              </a:defRPr>
+            </a:lvl8pPr>
+            <a:lvl9pPr marL="3886200" indent="-228600" algn="l" defTabSz="914400" rtl="0" eaLnBrk="1" latinLnBrk="0" hangingPunct="1">
+              <a:lnSpc>
+                <a:spcPct val="90000"/>
+              </a:lnSpc>
+              <a:spcBef>
+                <a:spcPts val="500"/>
+              </a:spcBef>
+              <a:buFont typeface="Arial" panose="020B0604020202020204" pitchFamily="34" charset="0"/>
+              <a:buChar char="•"/>
+              <a:defRPr kumimoji="1" sz="1800" kern="1200">
+                <a:solidFill>
+                  <a:schemeClr val="tx1"/>
+                </a:solidFill>
+                <a:latin typeface="+mn-lt"/>
+                <a:ea typeface="+mn-ea"/>
+                <a:cs typeface="+mn-cs"/>
+              </a:defRPr>
+            </a:lvl9pPr>
+          </a:lstStyle>
+          <a:p>
+            <a:pPr marL="0" indent="0">
+              <a:buNone/>
+            </a:pPr>
+            <a:r>
+              <a:rPr lang="en-US" altLang="ja-JP" sz="9600" dirty="0">
+                <a:solidFill>
+                  <a:srgbClr val="0070C0"/>
+                </a:solidFill>
+              </a:rPr>
+              <a:t>}</a:t>
+            </a:r>
+          </a:p>
+        </p:txBody>
+      </p:sp>
+      <p:sp>
+        <p:nvSpPr>
+          <p:cNvPr id="24" name="コンテンツ プレースホルダー 2">
+            <a:extLst>
+              <a:ext uri="{FF2B5EF4-FFF2-40B4-BE49-F238E27FC236}">
+                <a16:creationId xmlns:a16="http://schemas.microsoft.com/office/drawing/2014/main" id="{45D26C92-C651-4D0B-80B7-1B02A7F83D9F}"/>
+              </a:ext>
+            </a:extLst>
+          </p:cNvPr>
+          <p:cNvSpPr txBox="1">
+            <a:spLocks/>
+          </p:cNvSpPr>
+          <p:nvPr/>
+        </p:nvSpPr>
+        <p:spPr>
+          <a:xfrm>
+            <a:off x="8314413" y="1992317"/>
+            <a:ext cx="843887" cy="2212023"/>
+          </a:xfrm>
+          <a:prstGeom prst="rect">
+            <a:avLst/>
+          </a:prstGeom>
+        </p:spPr>
+        <p:txBody>
+          <a:bodyPr vert="horz" lIns="91440" tIns="45720" rIns="91440" bIns="45720" rtlCol="0">
+            <a:noAutofit/>
+          </a:bodyPr>
+          <a:lstStyle>
+            <a:lvl1pPr marL="228600" indent="-228600" algn="l" defTabSz="914400" rtl="0" eaLnBrk="1" latinLnBrk="0" hangingPunct="1">
+              <a:lnSpc>
+                <a:spcPct val="90000"/>
+              </a:lnSpc>
+              <a:spcBef>
+                <a:spcPts val="1000"/>
+              </a:spcBef>
+              <a:buFont typeface="Arial" panose="020B0604020202020204" pitchFamily="34" charset="0"/>
+              <a:buChar char="•"/>
+              <a:defRPr kumimoji="1" sz="2800" kern="1200">
+                <a:solidFill>
+                  <a:schemeClr val="tx1"/>
+                </a:solidFill>
+                <a:latin typeface="+mn-lt"/>
+                <a:ea typeface="+mn-ea"/>
+                <a:cs typeface="+mn-cs"/>
+              </a:defRPr>
+            </a:lvl1pPr>
+            <a:lvl2pPr marL="685800" indent="-228600" algn="l" defTabSz="914400" rtl="0" eaLnBrk="1" latinLnBrk="0" hangingPunct="1">
+              <a:lnSpc>
+                <a:spcPct val="90000"/>
+              </a:lnSpc>
+              <a:spcBef>
+                <a:spcPts val="500"/>
+              </a:spcBef>
+              <a:buFont typeface="Arial" panose="020B0604020202020204" pitchFamily="34" charset="0"/>
+              <a:buChar char="•"/>
+              <a:defRPr kumimoji="1" sz="2400" kern="1200">
+                <a:solidFill>
+                  <a:schemeClr val="tx1"/>
+                </a:solidFill>
+                <a:latin typeface="+mn-lt"/>
+                <a:ea typeface="+mn-ea"/>
+                <a:cs typeface="+mn-cs"/>
+              </a:defRPr>
+            </a:lvl2pPr>
+            <a:lvl3pPr marL="1143000" indent="-228600" algn="l" defTabSz="914400" rtl="0" eaLnBrk="1" latinLnBrk="0" hangingPunct="1">
+              <a:lnSpc>
+                <a:spcPct val="90000"/>
+              </a:lnSpc>
+              <a:spcBef>
+                <a:spcPts val="500"/>
+              </a:spcBef>
+              <a:buFont typeface="Arial" panose="020B0604020202020204" pitchFamily="34" charset="0"/>
+              <a:buChar char="•"/>
+              <a:defRPr kumimoji="1" sz="2000" kern="1200">
+                <a:solidFill>
+                  <a:schemeClr val="tx1"/>
+                </a:solidFill>
+                <a:latin typeface="+mn-lt"/>
+                <a:ea typeface="+mn-ea"/>
+                <a:cs typeface="+mn-cs"/>
+              </a:defRPr>
+            </a:lvl3pPr>
+            <a:lvl4pPr marL="1600200" indent="-228600" algn="l" defTabSz="914400" rtl="0" eaLnBrk="1" latinLnBrk="0" hangingPunct="1">
+              <a:lnSpc>
+                <a:spcPct val="90000"/>
+              </a:lnSpc>
+              <a:spcBef>
+                <a:spcPts val="500"/>
+              </a:spcBef>
+              <a:buFont typeface="Arial" panose="020B0604020202020204" pitchFamily="34" charset="0"/>
+              <a:buChar char="•"/>
+              <a:defRPr kumimoji="1" sz="1800" kern="1200">
+                <a:solidFill>
+                  <a:schemeClr val="tx1"/>
+                </a:solidFill>
+                <a:latin typeface="+mn-lt"/>
+                <a:ea typeface="+mn-ea"/>
+                <a:cs typeface="+mn-cs"/>
+              </a:defRPr>
+            </a:lvl4pPr>
+            <a:lvl5pPr marL="2057400" indent="-228600" algn="l" defTabSz="914400" rtl="0" eaLnBrk="1" latinLnBrk="0" hangingPunct="1">
+              <a:lnSpc>
+                <a:spcPct val="90000"/>
+              </a:lnSpc>
+              <a:spcBef>
+                <a:spcPts val="500"/>
+              </a:spcBef>
+              <a:buFont typeface="Arial" panose="020B0604020202020204" pitchFamily="34" charset="0"/>
+              <a:buChar char="•"/>
+              <a:defRPr kumimoji="1" sz="1800" kern="1200">
+                <a:solidFill>
+                  <a:schemeClr val="tx1"/>
+                </a:solidFill>
+                <a:latin typeface="+mn-lt"/>
+                <a:ea typeface="+mn-ea"/>
+                <a:cs typeface="+mn-cs"/>
+              </a:defRPr>
+            </a:lvl5pPr>
+            <a:lvl6pPr marL="2514600" indent="-228600" algn="l" defTabSz="914400" rtl="0" eaLnBrk="1" latinLnBrk="0" hangingPunct="1">
+              <a:lnSpc>
+                <a:spcPct val="90000"/>
+              </a:lnSpc>
+              <a:spcBef>
+                <a:spcPts val="500"/>
+              </a:spcBef>
+              <a:buFont typeface="Arial" panose="020B0604020202020204" pitchFamily="34" charset="0"/>
+              <a:buChar char="•"/>
+              <a:defRPr kumimoji="1" sz="1800" kern="1200">
+                <a:solidFill>
+                  <a:schemeClr val="tx1"/>
+                </a:solidFill>
+                <a:latin typeface="+mn-lt"/>
+                <a:ea typeface="+mn-ea"/>
+                <a:cs typeface="+mn-cs"/>
+              </a:defRPr>
+            </a:lvl6pPr>
+            <a:lvl7pPr marL="2971800" indent="-228600" algn="l" defTabSz="914400" rtl="0" eaLnBrk="1" latinLnBrk="0" hangingPunct="1">
+              <a:lnSpc>
+                <a:spcPct val="90000"/>
+              </a:lnSpc>
+              <a:spcBef>
+                <a:spcPts val="500"/>
+              </a:spcBef>
+              <a:buFont typeface="Arial" panose="020B0604020202020204" pitchFamily="34" charset="0"/>
+              <a:buChar char="•"/>
+              <a:defRPr kumimoji="1" sz="1800" kern="1200">
+                <a:solidFill>
+                  <a:schemeClr val="tx1"/>
+                </a:solidFill>
+                <a:latin typeface="+mn-lt"/>
+                <a:ea typeface="+mn-ea"/>
+                <a:cs typeface="+mn-cs"/>
+              </a:defRPr>
+            </a:lvl7pPr>
+            <a:lvl8pPr marL="3429000" indent="-228600" algn="l" defTabSz="914400" rtl="0" eaLnBrk="1" latinLnBrk="0" hangingPunct="1">
+              <a:lnSpc>
+                <a:spcPct val="90000"/>
+              </a:lnSpc>
+              <a:spcBef>
+                <a:spcPts val="500"/>
+              </a:spcBef>
+              <a:buFont typeface="Arial" panose="020B0604020202020204" pitchFamily="34" charset="0"/>
+              <a:buChar char="•"/>
+              <a:defRPr kumimoji="1" sz="1800" kern="1200">
+                <a:solidFill>
+                  <a:schemeClr val="tx1"/>
+                </a:solidFill>
+                <a:latin typeface="+mn-lt"/>
+                <a:ea typeface="+mn-ea"/>
+                <a:cs typeface="+mn-cs"/>
+              </a:defRPr>
+            </a:lvl8pPr>
+            <a:lvl9pPr marL="3886200" indent="-228600" algn="l" defTabSz="914400" rtl="0" eaLnBrk="1" latinLnBrk="0" hangingPunct="1">
+              <a:lnSpc>
+                <a:spcPct val="90000"/>
+              </a:lnSpc>
+              <a:spcBef>
+                <a:spcPts val="500"/>
+              </a:spcBef>
+              <a:buFont typeface="Arial" panose="020B0604020202020204" pitchFamily="34" charset="0"/>
+              <a:buChar char="•"/>
+              <a:defRPr kumimoji="1" sz="1800" kern="1200">
+                <a:solidFill>
+                  <a:schemeClr val="tx1"/>
+                </a:solidFill>
+                <a:latin typeface="+mn-lt"/>
+                <a:ea typeface="+mn-ea"/>
+                <a:cs typeface="+mn-cs"/>
+              </a:defRPr>
+            </a:lvl9pPr>
+          </a:lstStyle>
+          <a:p>
+            <a:pPr marL="0" indent="0">
+              <a:buNone/>
+            </a:pPr>
+            <a:r>
+              <a:rPr lang="en-US" altLang="ja-JP" sz="9600" dirty="0">
+                <a:solidFill>
+                  <a:srgbClr val="FF0000"/>
+                </a:solidFill>
+              </a:rPr>
+              <a:t>?</a:t>
+            </a:r>
+          </a:p>
+        </p:txBody>
+      </p:sp>
+      <p:sp>
+        <p:nvSpPr>
+          <p:cNvPr id="25" name="吹き出し: 角を丸めた四角形 24">
+            <a:extLst>
+              <a:ext uri="{FF2B5EF4-FFF2-40B4-BE49-F238E27FC236}">
+                <a16:creationId xmlns:a16="http://schemas.microsoft.com/office/drawing/2014/main" id="{FEF35414-644D-4087-8D9F-2C1F655E185A}"/>
+              </a:ext>
+            </a:extLst>
+          </p:cNvPr>
+          <p:cNvSpPr/>
+          <p:nvPr/>
+        </p:nvSpPr>
+        <p:spPr>
+          <a:xfrm>
+            <a:off x="2909515" y="2333309"/>
+            <a:ext cx="5136215" cy="1229488"/>
+          </a:xfrm>
+          <a:prstGeom prst="wedgeRoundRectCallout">
+            <a:avLst>
+              <a:gd name="adj1" fmla="val 57976"/>
+              <a:gd name="adj2" fmla="val -13744"/>
+              <a:gd name="adj3" fmla="val 16667"/>
+            </a:avLst>
+          </a:prstGeom>
+          <a:solidFill>
+            <a:schemeClr val="bg1"/>
+          </a:solidFill>
+          <a:ln w="38100">
+            <a:solidFill>
+              <a:srgbClr val="FF0000"/>
+            </a:solidFill>
+          </a:ln>
+        </p:spPr>
+        <p:style>
+          <a:lnRef idx="2">
+            <a:schemeClr val="accent1">
+              <a:shade val="50000"/>
+            </a:schemeClr>
+          </a:lnRef>
+          <a:fillRef idx="1">
+            <a:schemeClr val="accent1"/>
+          </a:fillRef>
+          <a:effectRef idx="0">
+            <a:schemeClr val="accent1"/>
+          </a:effectRef>
+          <a:fontRef idx="minor">
+            <a:schemeClr val="lt1"/>
+          </a:fontRef>
+        </p:style>
+        <p:txBody>
+          <a:bodyPr rtlCol="0" anchor="ctr"/>
+          <a:lstStyle/>
+          <a:p>
+            <a:pPr algn="ctr"/>
+            <a:endParaRPr kumimoji="1" lang="ja-JP" altLang="en-US"/>
+          </a:p>
+        </p:txBody>
+      </p:sp>
+      <p:sp>
+        <p:nvSpPr>
+          <p:cNvPr id="26" name="コンテンツ プレースホルダー 2">
+            <a:extLst>
+              <a:ext uri="{FF2B5EF4-FFF2-40B4-BE49-F238E27FC236}">
+                <a16:creationId xmlns:a16="http://schemas.microsoft.com/office/drawing/2014/main" id="{DD9D7AD2-7CEE-4AA3-BBAF-08108C21E597}"/>
+              </a:ext>
+            </a:extLst>
+          </p:cNvPr>
+          <p:cNvSpPr txBox="1">
+            <a:spLocks/>
+          </p:cNvSpPr>
+          <p:nvPr/>
+        </p:nvSpPr>
+        <p:spPr>
+          <a:xfrm>
+            <a:off x="2990198" y="2465698"/>
+            <a:ext cx="4915779" cy="1017999"/>
+          </a:xfrm>
+          <a:prstGeom prst="rect">
+            <a:avLst/>
+          </a:prstGeom>
+        </p:spPr>
+        <p:txBody>
+          <a:bodyPr vert="horz" lIns="91440" tIns="45720" rIns="91440" bIns="45720" rtlCol="0">
+            <a:normAutofit/>
+          </a:bodyPr>
+          <a:lstStyle>
+            <a:lvl1pPr marL="228600" indent="-228600" algn="l" defTabSz="914400" rtl="0" eaLnBrk="1" latinLnBrk="0" hangingPunct="1">
+              <a:lnSpc>
+                <a:spcPct val="90000"/>
+              </a:lnSpc>
+              <a:spcBef>
+                <a:spcPts val="1000"/>
+              </a:spcBef>
+              <a:buFont typeface="Arial" panose="020B0604020202020204" pitchFamily="34" charset="0"/>
+              <a:buChar char="•"/>
+              <a:defRPr kumimoji="1" sz="2800" kern="1200">
+                <a:solidFill>
+                  <a:schemeClr val="tx1"/>
+                </a:solidFill>
+                <a:latin typeface="+mn-lt"/>
+                <a:ea typeface="+mn-ea"/>
+                <a:cs typeface="+mn-cs"/>
+              </a:defRPr>
+            </a:lvl1pPr>
+            <a:lvl2pPr marL="685800" indent="-228600" algn="l" defTabSz="914400" rtl="0" eaLnBrk="1" latinLnBrk="0" hangingPunct="1">
+              <a:lnSpc>
+                <a:spcPct val="90000"/>
+              </a:lnSpc>
+              <a:spcBef>
+                <a:spcPts val="500"/>
+              </a:spcBef>
+              <a:buFont typeface="Arial" panose="020B0604020202020204" pitchFamily="34" charset="0"/>
+              <a:buChar char="•"/>
+              <a:defRPr kumimoji="1" sz="2400" kern="1200">
+                <a:solidFill>
+                  <a:schemeClr val="tx1"/>
+                </a:solidFill>
+                <a:latin typeface="+mn-lt"/>
+                <a:ea typeface="+mn-ea"/>
+                <a:cs typeface="+mn-cs"/>
+              </a:defRPr>
+            </a:lvl2pPr>
+            <a:lvl3pPr marL="1143000" indent="-228600" algn="l" defTabSz="914400" rtl="0" eaLnBrk="1" latinLnBrk="0" hangingPunct="1">
+              <a:lnSpc>
+                <a:spcPct val="90000"/>
+              </a:lnSpc>
+              <a:spcBef>
+                <a:spcPts val="500"/>
+              </a:spcBef>
+              <a:buFont typeface="Arial" panose="020B0604020202020204" pitchFamily="34" charset="0"/>
+              <a:buChar char="•"/>
+              <a:defRPr kumimoji="1" sz="2000" kern="1200">
+                <a:solidFill>
+                  <a:schemeClr val="tx1"/>
+                </a:solidFill>
+                <a:latin typeface="+mn-lt"/>
+                <a:ea typeface="+mn-ea"/>
+                <a:cs typeface="+mn-cs"/>
+              </a:defRPr>
+            </a:lvl3pPr>
+            <a:lvl4pPr marL="1600200" indent="-228600" algn="l" defTabSz="914400" rtl="0" eaLnBrk="1" latinLnBrk="0" hangingPunct="1">
+              <a:lnSpc>
+                <a:spcPct val="90000"/>
+              </a:lnSpc>
+              <a:spcBef>
+                <a:spcPts val="500"/>
+              </a:spcBef>
+              <a:buFont typeface="Arial" panose="020B0604020202020204" pitchFamily="34" charset="0"/>
+              <a:buChar char="•"/>
+              <a:defRPr kumimoji="1" sz="1800" kern="1200">
+                <a:solidFill>
+                  <a:schemeClr val="tx1"/>
+                </a:solidFill>
+                <a:latin typeface="+mn-lt"/>
+                <a:ea typeface="+mn-ea"/>
+                <a:cs typeface="+mn-cs"/>
+              </a:defRPr>
+            </a:lvl4pPr>
+            <a:lvl5pPr marL="2057400" indent="-228600" algn="l" defTabSz="914400" rtl="0" eaLnBrk="1" latinLnBrk="0" hangingPunct="1">
+              <a:lnSpc>
+                <a:spcPct val="90000"/>
+              </a:lnSpc>
+              <a:spcBef>
+                <a:spcPts val="500"/>
+              </a:spcBef>
+              <a:buFont typeface="Arial" panose="020B0604020202020204" pitchFamily="34" charset="0"/>
+              <a:buChar char="•"/>
+              <a:defRPr kumimoji="1" sz="1800" kern="1200">
+                <a:solidFill>
+                  <a:schemeClr val="tx1"/>
+                </a:solidFill>
+                <a:latin typeface="+mn-lt"/>
+                <a:ea typeface="+mn-ea"/>
+                <a:cs typeface="+mn-cs"/>
+              </a:defRPr>
+            </a:lvl5pPr>
+            <a:lvl6pPr marL="2514600" indent="-228600" algn="l" defTabSz="914400" rtl="0" eaLnBrk="1" latinLnBrk="0" hangingPunct="1">
+              <a:lnSpc>
+                <a:spcPct val="90000"/>
+              </a:lnSpc>
+              <a:spcBef>
+                <a:spcPts val="500"/>
+              </a:spcBef>
+              <a:buFont typeface="Arial" panose="020B0604020202020204" pitchFamily="34" charset="0"/>
+              <a:buChar char="•"/>
+              <a:defRPr kumimoji="1" sz="1800" kern="1200">
+                <a:solidFill>
+                  <a:schemeClr val="tx1"/>
+                </a:solidFill>
+                <a:latin typeface="+mn-lt"/>
+                <a:ea typeface="+mn-ea"/>
+                <a:cs typeface="+mn-cs"/>
+              </a:defRPr>
+            </a:lvl6pPr>
+            <a:lvl7pPr marL="2971800" indent="-228600" algn="l" defTabSz="914400" rtl="0" eaLnBrk="1" latinLnBrk="0" hangingPunct="1">
+              <a:lnSpc>
+                <a:spcPct val="90000"/>
+              </a:lnSpc>
+              <a:spcBef>
+                <a:spcPts val="500"/>
+              </a:spcBef>
+              <a:buFont typeface="Arial" panose="020B0604020202020204" pitchFamily="34" charset="0"/>
+              <a:buChar char="•"/>
+              <a:defRPr kumimoji="1" sz="1800" kern="1200">
+                <a:solidFill>
+                  <a:schemeClr val="tx1"/>
+                </a:solidFill>
+                <a:latin typeface="+mn-lt"/>
+                <a:ea typeface="+mn-ea"/>
+                <a:cs typeface="+mn-cs"/>
+              </a:defRPr>
+            </a:lvl7pPr>
+            <a:lvl8pPr marL="3429000" indent="-228600" algn="l" defTabSz="914400" rtl="0" eaLnBrk="1" latinLnBrk="0" hangingPunct="1">
+              <a:lnSpc>
+                <a:spcPct val="90000"/>
+              </a:lnSpc>
+              <a:spcBef>
+                <a:spcPts val="500"/>
+              </a:spcBef>
+              <a:buFont typeface="Arial" panose="020B0604020202020204" pitchFamily="34" charset="0"/>
+              <a:buChar char="•"/>
+              <a:defRPr kumimoji="1" sz="1800" kern="1200">
+                <a:solidFill>
+                  <a:schemeClr val="tx1"/>
+                </a:solidFill>
+                <a:latin typeface="+mn-lt"/>
+                <a:ea typeface="+mn-ea"/>
+                <a:cs typeface="+mn-cs"/>
+              </a:defRPr>
+            </a:lvl8pPr>
+            <a:lvl9pPr marL="3886200" indent="-228600" algn="l" defTabSz="914400" rtl="0" eaLnBrk="1" latinLnBrk="0" hangingPunct="1">
+              <a:lnSpc>
+                <a:spcPct val="90000"/>
+              </a:lnSpc>
+              <a:spcBef>
+                <a:spcPts val="500"/>
+              </a:spcBef>
+              <a:buFont typeface="Arial" panose="020B0604020202020204" pitchFamily="34" charset="0"/>
+              <a:buChar char="•"/>
+              <a:defRPr kumimoji="1" sz="1800" kern="1200">
+                <a:solidFill>
+                  <a:schemeClr val="tx1"/>
+                </a:solidFill>
+                <a:latin typeface="+mn-lt"/>
+                <a:ea typeface="+mn-ea"/>
+                <a:cs typeface="+mn-cs"/>
+              </a:defRPr>
+            </a:lvl9pPr>
+          </a:lstStyle>
+          <a:p>
+            <a:pPr marL="0" indent="0" algn="ctr">
+              <a:buNone/>
+            </a:pPr>
+            <a:r>
+              <a:rPr lang="ja-JP" altLang="en-US" sz="2200" b="1" dirty="0">
+                <a:solidFill>
+                  <a:srgbClr val="FF0000"/>
+                </a:solidFill>
+              </a:rPr>
+              <a:t>多次元的な環境の変化や新規の環境ストレスに対する反応規格の適応的意義はなぞ</a:t>
+            </a:r>
+            <a:endParaRPr lang="en-US" altLang="ja-JP" sz="2200" b="1" dirty="0">
+              <a:solidFill>
+                <a:srgbClr val="FF0000"/>
+              </a:solidFill>
+            </a:endParaRPr>
+          </a:p>
+        </p:txBody>
+      </p:sp>
+      <p:sp>
+        <p:nvSpPr>
+          <p:cNvPr id="28" name="コンテンツ プレースホルダー 2">
+            <a:extLst>
+              <a:ext uri="{FF2B5EF4-FFF2-40B4-BE49-F238E27FC236}">
+                <a16:creationId xmlns:a16="http://schemas.microsoft.com/office/drawing/2014/main" id="{1BCCC8AD-CA3E-4994-95B2-670F9C7968C0}"/>
+              </a:ext>
+            </a:extLst>
+          </p:cNvPr>
+          <p:cNvSpPr txBox="1">
+            <a:spLocks/>
+          </p:cNvSpPr>
+          <p:nvPr/>
+        </p:nvSpPr>
+        <p:spPr>
+          <a:xfrm>
+            <a:off x="473328" y="5503074"/>
+            <a:ext cx="7687682" cy="542922"/>
+          </a:xfrm>
+          <a:prstGeom prst="rect">
+            <a:avLst/>
+          </a:prstGeom>
+        </p:spPr>
+        <p:txBody>
+          <a:bodyPr vert="horz" lIns="91440" tIns="45720" rIns="91440" bIns="45720" rtlCol="0">
+            <a:normAutofit/>
+          </a:bodyPr>
+          <a:lstStyle>
+            <a:lvl1pPr marL="228600" indent="-228600" algn="l" defTabSz="914400" rtl="0" eaLnBrk="1" latinLnBrk="0" hangingPunct="1">
+              <a:lnSpc>
+                <a:spcPct val="90000"/>
+              </a:lnSpc>
+              <a:spcBef>
+                <a:spcPts val="1000"/>
+              </a:spcBef>
+              <a:buFont typeface="Arial" panose="020B0604020202020204" pitchFamily="34" charset="0"/>
+              <a:buChar char="•"/>
+              <a:defRPr kumimoji="1" sz="2800" kern="1200">
+                <a:solidFill>
+                  <a:schemeClr val="tx1"/>
+                </a:solidFill>
+                <a:latin typeface="+mn-lt"/>
+                <a:ea typeface="+mn-ea"/>
+                <a:cs typeface="+mn-cs"/>
+              </a:defRPr>
+            </a:lvl1pPr>
+            <a:lvl2pPr marL="685800" indent="-228600" algn="l" defTabSz="914400" rtl="0" eaLnBrk="1" latinLnBrk="0" hangingPunct="1">
+              <a:lnSpc>
+                <a:spcPct val="90000"/>
+              </a:lnSpc>
+              <a:spcBef>
+                <a:spcPts val="500"/>
+              </a:spcBef>
+              <a:buFont typeface="Arial" panose="020B0604020202020204" pitchFamily="34" charset="0"/>
+              <a:buChar char="•"/>
+              <a:defRPr kumimoji="1" sz="2400" kern="1200">
+                <a:solidFill>
+                  <a:schemeClr val="tx1"/>
+                </a:solidFill>
+                <a:latin typeface="+mn-lt"/>
+                <a:ea typeface="+mn-ea"/>
+                <a:cs typeface="+mn-cs"/>
+              </a:defRPr>
+            </a:lvl2pPr>
+            <a:lvl3pPr marL="1143000" indent="-228600" algn="l" defTabSz="914400" rtl="0" eaLnBrk="1" latinLnBrk="0" hangingPunct="1">
+              <a:lnSpc>
+                <a:spcPct val="90000"/>
+              </a:lnSpc>
+              <a:spcBef>
+                <a:spcPts val="500"/>
+              </a:spcBef>
+              <a:buFont typeface="Arial" panose="020B0604020202020204" pitchFamily="34" charset="0"/>
+              <a:buChar char="•"/>
+              <a:defRPr kumimoji="1" sz="2000" kern="1200">
+                <a:solidFill>
+                  <a:schemeClr val="tx1"/>
+                </a:solidFill>
+                <a:latin typeface="+mn-lt"/>
+                <a:ea typeface="+mn-ea"/>
+                <a:cs typeface="+mn-cs"/>
+              </a:defRPr>
+            </a:lvl3pPr>
+            <a:lvl4pPr marL="1600200" indent="-228600" algn="l" defTabSz="914400" rtl="0" eaLnBrk="1" latinLnBrk="0" hangingPunct="1">
+              <a:lnSpc>
+                <a:spcPct val="90000"/>
+              </a:lnSpc>
+              <a:spcBef>
+                <a:spcPts val="500"/>
+              </a:spcBef>
+              <a:buFont typeface="Arial" panose="020B0604020202020204" pitchFamily="34" charset="0"/>
+              <a:buChar char="•"/>
+              <a:defRPr kumimoji="1" sz="1800" kern="1200">
+                <a:solidFill>
+                  <a:schemeClr val="tx1"/>
+                </a:solidFill>
+                <a:latin typeface="+mn-lt"/>
+                <a:ea typeface="+mn-ea"/>
+                <a:cs typeface="+mn-cs"/>
+              </a:defRPr>
+            </a:lvl4pPr>
+            <a:lvl5pPr marL="2057400" indent="-228600" algn="l" defTabSz="914400" rtl="0" eaLnBrk="1" latinLnBrk="0" hangingPunct="1">
+              <a:lnSpc>
+                <a:spcPct val="90000"/>
+              </a:lnSpc>
+              <a:spcBef>
+                <a:spcPts val="500"/>
+              </a:spcBef>
+              <a:buFont typeface="Arial" panose="020B0604020202020204" pitchFamily="34" charset="0"/>
+              <a:buChar char="•"/>
+              <a:defRPr kumimoji="1" sz="1800" kern="1200">
+                <a:solidFill>
+                  <a:schemeClr val="tx1"/>
+                </a:solidFill>
+                <a:latin typeface="+mn-lt"/>
+                <a:ea typeface="+mn-ea"/>
+                <a:cs typeface="+mn-cs"/>
+              </a:defRPr>
+            </a:lvl5pPr>
+            <a:lvl6pPr marL="2514600" indent="-228600" algn="l" defTabSz="914400" rtl="0" eaLnBrk="1" latinLnBrk="0" hangingPunct="1">
+              <a:lnSpc>
+                <a:spcPct val="90000"/>
+              </a:lnSpc>
+              <a:spcBef>
+                <a:spcPts val="500"/>
+              </a:spcBef>
+              <a:buFont typeface="Arial" panose="020B0604020202020204" pitchFamily="34" charset="0"/>
+              <a:buChar char="•"/>
+              <a:defRPr kumimoji="1" sz="1800" kern="1200">
+                <a:solidFill>
+                  <a:schemeClr val="tx1"/>
+                </a:solidFill>
+                <a:latin typeface="+mn-lt"/>
+                <a:ea typeface="+mn-ea"/>
+                <a:cs typeface="+mn-cs"/>
+              </a:defRPr>
+            </a:lvl6pPr>
+            <a:lvl7pPr marL="2971800" indent="-228600" algn="l" defTabSz="914400" rtl="0" eaLnBrk="1" latinLnBrk="0" hangingPunct="1">
+              <a:lnSpc>
+                <a:spcPct val="90000"/>
+              </a:lnSpc>
+              <a:spcBef>
+                <a:spcPts val="500"/>
+              </a:spcBef>
+              <a:buFont typeface="Arial" panose="020B0604020202020204" pitchFamily="34" charset="0"/>
+              <a:buChar char="•"/>
+              <a:defRPr kumimoji="1" sz="1800" kern="1200">
+                <a:solidFill>
+                  <a:schemeClr val="tx1"/>
+                </a:solidFill>
+                <a:latin typeface="+mn-lt"/>
+                <a:ea typeface="+mn-ea"/>
+                <a:cs typeface="+mn-cs"/>
+              </a:defRPr>
+            </a:lvl7pPr>
+            <a:lvl8pPr marL="3429000" indent="-228600" algn="l" defTabSz="914400" rtl="0" eaLnBrk="1" latinLnBrk="0" hangingPunct="1">
+              <a:lnSpc>
+                <a:spcPct val="90000"/>
+              </a:lnSpc>
+              <a:spcBef>
+                <a:spcPts val="500"/>
+              </a:spcBef>
+              <a:buFont typeface="Arial" panose="020B0604020202020204" pitchFamily="34" charset="0"/>
+              <a:buChar char="•"/>
+              <a:defRPr kumimoji="1" sz="1800" kern="1200">
+                <a:solidFill>
+                  <a:schemeClr val="tx1"/>
+                </a:solidFill>
+                <a:latin typeface="+mn-lt"/>
+                <a:ea typeface="+mn-ea"/>
+                <a:cs typeface="+mn-cs"/>
+              </a:defRPr>
+            </a:lvl8pPr>
+            <a:lvl9pPr marL="3886200" indent="-228600" algn="l" defTabSz="914400" rtl="0" eaLnBrk="1" latinLnBrk="0" hangingPunct="1">
+              <a:lnSpc>
+                <a:spcPct val="90000"/>
+              </a:lnSpc>
+              <a:spcBef>
+                <a:spcPts val="500"/>
+              </a:spcBef>
+              <a:buFont typeface="Arial" panose="020B0604020202020204" pitchFamily="34" charset="0"/>
+              <a:buChar char="•"/>
+              <a:defRPr kumimoji="1" sz="1800" kern="1200">
+                <a:solidFill>
+                  <a:schemeClr val="tx1"/>
+                </a:solidFill>
+                <a:latin typeface="+mn-lt"/>
+                <a:ea typeface="+mn-ea"/>
+                <a:cs typeface="+mn-cs"/>
+              </a:defRPr>
+            </a:lvl9pPr>
+          </a:lstStyle>
+          <a:p>
+            <a:pPr marL="457200" indent="-457200">
+              <a:buFont typeface="+mj-lt"/>
+              <a:buAutoNum type="arabicPeriod" startAt="3"/>
+            </a:pPr>
+            <a:r>
+              <a:rPr lang="ja-JP" altLang="en-US" sz="2200" b="1" dirty="0">
+                <a:solidFill>
+                  <a:srgbClr val="0070C0"/>
+                </a:solidFill>
+              </a:rPr>
+              <a:t>非適応的な可塑性形質</a:t>
+            </a:r>
+            <a:endParaRPr lang="en-US" altLang="ja-JP" sz="2400" dirty="0">
+              <a:solidFill>
+                <a:srgbClr val="0070C0"/>
+              </a:solidFill>
+            </a:endParaRPr>
+          </a:p>
+          <a:p>
+            <a:pPr marL="457200" indent="-457200">
+              <a:buFont typeface="+mj-lt"/>
+              <a:buAutoNum type="arabicPeriod" startAt="3"/>
+            </a:pPr>
+            <a:endParaRPr lang="en-US" altLang="ja-JP" sz="2200" b="1" dirty="0">
+              <a:solidFill>
+                <a:srgbClr val="0070C0"/>
+              </a:solidFill>
+            </a:endParaRPr>
+          </a:p>
+        </p:txBody>
+      </p:sp>
       <p:grpSp>
         <p:nvGrpSpPr>
-          <p:cNvPr id="16" name="グループ化 15">
+          <p:cNvPr id="27" name="グループ化 26">
             <a:extLst>
               <a:ext uri="{FF2B5EF4-FFF2-40B4-BE49-F238E27FC236}">
-                <a16:creationId xmlns:a16="http://schemas.microsoft.com/office/drawing/2014/main" id="{F0266D48-7B74-44C2-AAB2-36E70A4B8354}"/>
+                <a16:creationId xmlns:a16="http://schemas.microsoft.com/office/drawing/2014/main" id="{0386C975-D15F-42E3-839E-49C72B070549}"/>
               </a:ext>
             </a:extLst>
           </p:cNvPr>
@@ -9097,10 +11167,10 @@
         </p:grpSpPr>
         <p:sp>
           <p:nvSpPr>
-            <p:cNvPr id="9" name="吹き出し: 角を丸めた四角形 8">
+            <p:cNvPr id="29" name="吹き出し: 角を丸めた四角形 28">
               <a:extLst>
                 <a:ext uri="{FF2B5EF4-FFF2-40B4-BE49-F238E27FC236}">
-                  <a16:creationId xmlns:a16="http://schemas.microsoft.com/office/drawing/2014/main" id="{6481D655-C545-44D5-BCA7-76ECAC8D0789}"/>
+                  <a16:creationId xmlns:a16="http://schemas.microsoft.com/office/drawing/2014/main" id="{32592AAA-2FC8-4FAB-924C-05D846A35FD4}"/>
                 </a:ext>
               </a:extLst>
             </p:cNvPr>
@@ -9161,10 +11231,10 @@
         </p:sp>
         <p:sp>
           <p:nvSpPr>
-            <p:cNvPr id="11" name="コンテンツ プレースホルダー 2">
+            <p:cNvPr id="30" name="コンテンツ プレースホルダー 2">
               <a:extLst>
                 <a:ext uri="{FF2B5EF4-FFF2-40B4-BE49-F238E27FC236}">
-                  <a16:creationId xmlns:a16="http://schemas.microsoft.com/office/drawing/2014/main" id="{047692DF-2FCD-40B5-B538-9F660E2375C0}"/>
+                  <a16:creationId xmlns:a16="http://schemas.microsoft.com/office/drawing/2014/main" id="{EA045817-AE5F-497C-A59B-D98961B90BFC}"/>
                 </a:ext>
               </a:extLst>
             </p:cNvPr>
@@ -9363,1841 +11433,6 @@
           </p:txBody>
         </p:sp>
       </p:grpSp>
-      <p:sp>
-        <p:nvSpPr>
-          <p:cNvPr id="14" name="コンテンツ プレースホルダー 2">
-            <a:extLst>
-              <a:ext uri="{FF2B5EF4-FFF2-40B4-BE49-F238E27FC236}">
-                <a16:creationId xmlns:a16="http://schemas.microsoft.com/office/drawing/2014/main" id="{5B4413EC-5953-4A7F-A2A3-445588703EBD}"/>
-              </a:ext>
-            </a:extLst>
-          </p:cNvPr>
-          <p:cNvSpPr txBox="1">
-            <a:spLocks/>
-          </p:cNvSpPr>
-          <p:nvPr/>
-        </p:nvSpPr>
-        <p:spPr>
-          <a:xfrm>
-            <a:off x="436248" y="4057955"/>
-            <a:ext cx="7687682" cy="542922"/>
-          </a:xfrm>
-          <a:prstGeom prst="rect">
-            <a:avLst/>
-          </a:prstGeom>
-        </p:spPr>
-        <p:txBody>
-          <a:bodyPr vert="horz" lIns="91440" tIns="45720" rIns="91440" bIns="45720" rtlCol="0">
-            <a:normAutofit/>
-          </a:bodyPr>
-          <a:lstStyle>
-            <a:lvl1pPr marL="228600" indent="-228600" algn="l" defTabSz="914400" rtl="0" eaLnBrk="1" latinLnBrk="0" hangingPunct="1">
-              <a:lnSpc>
-                <a:spcPct val="90000"/>
-              </a:lnSpc>
-              <a:spcBef>
-                <a:spcPts val="1000"/>
-              </a:spcBef>
-              <a:buFont typeface="Arial" panose="020B0604020202020204" pitchFamily="34" charset="0"/>
-              <a:buChar char="•"/>
-              <a:defRPr kumimoji="1" sz="2800" kern="1200">
-                <a:solidFill>
-                  <a:schemeClr val="tx1"/>
-                </a:solidFill>
-                <a:latin typeface="+mn-lt"/>
-                <a:ea typeface="+mn-ea"/>
-                <a:cs typeface="+mn-cs"/>
-              </a:defRPr>
-            </a:lvl1pPr>
-            <a:lvl2pPr marL="685800" indent="-228600" algn="l" defTabSz="914400" rtl="0" eaLnBrk="1" latinLnBrk="0" hangingPunct="1">
-              <a:lnSpc>
-                <a:spcPct val="90000"/>
-              </a:lnSpc>
-              <a:spcBef>
-                <a:spcPts val="500"/>
-              </a:spcBef>
-              <a:buFont typeface="Arial" panose="020B0604020202020204" pitchFamily="34" charset="0"/>
-              <a:buChar char="•"/>
-              <a:defRPr kumimoji="1" sz="2400" kern="1200">
-                <a:solidFill>
-                  <a:schemeClr val="tx1"/>
-                </a:solidFill>
-                <a:latin typeface="+mn-lt"/>
-                <a:ea typeface="+mn-ea"/>
-                <a:cs typeface="+mn-cs"/>
-              </a:defRPr>
-            </a:lvl2pPr>
-            <a:lvl3pPr marL="1143000" indent="-228600" algn="l" defTabSz="914400" rtl="0" eaLnBrk="1" latinLnBrk="0" hangingPunct="1">
-              <a:lnSpc>
-                <a:spcPct val="90000"/>
-              </a:lnSpc>
-              <a:spcBef>
-                <a:spcPts val="500"/>
-              </a:spcBef>
-              <a:buFont typeface="Arial" panose="020B0604020202020204" pitchFamily="34" charset="0"/>
-              <a:buChar char="•"/>
-              <a:defRPr kumimoji="1" sz="2000" kern="1200">
-                <a:solidFill>
-                  <a:schemeClr val="tx1"/>
-                </a:solidFill>
-                <a:latin typeface="+mn-lt"/>
-                <a:ea typeface="+mn-ea"/>
-                <a:cs typeface="+mn-cs"/>
-              </a:defRPr>
-            </a:lvl3pPr>
-            <a:lvl4pPr marL="1600200" indent="-228600" algn="l" defTabSz="914400" rtl="0" eaLnBrk="1" latinLnBrk="0" hangingPunct="1">
-              <a:lnSpc>
-                <a:spcPct val="90000"/>
-              </a:lnSpc>
-              <a:spcBef>
-                <a:spcPts val="500"/>
-              </a:spcBef>
-              <a:buFont typeface="Arial" panose="020B0604020202020204" pitchFamily="34" charset="0"/>
-              <a:buChar char="•"/>
-              <a:defRPr kumimoji="1" sz="1800" kern="1200">
-                <a:solidFill>
-                  <a:schemeClr val="tx1"/>
-                </a:solidFill>
-                <a:latin typeface="+mn-lt"/>
-                <a:ea typeface="+mn-ea"/>
-                <a:cs typeface="+mn-cs"/>
-              </a:defRPr>
-            </a:lvl4pPr>
-            <a:lvl5pPr marL="2057400" indent="-228600" algn="l" defTabSz="914400" rtl="0" eaLnBrk="1" latinLnBrk="0" hangingPunct="1">
-              <a:lnSpc>
-                <a:spcPct val="90000"/>
-              </a:lnSpc>
-              <a:spcBef>
-                <a:spcPts val="500"/>
-              </a:spcBef>
-              <a:buFont typeface="Arial" panose="020B0604020202020204" pitchFamily="34" charset="0"/>
-              <a:buChar char="•"/>
-              <a:defRPr kumimoji="1" sz="1800" kern="1200">
-                <a:solidFill>
-                  <a:schemeClr val="tx1"/>
-                </a:solidFill>
-                <a:latin typeface="+mn-lt"/>
-                <a:ea typeface="+mn-ea"/>
-                <a:cs typeface="+mn-cs"/>
-              </a:defRPr>
-            </a:lvl5pPr>
-            <a:lvl6pPr marL="2514600" indent="-228600" algn="l" defTabSz="914400" rtl="0" eaLnBrk="1" latinLnBrk="0" hangingPunct="1">
-              <a:lnSpc>
-                <a:spcPct val="90000"/>
-              </a:lnSpc>
-              <a:spcBef>
-                <a:spcPts val="500"/>
-              </a:spcBef>
-              <a:buFont typeface="Arial" panose="020B0604020202020204" pitchFamily="34" charset="0"/>
-              <a:buChar char="•"/>
-              <a:defRPr kumimoji="1" sz="1800" kern="1200">
-                <a:solidFill>
-                  <a:schemeClr val="tx1"/>
-                </a:solidFill>
-                <a:latin typeface="+mn-lt"/>
-                <a:ea typeface="+mn-ea"/>
-                <a:cs typeface="+mn-cs"/>
-              </a:defRPr>
-            </a:lvl6pPr>
-            <a:lvl7pPr marL="2971800" indent="-228600" algn="l" defTabSz="914400" rtl="0" eaLnBrk="1" latinLnBrk="0" hangingPunct="1">
-              <a:lnSpc>
-                <a:spcPct val="90000"/>
-              </a:lnSpc>
-              <a:spcBef>
-                <a:spcPts val="500"/>
-              </a:spcBef>
-              <a:buFont typeface="Arial" panose="020B0604020202020204" pitchFamily="34" charset="0"/>
-              <a:buChar char="•"/>
-              <a:defRPr kumimoji="1" sz="1800" kern="1200">
-                <a:solidFill>
-                  <a:schemeClr val="tx1"/>
-                </a:solidFill>
-                <a:latin typeface="+mn-lt"/>
-                <a:ea typeface="+mn-ea"/>
-                <a:cs typeface="+mn-cs"/>
-              </a:defRPr>
-            </a:lvl7pPr>
-            <a:lvl8pPr marL="3429000" indent="-228600" algn="l" defTabSz="914400" rtl="0" eaLnBrk="1" latinLnBrk="0" hangingPunct="1">
-              <a:lnSpc>
-                <a:spcPct val="90000"/>
-              </a:lnSpc>
-              <a:spcBef>
-                <a:spcPts val="500"/>
-              </a:spcBef>
-              <a:buFont typeface="Arial" panose="020B0604020202020204" pitchFamily="34" charset="0"/>
-              <a:buChar char="•"/>
-              <a:defRPr kumimoji="1" sz="1800" kern="1200">
-                <a:solidFill>
-                  <a:schemeClr val="tx1"/>
-                </a:solidFill>
-                <a:latin typeface="+mn-lt"/>
-                <a:ea typeface="+mn-ea"/>
-                <a:cs typeface="+mn-cs"/>
-              </a:defRPr>
-            </a:lvl8pPr>
-            <a:lvl9pPr marL="3886200" indent="-228600" algn="l" defTabSz="914400" rtl="0" eaLnBrk="1" latinLnBrk="0" hangingPunct="1">
-              <a:lnSpc>
-                <a:spcPct val="90000"/>
-              </a:lnSpc>
-              <a:spcBef>
-                <a:spcPts val="500"/>
-              </a:spcBef>
-              <a:buFont typeface="Arial" panose="020B0604020202020204" pitchFamily="34" charset="0"/>
-              <a:buChar char="•"/>
-              <a:defRPr kumimoji="1" sz="1800" kern="1200">
-                <a:solidFill>
-                  <a:schemeClr val="tx1"/>
-                </a:solidFill>
-                <a:latin typeface="+mn-lt"/>
-                <a:ea typeface="+mn-ea"/>
-                <a:cs typeface="+mn-cs"/>
-              </a:defRPr>
-            </a:lvl9pPr>
-          </a:lstStyle>
-          <a:p>
-            <a:pPr marL="457200" indent="-457200">
-              <a:buFont typeface="+mj-lt"/>
-              <a:buAutoNum type="arabicPeriod"/>
-            </a:pPr>
-            <a:r>
-              <a:rPr lang="ja-JP" altLang="en-US" sz="2200" b="1" dirty="0">
-                <a:solidFill>
-                  <a:srgbClr val="0070C0"/>
-                </a:solidFill>
-              </a:rPr>
-              <a:t>反応規格の </a:t>
-            </a:r>
-            <a:r>
-              <a:rPr lang="en-US" altLang="ja-JP" sz="2200" b="1" dirty="0">
-                <a:solidFill>
-                  <a:srgbClr val="0070C0"/>
-                </a:solidFill>
-              </a:rPr>
-              <a:t>“</a:t>
-            </a:r>
-            <a:r>
-              <a:rPr lang="ja-JP" altLang="en-US" sz="2200" b="1" dirty="0">
-                <a:solidFill>
-                  <a:srgbClr val="0070C0"/>
-                </a:solidFill>
-              </a:rPr>
-              <a:t>強化</a:t>
-            </a:r>
-            <a:r>
-              <a:rPr lang="en-US" altLang="ja-JP" sz="2200" b="1" dirty="0">
-                <a:solidFill>
-                  <a:srgbClr val="0070C0"/>
-                </a:solidFill>
-              </a:rPr>
-              <a:t>”</a:t>
-            </a:r>
-            <a:r>
-              <a:rPr lang="ja-JP" altLang="en-US" sz="2200" b="1" dirty="0">
-                <a:solidFill>
-                  <a:srgbClr val="0070C0"/>
-                </a:solidFill>
-              </a:rPr>
-              <a:t>・</a:t>
-            </a:r>
-            <a:r>
-              <a:rPr lang="en-US" altLang="ja-JP" sz="2200" b="1" dirty="0">
-                <a:solidFill>
-                  <a:srgbClr val="0070C0"/>
-                </a:solidFill>
-              </a:rPr>
-              <a:t> ”</a:t>
-            </a:r>
-            <a:r>
-              <a:rPr lang="ja-JP" altLang="en-US" sz="2200" b="1" dirty="0">
-                <a:solidFill>
-                  <a:srgbClr val="0070C0"/>
-                </a:solidFill>
-              </a:rPr>
-              <a:t>拡張</a:t>
-            </a:r>
-            <a:r>
-              <a:rPr lang="en-US" altLang="ja-JP" sz="2200" b="1" dirty="0">
-                <a:solidFill>
-                  <a:srgbClr val="0070C0"/>
-                </a:solidFill>
-              </a:rPr>
-              <a:t>”</a:t>
-            </a:r>
-            <a:r>
-              <a:rPr lang="ja-JP" altLang="en-US" sz="2200" b="1" dirty="0">
-                <a:solidFill>
-                  <a:srgbClr val="0070C0"/>
-                </a:solidFill>
-              </a:rPr>
-              <a:t>　</a:t>
-            </a:r>
-            <a:r>
-              <a:rPr lang="en-US" altLang="ja-JP" sz="2000" dirty="0">
-                <a:solidFill>
-                  <a:srgbClr val="0070C0"/>
-                </a:solidFill>
-              </a:rPr>
-              <a:t>(</a:t>
-            </a:r>
-            <a:r>
-              <a:rPr lang="ja-JP" altLang="en-US" sz="2000" dirty="0">
-                <a:solidFill>
-                  <a:srgbClr val="0070C0"/>
-                </a:solidFill>
-              </a:rPr>
-              <a:t>例</a:t>
-            </a:r>
-            <a:r>
-              <a:rPr lang="en-US" altLang="ja-JP" sz="2000" dirty="0">
-                <a:solidFill>
-                  <a:srgbClr val="0070C0"/>
-                </a:solidFill>
-              </a:rPr>
-              <a:t>)</a:t>
-            </a:r>
-            <a:r>
-              <a:rPr lang="ja-JP" altLang="en-US" sz="2000" dirty="0">
-                <a:solidFill>
-                  <a:srgbClr val="0070C0"/>
-                </a:solidFill>
-              </a:rPr>
-              <a:t> 気温に対する反応</a:t>
-            </a:r>
-            <a:endParaRPr lang="en-US" altLang="ja-JP" sz="2400" dirty="0">
-              <a:solidFill>
-                <a:srgbClr val="0070C0"/>
-              </a:solidFill>
-            </a:endParaRPr>
-          </a:p>
-          <a:p>
-            <a:pPr marL="457200" indent="-457200">
-              <a:buFont typeface="+mj-lt"/>
-              <a:buAutoNum type="arabicPeriod"/>
-            </a:pPr>
-            <a:endParaRPr lang="en-US" altLang="ja-JP" sz="2200" b="1" dirty="0">
-              <a:solidFill>
-                <a:srgbClr val="0070C0"/>
-              </a:solidFill>
-            </a:endParaRPr>
-          </a:p>
-        </p:txBody>
-      </p:sp>
-      <p:sp>
-        <p:nvSpPr>
-          <p:cNvPr id="15" name="コンテンツ プレースホルダー 2">
-            <a:extLst>
-              <a:ext uri="{FF2B5EF4-FFF2-40B4-BE49-F238E27FC236}">
-                <a16:creationId xmlns:a16="http://schemas.microsoft.com/office/drawing/2014/main" id="{7A63DED9-D411-48D9-869C-10DA45EDE468}"/>
-              </a:ext>
-            </a:extLst>
-          </p:cNvPr>
-          <p:cNvSpPr txBox="1">
-            <a:spLocks/>
-          </p:cNvSpPr>
-          <p:nvPr/>
-        </p:nvSpPr>
-        <p:spPr>
-          <a:xfrm>
-            <a:off x="953757" y="4447371"/>
-            <a:ext cx="7170173" cy="542922"/>
-          </a:xfrm>
-          <a:prstGeom prst="rect">
-            <a:avLst/>
-          </a:prstGeom>
-        </p:spPr>
-        <p:txBody>
-          <a:bodyPr vert="horz" lIns="91440" tIns="45720" rIns="91440" bIns="45720" rtlCol="0">
-            <a:normAutofit fontScale="92500"/>
-          </a:bodyPr>
-          <a:lstStyle>
-            <a:lvl1pPr marL="228600" indent="-228600" algn="l" defTabSz="914400" rtl="0" eaLnBrk="1" latinLnBrk="0" hangingPunct="1">
-              <a:lnSpc>
-                <a:spcPct val="90000"/>
-              </a:lnSpc>
-              <a:spcBef>
-                <a:spcPts val="1000"/>
-              </a:spcBef>
-              <a:buFont typeface="Arial" panose="020B0604020202020204" pitchFamily="34" charset="0"/>
-              <a:buChar char="•"/>
-              <a:defRPr kumimoji="1" sz="2800" kern="1200">
-                <a:solidFill>
-                  <a:schemeClr val="tx1"/>
-                </a:solidFill>
-                <a:latin typeface="+mn-lt"/>
-                <a:ea typeface="+mn-ea"/>
-                <a:cs typeface="+mn-cs"/>
-              </a:defRPr>
-            </a:lvl1pPr>
-            <a:lvl2pPr marL="685800" indent="-228600" algn="l" defTabSz="914400" rtl="0" eaLnBrk="1" latinLnBrk="0" hangingPunct="1">
-              <a:lnSpc>
-                <a:spcPct val="90000"/>
-              </a:lnSpc>
-              <a:spcBef>
-                <a:spcPts val="500"/>
-              </a:spcBef>
-              <a:buFont typeface="Arial" panose="020B0604020202020204" pitchFamily="34" charset="0"/>
-              <a:buChar char="•"/>
-              <a:defRPr kumimoji="1" sz="2400" kern="1200">
-                <a:solidFill>
-                  <a:schemeClr val="tx1"/>
-                </a:solidFill>
-                <a:latin typeface="+mn-lt"/>
-                <a:ea typeface="+mn-ea"/>
-                <a:cs typeface="+mn-cs"/>
-              </a:defRPr>
-            </a:lvl2pPr>
-            <a:lvl3pPr marL="1143000" indent="-228600" algn="l" defTabSz="914400" rtl="0" eaLnBrk="1" latinLnBrk="0" hangingPunct="1">
-              <a:lnSpc>
-                <a:spcPct val="90000"/>
-              </a:lnSpc>
-              <a:spcBef>
-                <a:spcPts val="500"/>
-              </a:spcBef>
-              <a:buFont typeface="Arial" panose="020B0604020202020204" pitchFamily="34" charset="0"/>
-              <a:buChar char="•"/>
-              <a:defRPr kumimoji="1" sz="2000" kern="1200">
-                <a:solidFill>
-                  <a:schemeClr val="tx1"/>
-                </a:solidFill>
-                <a:latin typeface="+mn-lt"/>
-                <a:ea typeface="+mn-ea"/>
-                <a:cs typeface="+mn-cs"/>
-              </a:defRPr>
-            </a:lvl3pPr>
-            <a:lvl4pPr marL="1600200" indent="-228600" algn="l" defTabSz="914400" rtl="0" eaLnBrk="1" latinLnBrk="0" hangingPunct="1">
-              <a:lnSpc>
-                <a:spcPct val="90000"/>
-              </a:lnSpc>
-              <a:spcBef>
-                <a:spcPts val="500"/>
-              </a:spcBef>
-              <a:buFont typeface="Arial" panose="020B0604020202020204" pitchFamily="34" charset="0"/>
-              <a:buChar char="•"/>
-              <a:defRPr kumimoji="1" sz="1800" kern="1200">
-                <a:solidFill>
-                  <a:schemeClr val="tx1"/>
-                </a:solidFill>
-                <a:latin typeface="+mn-lt"/>
-                <a:ea typeface="+mn-ea"/>
-                <a:cs typeface="+mn-cs"/>
-              </a:defRPr>
-            </a:lvl4pPr>
-            <a:lvl5pPr marL="2057400" indent="-228600" algn="l" defTabSz="914400" rtl="0" eaLnBrk="1" latinLnBrk="0" hangingPunct="1">
-              <a:lnSpc>
-                <a:spcPct val="90000"/>
-              </a:lnSpc>
-              <a:spcBef>
-                <a:spcPts val="500"/>
-              </a:spcBef>
-              <a:buFont typeface="Arial" panose="020B0604020202020204" pitchFamily="34" charset="0"/>
-              <a:buChar char="•"/>
-              <a:defRPr kumimoji="1" sz="1800" kern="1200">
-                <a:solidFill>
-                  <a:schemeClr val="tx1"/>
-                </a:solidFill>
-                <a:latin typeface="+mn-lt"/>
-                <a:ea typeface="+mn-ea"/>
-                <a:cs typeface="+mn-cs"/>
-              </a:defRPr>
-            </a:lvl5pPr>
-            <a:lvl6pPr marL="2514600" indent="-228600" algn="l" defTabSz="914400" rtl="0" eaLnBrk="1" latinLnBrk="0" hangingPunct="1">
-              <a:lnSpc>
-                <a:spcPct val="90000"/>
-              </a:lnSpc>
-              <a:spcBef>
-                <a:spcPts val="500"/>
-              </a:spcBef>
-              <a:buFont typeface="Arial" panose="020B0604020202020204" pitchFamily="34" charset="0"/>
-              <a:buChar char="•"/>
-              <a:defRPr kumimoji="1" sz="1800" kern="1200">
-                <a:solidFill>
-                  <a:schemeClr val="tx1"/>
-                </a:solidFill>
-                <a:latin typeface="+mn-lt"/>
-                <a:ea typeface="+mn-ea"/>
-                <a:cs typeface="+mn-cs"/>
-              </a:defRPr>
-            </a:lvl6pPr>
-            <a:lvl7pPr marL="2971800" indent="-228600" algn="l" defTabSz="914400" rtl="0" eaLnBrk="1" latinLnBrk="0" hangingPunct="1">
-              <a:lnSpc>
-                <a:spcPct val="90000"/>
-              </a:lnSpc>
-              <a:spcBef>
-                <a:spcPts val="500"/>
-              </a:spcBef>
-              <a:buFont typeface="Arial" panose="020B0604020202020204" pitchFamily="34" charset="0"/>
-              <a:buChar char="•"/>
-              <a:defRPr kumimoji="1" sz="1800" kern="1200">
-                <a:solidFill>
-                  <a:schemeClr val="tx1"/>
-                </a:solidFill>
-                <a:latin typeface="+mn-lt"/>
-                <a:ea typeface="+mn-ea"/>
-                <a:cs typeface="+mn-cs"/>
-              </a:defRPr>
-            </a:lvl7pPr>
-            <a:lvl8pPr marL="3429000" indent="-228600" algn="l" defTabSz="914400" rtl="0" eaLnBrk="1" latinLnBrk="0" hangingPunct="1">
-              <a:lnSpc>
-                <a:spcPct val="90000"/>
-              </a:lnSpc>
-              <a:spcBef>
-                <a:spcPts val="500"/>
-              </a:spcBef>
-              <a:buFont typeface="Arial" panose="020B0604020202020204" pitchFamily="34" charset="0"/>
-              <a:buChar char="•"/>
-              <a:defRPr kumimoji="1" sz="1800" kern="1200">
-                <a:solidFill>
-                  <a:schemeClr val="tx1"/>
-                </a:solidFill>
-                <a:latin typeface="+mn-lt"/>
-                <a:ea typeface="+mn-ea"/>
-                <a:cs typeface="+mn-cs"/>
-              </a:defRPr>
-            </a:lvl8pPr>
-            <a:lvl9pPr marL="3886200" indent="-228600" algn="l" defTabSz="914400" rtl="0" eaLnBrk="1" latinLnBrk="0" hangingPunct="1">
-              <a:lnSpc>
-                <a:spcPct val="90000"/>
-              </a:lnSpc>
-              <a:spcBef>
-                <a:spcPts val="500"/>
-              </a:spcBef>
-              <a:buFont typeface="Arial" panose="020B0604020202020204" pitchFamily="34" charset="0"/>
-              <a:buChar char="•"/>
-              <a:defRPr kumimoji="1" sz="1800" kern="1200">
-                <a:solidFill>
-                  <a:schemeClr val="tx1"/>
-                </a:solidFill>
-                <a:latin typeface="+mn-lt"/>
-                <a:ea typeface="+mn-ea"/>
-                <a:cs typeface="+mn-cs"/>
-              </a:defRPr>
-            </a:lvl9pPr>
-          </a:lstStyle>
-          <a:p>
-            <a:pPr marL="0" indent="0">
-              <a:buNone/>
-            </a:pPr>
-            <a:r>
-              <a:rPr lang="ja-JP" altLang="en-US" sz="2000" dirty="0"/>
-              <a:t>→ 反応規格の </a:t>
-            </a:r>
-            <a:r>
-              <a:rPr lang="en-US" altLang="ja-JP" sz="2000" dirty="0"/>
-              <a:t>“</a:t>
-            </a:r>
-            <a:r>
-              <a:rPr lang="ja-JP" altLang="en-US" sz="2000" dirty="0"/>
-              <a:t>余白</a:t>
-            </a:r>
-            <a:r>
-              <a:rPr lang="en-US" altLang="ja-JP" sz="2000" dirty="0"/>
-              <a:t>” : </a:t>
-            </a:r>
-            <a:r>
-              <a:rPr lang="ja-JP" altLang="en-US" sz="2000" dirty="0"/>
-              <a:t>進化の過程で生じてきた環境変動に起因？</a:t>
-            </a:r>
-            <a:endParaRPr lang="en-US" altLang="ja-JP" sz="2000" dirty="0"/>
-          </a:p>
-        </p:txBody>
-      </p:sp>
-      <p:sp>
-        <p:nvSpPr>
-          <p:cNvPr id="18" name="コンテンツ プレースホルダー 2">
-            <a:extLst>
-              <a:ext uri="{FF2B5EF4-FFF2-40B4-BE49-F238E27FC236}">
-                <a16:creationId xmlns:a16="http://schemas.microsoft.com/office/drawing/2014/main" id="{23D5E859-D93D-440E-8E28-3D2EE5C46754}"/>
-              </a:ext>
-            </a:extLst>
-          </p:cNvPr>
-          <p:cNvSpPr txBox="1">
-            <a:spLocks/>
-          </p:cNvSpPr>
-          <p:nvPr/>
-        </p:nvSpPr>
-        <p:spPr>
-          <a:xfrm>
-            <a:off x="455979" y="4850385"/>
-            <a:ext cx="7687682" cy="542922"/>
-          </a:xfrm>
-          <a:prstGeom prst="rect">
-            <a:avLst/>
-          </a:prstGeom>
-        </p:spPr>
-        <p:txBody>
-          <a:bodyPr vert="horz" lIns="91440" tIns="45720" rIns="91440" bIns="45720" rtlCol="0">
-            <a:normAutofit/>
-          </a:bodyPr>
-          <a:lstStyle>
-            <a:lvl1pPr marL="228600" indent="-228600" algn="l" defTabSz="914400" rtl="0" eaLnBrk="1" latinLnBrk="0" hangingPunct="1">
-              <a:lnSpc>
-                <a:spcPct val="90000"/>
-              </a:lnSpc>
-              <a:spcBef>
-                <a:spcPts val="1000"/>
-              </a:spcBef>
-              <a:buFont typeface="Arial" panose="020B0604020202020204" pitchFamily="34" charset="0"/>
-              <a:buChar char="•"/>
-              <a:defRPr kumimoji="1" sz="2800" kern="1200">
-                <a:solidFill>
-                  <a:schemeClr val="tx1"/>
-                </a:solidFill>
-                <a:latin typeface="+mn-lt"/>
-                <a:ea typeface="+mn-ea"/>
-                <a:cs typeface="+mn-cs"/>
-              </a:defRPr>
-            </a:lvl1pPr>
-            <a:lvl2pPr marL="685800" indent="-228600" algn="l" defTabSz="914400" rtl="0" eaLnBrk="1" latinLnBrk="0" hangingPunct="1">
-              <a:lnSpc>
-                <a:spcPct val="90000"/>
-              </a:lnSpc>
-              <a:spcBef>
-                <a:spcPts val="500"/>
-              </a:spcBef>
-              <a:buFont typeface="Arial" panose="020B0604020202020204" pitchFamily="34" charset="0"/>
-              <a:buChar char="•"/>
-              <a:defRPr kumimoji="1" sz="2400" kern="1200">
-                <a:solidFill>
-                  <a:schemeClr val="tx1"/>
-                </a:solidFill>
-                <a:latin typeface="+mn-lt"/>
-                <a:ea typeface="+mn-ea"/>
-                <a:cs typeface="+mn-cs"/>
-              </a:defRPr>
-            </a:lvl2pPr>
-            <a:lvl3pPr marL="1143000" indent="-228600" algn="l" defTabSz="914400" rtl="0" eaLnBrk="1" latinLnBrk="0" hangingPunct="1">
-              <a:lnSpc>
-                <a:spcPct val="90000"/>
-              </a:lnSpc>
-              <a:spcBef>
-                <a:spcPts val="500"/>
-              </a:spcBef>
-              <a:buFont typeface="Arial" panose="020B0604020202020204" pitchFamily="34" charset="0"/>
-              <a:buChar char="•"/>
-              <a:defRPr kumimoji="1" sz="2000" kern="1200">
-                <a:solidFill>
-                  <a:schemeClr val="tx1"/>
-                </a:solidFill>
-                <a:latin typeface="+mn-lt"/>
-                <a:ea typeface="+mn-ea"/>
-                <a:cs typeface="+mn-cs"/>
-              </a:defRPr>
-            </a:lvl3pPr>
-            <a:lvl4pPr marL="1600200" indent="-228600" algn="l" defTabSz="914400" rtl="0" eaLnBrk="1" latinLnBrk="0" hangingPunct="1">
-              <a:lnSpc>
-                <a:spcPct val="90000"/>
-              </a:lnSpc>
-              <a:spcBef>
-                <a:spcPts val="500"/>
-              </a:spcBef>
-              <a:buFont typeface="Arial" panose="020B0604020202020204" pitchFamily="34" charset="0"/>
-              <a:buChar char="•"/>
-              <a:defRPr kumimoji="1" sz="1800" kern="1200">
-                <a:solidFill>
-                  <a:schemeClr val="tx1"/>
-                </a:solidFill>
-                <a:latin typeface="+mn-lt"/>
-                <a:ea typeface="+mn-ea"/>
-                <a:cs typeface="+mn-cs"/>
-              </a:defRPr>
-            </a:lvl4pPr>
-            <a:lvl5pPr marL="2057400" indent="-228600" algn="l" defTabSz="914400" rtl="0" eaLnBrk="1" latinLnBrk="0" hangingPunct="1">
-              <a:lnSpc>
-                <a:spcPct val="90000"/>
-              </a:lnSpc>
-              <a:spcBef>
-                <a:spcPts val="500"/>
-              </a:spcBef>
-              <a:buFont typeface="Arial" panose="020B0604020202020204" pitchFamily="34" charset="0"/>
-              <a:buChar char="•"/>
-              <a:defRPr kumimoji="1" sz="1800" kern="1200">
-                <a:solidFill>
-                  <a:schemeClr val="tx1"/>
-                </a:solidFill>
-                <a:latin typeface="+mn-lt"/>
-                <a:ea typeface="+mn-ea"/>
-                <a:cs typeface="+mn-cs"/>
-              </a:defRPr>
-            </a:lvl5pPr>
-            <a:lvl6pPr marL="2514600" indent="-228600" algn="l" defTabSz="914400" rtl="0" eaLnBrk="1" latinLnBrk="0" hangingPunct="1">
-              <a:lnSpc>
-                <a:spcPct val="90000"/>
-              </a:lnSpc>
-              <a:spcBef>
-                <a:spcPts val="500"/>
-              </a:spcBef>
-              <a:buFont typeface="Arial" panose="020B0604020202020204" pitchFamily="34" charset="0"/>
-              <a:buChar char="•"/>
-              <a:defRPr kumimoji="1" sz="1800" kern="1200">
-                <a:solidFill>
-                  <a:schemeClr val="tx1"/>
-                </a:solidFill>
-                <a:latin typeface="+mn-lt"/>
-                <a:ea typeface="+mn-ea"/>
-                <a:cs typeface="+mn-cs"/>
-              </a:defRPr>
-            </a:lvl6pPr>
-            <a:lvl7pPr marL="2971800" indent="-228600" algn="l" defTabSz="914400" rtl="0" eaLnBrk="1" latinLnBrk="0" hangingPunct="1">
-              <a:lnSpc>
-                <a:spcPct val="90000"/>
-              </a:lnSpc>
-              <a:spcBef>
-                <a:spcPts val="500"/>
-              </a:spcBef>
-              <a:buFont typeface="Arial" panose="020B0604020202020204" pitchFamily="34" charset="0"/>
-              <a:buChar char="•"/>
-              <a:defRPr kumimoji="1" sz="1800" kern="1200">
-                <a:solidFill>
-                  <a:schemeClr val="tx1"/>
-                </a:solidFill>
-                <a:latin typeface="+mn-lt"/>
-                <a:ea typeface="+mn-ea"/>
-                <a:cs typeface="+mn-cs"/>
-              </a:defRPr>
-            </a:lvl7pPr>
-            <a:lvl8pPr marL="3429000" indent="-228600" algn="l" defTabSz="914400" rtl="0" eaLnBrk="1" latinLnBrk="0" hangingPunct="1">
-              <a:lnSpc>
-                <a:spcPct val="90000"/>
-              </a:lnSpc>
-              <a:spcBef>
-                <a:spcPts val="500"/>
-              </a:spcBef>
-              <a:buFont typeface="Arial" panose="020B0604020202020204" pitchFamily="34" charset="0"/>
-              <a:buChar char="•"/>
-              <a:defRPr kumimoji="1" sz="1800" kern="1200">
-                <a:solidFill>
-                  <a:schemeClr val="tx1"/>
-                </a:solidFill>
-                <a:latin typeface="+mn-lt"/>
-                <a:ea typeface="+mn-ea"/>
-                <a:cs typeface="+mn-cs"/>
-              </a:defRPr>
-            </a:lvl8pPr>
-            <a:lvl9pPr marL="3886200" indent="-228600" algn="l" defTabSz="914400" rtl="0" eaLnBrk="1" latinLnBrk="0" hangingPunct="1">
-              <a:lnSpc>
-                <a:spcPct val="90000"/>
-              </a:lnSpc>
-              <a:spcBef>
-                <a:spcPts val="500"/>
-              </a:spcBef>
-              <a:buFont typeface="Arial" panose="020B0604020202020204" pitchFamily="34" charset="0"/>
-              <a:buChar char="•"/>
-              <a:defRPr kumimoji="1" sz="1800" kern="1200">
-                <a:solidFill>
-                  <a:schemeClr val="tx1"/>
-                </a:solidFill>
-                <a:latin typeface="+mn-lt"/>
-                <a:ea typeface="+mn-ea"/>
-                <a:cs typeface="+mn-cs"/>
-              </a:defRPr>
-            </a:lvl9pPr>
-          </a:lstStyle>
-          <a:p>
-            <a:pPr marL="457200" indent="-457200">
-              <a:buFont typeface="+mj-lt"/>
-              <a:buAutoNum type="arabicPeriod" startAt="2"/>
-            </a:pPr>
-            <a:r>
-              <a:rPr lang="en-US" altLang="ja-JP" sz="2200" b="1" dirty="0">
-                <a:solidFill>
-                  <a:srgbClr val="0070C0"/>
-                </a:solidFill>
-              </a:rPr>
-              <a:t>“</a:t>
-            </a:r>
-            <a:r>
-              <a:rPr lang="ja-JP" altLang="en-US" sz="2200" b="1" dirty="0">
-                <a:solidFill>
-                  <a:srgbClr val="0070C0"/>
-                </a:solidFill>
-              </a:rPr>
-              <a:t>多目的</a:t>
-            </a:r>
-            <a:r>
-              <a:rPr lang="en-US" altLang="ja-JP" sz="2200" b="1" dirty="0">
-                <a:solidFill>
-                  <a:srgbClr val="0070C0"/>
-                </a:solidFill>
-              </a:rPr>
-              <a:t>” </a:t>
-            </a:r>
-            <a:r>
-              <a:rPr lang="ja-JP" altLang="en-US" sz="2200" b="1" dirty="0">
-                <a:solidFill>
-                  <a:srgbClr val="0070C0"/>
-                </a:solidFill>
-              </a:rPr>
-              <a:t>な形質　</a:t>
-            </a:r>
-            <a:r>
-              <a:rPr lang="en-US" altLang="ja-JP" sz="2000" dirty="0">
-                <a:solidFill>
-                  <a:srgbClr val="0070C0"/>
-                </a:solidFill>
-              </a:rPr>
-              <a:t>(</a:t>
-            </a:r>
-            <a:r>
-              <a:rPr lang="ja-JP" altLang="en-US" sz="2000" dirty="0">
-                <a:solidFill>
-                  <a:srgbClr val="0070C0"/>
-                </a:solidFill>
-              </a:rPr>
-              <a:t>例</a:t>
-            </a:r>
-            <a:r>
-              <a:rPr lang="en-US" altLang="ja-JP" sz="2000" dirty="0">
-                <a:solidFill>
-                  <a:srgbClr val="0070C0"/>
-                </a:solidFill>
-              </a:rPr>
-              <a:t>)</a:t>
-            </a:r>
-            <a:r>
-              <a:rPr lang="ja-JP" altLang="en-US" sz="2000" dirty="0">
-                <a:solidFill>
-                  <a:srgbClr val="0070C0"/>
-                </a:solidFill>
-              </a:rPr>
-              <a:t> 毒物に対する交差耐性</a:t>
-            </a:r>
-            <a:endParaRPr lang="en-US" altLang="ja-JP" sz="2400" dirty="0">
-              <a:solidFill>
-                <a:srgbClr val="0070C0"/>
-              </a:solidFill>
-            </a:endParaRPr>
-          </a:p>
-          <a:p>
-            <a:pPr marL="457200" indent="-457200">
-              <a:buFont typeface="+mj-lt"/>
-              <a:buAutoNum type="arabicPeriod" startAt="2"/>
-            </a:pPr>
-            <a:endParaRPr lang="en-US" altLang="ja-JP" sz="2200" b="1" dirty="0">
-              <a:solidFill>
-                <a:srgbClr val="0070C0"/>
-              </a:solidFill>
-            </a:endParaRPr>
-          </a:p>
-        </p:txBody>
-      </p:sp>
-      <p:sp>
-        <p:nvSpPr>
-          <p:cNvPr id="19" name="正方形/長方形 18">
-            <a:extLst>
-              <a:ext uri="{FF2B5EF4-FFF2-40B4-BE49-F238E27FC236}">
-                <a16:creationId xmlns:a16="http://schemas.microsoft.com/office/drawing/2014/main" id="{63478F3D-8869-4C2E-A8CF-88620DDE6D68}"/>
-              </a:ext>
-            </a:extLst>
-          </p:cNvPr>
-          <p:cNvSpPr/>
-          <p:nvPr/>
-        </p:nvSpPr>
-        <p:spPr>
-          <a:xfrm>
-            <a:off x="6586845" y="7540"/>
-            <a:ext cx="1648410" cy="573197"/>
-          </a:xfrm>
-          <a:prstGeom prst="rect">
-            <a:avLst/>
-          </a:prstGeom>
-          <a:noFill/>
-          <a:ln w="53975">
-            <a:solidFill>
-              <a:srgbClr val="FF0000"/>
-            </a:solidFill>
-          </a:ln>
-        </p:spPr>
-        <p:style>
-          <a:lnRef idx="2">
-            <a:schemeClr val="accent1">
-              <a:shade val="50000"/>
-            </a:schemeClr>
-          </a:lnRef>
-          <a:fillRef idx="1">
-            <a:schemeClr val="accent1"/>
-          </a:fillRef>
-          <a:effectRef idx="0">
-            <a:schemeClr val="accent1"/>
-          </a:effectRef>
-          <a:fontRef idx="minor">
-            <a:schemeClr val="lt1"/>
-          </a:fontRef>
-        </p:style>
-        <p:txBody>
-          <a:bodyPr rtlCol="0" anchor="ctr"/>
-          <a:lstStyle/>
-          <a:p>
-            <a:pPr algn="ctr"/>
-            <a:endParaRPr kumimoji="1" lang="ja-JP" altLang="en-US"/>
-          </a:p>
-        </p:txBody>
-      </p:sp>
-      <p:sp>
-        <p:nvSpPr>
-          <p:cNvPr id="21" name="矢印: 上カーブ 20">
-            <a:extLst>
-              <a:ext uri="{FF2B5EF4-FFF2-40B4-BE49-F238E27FC236}">
-                <a16:creationId xmlns:a16="http://schemas.microsoft.com/office/drawing/2014/main" id="{9374FE68-62FB-42D6-B0A5-5048E79746DC}"/>
-              </a:ext>
-            </a:extLst>
-          </p:cNvPr>
-          <p:cNvSpPr/>
-          <p:nvPr/>
-        </p:nvSpPr>
-        <p:spPr>
-          <a:xfrm rot="16200000">
-            <a:off x="6472836" y="2083799"/>
-            <a:ext cx="4381152" cy="762033"/>
-          </a:xfrm>
-          <a:prstGeom prst="curvedUpArrow">
-            <a:avLst>
-              <a:gd name="adj1" fmla="val 13338"/>
-              <a:gd name="adj2" fmla="val 50000"/>
-              <a:gd name="adj3" fmla="val 25000"/>
-            </a:avLst>
-          </a:prstGeom>
-          <a:solidFill>
-            <a:srgbClr val="FF0000"/>
-          </a:solidFill>
-          <a:ln>
-            <a:solidFill>
-              <a:srgbClr val="C00000"/>
-            </a:solidFill>
-          </a:ln>
-        </p:spPr>
-        <p:style>
-          <a:lnRef idx="2">
-            <a:schemeClr val="accent1">
-              <a:shade val="50000"/>
-            </a:schemeClr>
-          </a:lnRef>
-          <a:fillRef idx="1">
-            <a:schemeClr val="accent1"/>
-          </a:fillRef>
-          <a:effectRef idx="0">
-            <a:schemeClr val="accent1"/>
-          </a:effectRef>
-          <a:fontRef idx="minor">
-            <a:schemeClr val="lt1"/>
-          </a:fontRef>
-        </p:style>
-        <p:txBody>
-          <a:bodyPr rtlCol="0" anchor="ctr"/>
-          <a:lstStyle/>
-          <a:p>
-            <a:pPr algn="ctr"/>
-            <a:endParaRPr kumimoji="1" lang="ja-JP" altLang="en-US">
-              <a:solidFill>
-                <a:schemeClr val="tx1"/>
-              </a:solidFill>
-            </a:endParaRPr>
-          </a:p>
-        </p:txBody>
-      </p:sp>
-      <p:sp>
-        <p:nvSpPr>
-          <p:cNvPr id="22" name="コンテンツ プレースホルダー 2">
-            <a:extLst>
-              <a:ext uri="{FF2B5EF4-FFF2-40B4-BE49-F238E27FC236}">
-                <a16:creationId xmlns:a16="http://schemas.microsoft.com/office/drawing/2014/main" id="{915B2620-B105-4CA6-9567-2343CDE94500}"/>
-              </a:ext>
-            </a:extLst>
-          </p:cNvPr>
-          <p:cNvSpPr txBox="1">
-            <a:spLocks/>
-          </p:cNvSpPr>
-          <p:nvPr/>
-        </p:nvSpPr>
-        <p:spPr>
-          <a:xfrm>
-            <a:off x="7922983" y="3934092"/>
-            <a:ext cx="843887" cy="2212023"/>
-          </a:xfrm>
-          <a:prstGeom prst="rect">
-            <a:avLst/>
-          </a:prstGeom>
-        </p:spPr>
-        <p:txBody>
-          <a:bodyPr vert="horz" lIns="91440" tIns="45720" rIns="91440" bIns="45720" rtlCol="0">
-            <a:noAutofit/>
-          </a:bodyPr>
-          <a:lstStyle>
-            <a:lvl1pPr marL="228600" indent="-228600" algn="l" defTabSz="914400" rtl="0" eaLnBrk="1" latinLnBrk="0" hangingPunct="1">
-              <a:lnSpc>
-                <a:spcPct val="90000"/>
-              </a:lnSpc>
-              <a:spcBef>
-                <a:spcPts val="1000"/>
-              </a:spcBef>
-              <a:buFont typeface="Arial" panose="020B0604020202020204" pitchFamily="34" charset="0"/>
-              <a:buChar char="•"/>
-              <a:defRPr kumimoji="1" sz="2800" kern="1200">
-                <a:solidFill>
-                  <a:schemeClr val="tx1"/>
-                </a:solidFill>
-                <a:latin typeface="+mn-lt"/>
-                <a:ea typeface="+mn-ea"/>
-                <a:cs typeface="+mn-cs"/>
-              </a:defRPr>
-            </a:lvl1pPr>
-            <a:lvl2pPr marL="685800" indent="-228600" algn="l" defTabSz="914400" rtl="0" eaLnBrk="1" latinLnBrk="0" hangingPunct="1">
-              <a:lnSpc>
-                <a:spcPct val="90000"/>
-              </a:lnSpc>
-              <a:spcBef>
-                <a:spcPts val="500"/>
-              </a:spcBef>
-              <a:buFont typeface="Arial" panose="020B0604020202020204" pitchFamily="34" charset="0"/>
-              <a:buChar char="•"/>
-              <a:defRPr kumimoji="1" sz="2400" kern="1200">
-                <a:solidFill>
-                  <a:schemeClr val="tx1"/>
-                </a:solidFill>
-                <a:latin typeface="+mn-lt"/>
-                <a:ea typeface="+mn-ea"/>
-                <a:cs typeface="+mn-cs"/>
-              </a:defRPr>
-            </a:lvl2pPr>
-            <a:lvl3pPr marL="1143000" indent="-228600" algn="l" defTabSz="914400" rtl="0" eaLnBrk="1" latinLnBrk="0" hangingPunct="1">
-              <a:lnSpc>
-                <a:spcPct val="90000"/>
-              </a:lnSpc>
-              <a:spcBef>
-                <a:spcPts val="500"/>
-              </a:spcBef>
-              <a:buFont typeface="Arial" panose="020B0604020202020204" pitchFamily="34" charset="0"/>
-              <a:buChar char="•"/>
-              <a:defRPr kumimoji="1" sz="2000" kern="1200">
-                <a:solidFill>
-                  <a:schemeClr val="tx1"/>
-                </a:solidFill>
-                <a:latin typeface="+mn-lt"/>
-                <a:ea typeface="+mn-ea"/>
-                <a:cs typeface="+mn-cs"/>
-              </a:defRPr>
-            </a:lvl3pPr>
-            <a:lvl4pPr marL="1600200" indent="-228600" algn="l" defTabSz="914400" rtl="0" eaLnBrk="1" latinLnBrk="0" hangingPunct="1">
-              <a:lnSpc>
-                <a:spcPct val="90000"/>
-              </a:lnSpc>
-              <a:spcBef>
-                <a:spcPts val="500"/>
-              </a:spcBef>
-              <a:buFont typeface="Arial" panose="020B0604020202020204" pitchFamily="34" charset="0"/>
-              <a:buChar char="•"/>
-              <a:defRPr kumimoji="1" sz="1800" kern="1200">
-                <a:solidFill>
-                  <a:schemeClr val="tx1"/>
-                </a:solidFill>
-                <a:latin typeface="+mn-lt"/>
-                <a:ea typeface="+mn-ea"/>
-                <a:cs typeface="+mn-cs"/>
-              </a:defRPr>
-            </a:lvl4pPr>
-            <a:lvl5pPr marL="2057400" indent="-228600" algn="l" defTabSz="914400" rtl="0" eaLnBrk="1" latinLnBrk="0" hangingPunct="1">
-              <a:lnSpc>
-                <a:spcPct val="90000"/>
-              </a:lnSpc>
-              <a:spcBef>
-                <a:spcPts val="500"/>
-              </a:spcBef>
-              <a:buFont typeface="Arial" panose="020B0604020202020204" pitchFamily="34" charset="0"/>
-              <a:buChar char="•"/>
-              <a:defRPr kumimoji="1" sz="1800" kern="1200">
-                <a:solidFill>
-                  <a:schemeClr val="tx1"/>
-                </a:solidFill>
-                <a:latin typeface="+mn-lt"/>
-                <a:ea typeface="+mn-ea"/>
-                <a:cs typeface="+mn-cs"/>
-              </a:defRPr>
-            </a:lvl5pPr>
-            <a:lvl6pPr marL="2514600" indent="-228600" algn="l" defTabSz="914400" rtl="0" eaLnBrk="1" latinLnBrk="0" hangingPunct="1">
-              <a:lnSpc>
-                <a:spcPct val="90000"/>
-              </a:lnSpc>
-              <a:spcBef>
-                <a:spcPts val="500"/>
-              </a:spcBef>
-              <a:buFont typeface="Arial" panose="020B0604020202020204" pitchFamily="34" charset="0"/>
-              <a:buChar char="•"/>
-              <a:defRPr kumimoji="1" sz="1800" kern="1200">
-                <a:solidFill>
-                  <a:schemeClr val="tx1"/>
-                </a:solidFill>
-                <a:latin typeface="+mn-lt"/>
-                <a:ea typeface="+mn-ea"/>
-                <a:cs typeface="+mn-cs"/>
-              </a:defRPr>
-            </a:lvl6pPr>
-            <a:lvl7pPr marL="2971800" indent="-228600" algn="l" defTabSz="914400" rtl="0" eaLnBrk="1" latinLnBrk="0" hangingPunct="1">
-              <a:lnSpc>
-                <a:spcPct val="90000"/>
-              </a:lnSpc>
-              <a:spcBef>
-                <a:spcPts val="500"/>
-              </a:spcBef>
-              <a:buFont typeface="Arial" panose="020B0604020202020204" pitchFamily="34" charset="0"/>
-              <a:buChar char="•"/>
-              <a:defRPr kumimoji="1" sz="1800" kern="1200">
-                <a:solidFill>
-                  <a:schemeClr val="tx1"/>
-                </a:solidFill>
-                <a:latin typeface="+mn-lt"/>
-                <a:ea typeface="+mn-ea"/>
-                <a:cs typeface="+mn-cs"/>
-              </a:defRPr>
-            </a:lvl7pPr>
-            <a:lvl8pPr marL="3429000" indent="-228600" algn="l" defTabSz="914400" rtl="0" eaLnBrk="1" latinLnBrk="0" hangingPunct="1">
-              <a:lnSpc>
-                <a:spcPct val="90000"/>
-              </a:lnSpc>
-              <a:spcBef>
-                <a:spcPts val="500"/>
-              </a:spcBef>
-              <a:buFont typeface="Arial" panose="020B0604020202020204" pitchFamily="34" charset="0"/>
-              <a:buChar char="•"/>
-              <a:defRPr kumimoji="1" sz="1800" kern="1200">
-                <a:solidFill>
-                  <a:schemeClr val="tx1"/>
-                </a:solidFill>
-                <a:latin typeface="+mn-lt"/>
-                <a:ea typeface="+mn-ea"/>
-                <a:cs typeface="+mn-cs"/>
-              </a:defRPr>
-            </a:lvl8pPr>
-            <a:lvl9pPr marL="3886200" indent="-228600" algn="l" defTabSz="914400" rtl="0" eaLnBrk="1" latinLnBrk="0" hangingPunct="1">
-              <a:lnSpc>
-                <a:spcPct val="90000"/>
-              </a:lnSpc>
-              <a:spcBef>
-                <a:spcPts val="500"/>
-              </a:spcBef>
-              <a:buFont typeface="Arial" panose="020B0604020202020204" pitchFamily="34" charset="0"/>
-              <a:buChar char="•"/>
-              <a:defRPr kumimoji="1" sz="1800" kern="1200">
-                <a:solidFill>
-                  <a:schemeClr val="tx1"/>
-                </a:solidFill>
-                <a:latin typeface="+mn-lt"/>
-                <a:ea typeface="+mn-ea"/>
-                <a:cs typeface="+mn-cs"/>
-              </a:defRPr>
-            </a:lvl9pPr>
-          </a:lstStyle>
-          <a:p>
-            <a:pPr marL="0" indent="0">
-              <a:buNone/>
-            </a:pPr>
-            <a:r>
-              <a:rPr lang="en-US" altLang="ja-JP" sz="9600" dirty="0">
-                <a:solidFill>
-                  <a:srgbClr val="0070C0"/>
-                </a:solidFill>
-              </a:rPr>
-              <a:t>}</a:t>
-            </a:r>
-          </a:p>
-        </p:txBody>
-      </p:sp>
-      <p:sp>
-        <p:nvSpPr>
-          <p:cNvPr id="24" name="コンテンツ プレースホルダー 2">
-            <a:extLst>
-              <a:ext uri="{FF2B5EF4-FFF2-40B4-BE49-F238E27FC236}">
-                <a16:creationId xmlns:a16="http://schemas.microsoft.com/office/drawing/2014/main" id="{45D26C92-C651-4D0B-80B7-1B02A7F83D9F}"/>
-              </a:ext>
-            </a:extLst>
-          </p:cNvPr>
-          <p:cNvSpPr txBox="1">
-            <a:spLocks/>
-          </p:cNvSpPr>
-          <p:nvPr/>
-        </p:nvSpPr>
-        <p:spPr>
-          <a:xfrm>
-            <a:off x="8314413" y="1992317"/>
-            <a:ext cx="843887" cy="2212023"/>
-          </a:xfrm>
-          <a:prstGeom prst="rect">
-            <a:avLst/>
-          </a:prstGeom>
-        </p:spPr>
-        <p:txBody>
-          <a:bodyPr vert="horz" lIns="91440" tIns="45720" rIns="91440" bIns="45720" rtlCol="0">
-            <a:noAutofit/>
-          </a:bodyPr>
-          <a:lstStyle>
-            <a:lvl1pPr marL="228600" indent="-228600" algn="l" defTabSz="914400" rtl="0" eaLnBrk="1" latinLnBrk="0" hangingPunct="1">
-              <a:lnSpc>
-                <a:spcPct val="90000"/>
-              </a:lnSpc>
-              <a:spcBef>
-                <a:spcPts val="1000"/>
-              </a:spcBef>
-              <a:buFont typeface="Arial" panose="020B0604020202020204" pitchFamily="34" charset="0"/>
-              <a:buChar char="•"/>
-              <a:defRPr kumimoji="1" sz="2800" kern="1200">
-                <a:solidFill>
-                  <a:schemeClr val="tx1"/>
-                </a:solidFill>
-                <a:latin typeface="+mn-lt"/>
-                <a:ea typeface="+mn-ea"/>
-                <a:cs typeface="+mn-cs"/>
-              </a:defRPr>
-            </a:lvl1pPr>
-            <a:lvl2pPr marL="685800" indent="-228600" algn="l" defTabSz="914400" rtl="0" eaLnBrk="1" latinLnBrk="0" hangingPunct="1">
-              <a:lnSpc>
-                <a:spcPct val="90000"/>
-              </a:lnSpc>
-              <a:spcBef>
-                <a:spcPts val="500"/>
-              </a:spcBef>
-              <a:buFont typeface="Arial" panose="020B0604020202020204" pitchFamily="34" charset="0"/>
-              <a:buChar char="•"/>
-              <a:defRPr kumimoji="1" sz="2400" kern="1200">
-                <a:solidFill>
-                  <a:schemeClr val="tx1"/>
-                </a:solidFill>
-                <a:latin typeface="+mn-lt"/>
-                <a:ea typeface="+mn-ea"/>
-                <a:cs typeface="+mn-cs"/>
-              </a:defRPr>
-            </a:lvl2pPr>
-            <a:lvl3pPr marL="1143000" indent="-228600" algn="l" defTabSz="914400" rtl="0" eaLnBrk="1" latinLnBrk="0" hangingPunct="1">
-              <a:lnSpc>
-                <a:spcPct val="90000"/>
-              </a:lnSpc>
-              <a:spcBef>
-                <a:spcPts val="500"/>
-              </a:spcBef>
-              <a:buFont typeface="Arial" panose="020B0604020202020204" pitchFamily="34" charset="0"/>
-              <a:buChar char="•"/>
-              <a:defRPr kumimoji="1" sz="2000" kern="1200">
-                <a:solidFill>
-                  <a:schemeClr val="tx1"/>
-                </a:solidFill>
-                <a:latin typeface="+mn-lt"/>
-                <a:ea typeface="+mn-ea"/>
-                <a:cs typeface="+mn-cs"/>
-              </a:defRPr>
-            </a:lvl3pPr>
-            <a:lvl4pPr marL="1600200" indent="-228600" algn="l" defTabSz="914400" rtl="0" eaLnBrk="1" latinLnBrk="0" hangingPunct="1">
-              <a:lnSpc>
-                <a:spcPct val="90000"/>
-              </a:lnSpc>
-              <a:spcBef>
-                <a:spcPts val="500"/>
-              </a:spcBef>
-              <a:buFont typeface="Arial" panose="020B0604020202020204" pitchFamily="34" charset="0"/>
-              <a:buChar char="•"/>
-              <a:defRPr kumimoji="1" sz="1800" kern="1200">
-                <a:solidFill>
-                  <a:schemeClr val="tx1"/>
-                </a:solidFill>
-                <a:latin typeface="+mn-lt"/>
-                <a:ea typeface="+mn-ea"/>
-                <a:cs typeface="+mn-cs"/>
-              </a:defRPr>
-            </a:lvl4pPr>
-            <a:lvl5pPr marL="2057400" indent="-228600" algn="l" defTabSz="914400" rtl="0" eaLnBrk="1" latinLnBrk="0" hangingPunct="1">
-              <a:lnSpc>
-                <a:spcPct val="90000"/>
-              </a:lnSpc>
-              <a:spcBef>
-                <a:spcPts val="500"/>
-              </a:spcBef>
-              <a:buFont typeface="Arial" panose="020B0604020202020204" pitchFamily="34" charset="0"/>
-              <a:buChar char="•"/>
-              <a:defRPr kumimoji="1" sz="1800" kern="1200">
-                <a:solidFill>
-                  <a:schemeClr val="tx1"/>
-                </a:solidFill>
-                <a:latin typeface="+mn-lt"/>
-                <a:ea typeface="+mn-ea"/>
-                <a:cs typeface="+mn-cs"/>
-              </a:defRPr>
-            </a:lvl5pPr>
-            <a:lvl6pPr marL="2514600" indent="-228600" algn="l" defTabSz="914400" rtl="0" eaLnBrk="1" latinLnBrk="0" hangingPunct="1">
-              <a:lnSpc>
-                <a:spcPct val="90000"/>
-              </a:lnSpc>
-              <a:spcBef>
-                <a:spcPts val="500"/>
-              </a:spcBef>
-              <a:buFont typeface="Arial" panose="020B0604020202020204" pitchFamily="34" charset="0"/>
-              <a:buChar char="•"/>
-              <a:defRPr kumimoji="1" sz="1800" kern="1200">
-                <a:solidFill>
-                  <a:schemeClr val="tx1"/>
-                </a:solidFill>
-                <a:latin typeface="+mn-lt"/>
-                <a:ea typeface="+mn-ea"/>
-                <a:cs typeface="+mn-cs"/>
-              </a:defRPr>
-            </a:lvl6pPr>
-            <a:lvl7pPr marL="2971800" indent="-228600" algn="l" defTabSz="914400" rtl="0" eaLnBrk="1" latinLnBrk="0" hangingPunct="1">
-              <a:lnSpc>
-                <a:spcPct val="90000"/>
-              </a:lnSpc>
-              <a:spcBef>
-                <a:spcPts val="500"/>
-              </a:spcBef>
-              <a:buFont typeface="Arial" panose="020B0604020202020204" pitchFamily="34" charset="0"/>
-              <a:buChar char="•"/>
-              <a:defRPr kumimoji="1" sz="1800" kern="1200">
-                <a:solidFill>
-                  <a:schemeClr val="tx1"/>
-                </a:solidFill>
-                <a:latin typeface="+mn-lt"/>
-                <a:ea typeface="+mn-ea"/>
-                <a:cs typeface="+mn-cs"/>
-              </a:defRPr>
-            </a:lvl7pPr>
-            <a:lvl8pPr marL="3429000" indent="-228600" algn="l" defTabSz="914400" rtl="0" eaLnBrk="1" latinLnBrk="0" hangingPunct="1">
-              <a:lnSpc>
-                <a:spcPct val="90000"/>
-              </a:lnSpc>
-              <a:spcBef>
-                <a:spcPts val="500"/>
-              </a:spcBef>
-              <a:buFont typeface="Arial" panose="020B0604020202020204" pitchFamily="34" charset="0"/>
-              <a:buChar char="•"/>
-              <a:defRPr kumimoji="1" sz="1800" kern="1200">
-                <a:solidFill>
-                  <a:schemeClr val="tx1"/>
-                </a:solidFill>
-                <a:latin typeface="+mn-lt"/>
-                <a:ea typeface="+mn-ea"/>
-                <a:cs typeface="+mn-cs"/>
-              </a:defRPr>
-            </a:lvl8pPr>
-            <a:lvl9pPr marL="3886200" indent="-228600" algn="l" defTabSz="914400" rtl="0" eaLnBrk="1" latinLnBrk="0" hangingPunct="1">
-              <a:lnSpc>
-                <a:spcPct val="90000"/>
-              </a:lnSpc>
-              <a:spcBef>
-                <a:spcPts val="500"/>
-              </a:spcBef>
-              <a:buFont typeface="Arial" panose="020B0604020202020204" pitchFamily="34" charset="0"/>
-              <a:buChar char="•"/>
-              <a:defRPr kumimoji="1" sz="1800" kern="1200">
-                <a:solidFill>
-                  <a:schemeClr val="tx1"/>
-                </a:solidFill>
-                <a:latin typeface="+mn-lt"/>
-                <a:ea typeface="+mn-ea"/>
-                <a:cs typeface="+mn-cs"/>
-              </a:defRPr>
-            </a:lvl9pPr>
-          </a:lstStyle>
-          <a:p>
-            <a:pPr marL="0" indent="0">
-              <a:buNone/>
-            </a:pPr>
-            <a:r>
-              <a:rPr lang="en-US" altLang="ja-JP" sz="9600" dirty="0">
-                <a:solidFill>
-                  <a:srgbClr val="FF0000"/>
-                </a:solidFill>
-              </a:rPr>
-              <a:t>?</a:t>
-            </a:r>
-          </a:p>
-        </p:txBody>
-      </p:sp>
-      <p:sp>
-        <p:nvSpPr>
-          <p:cNvPr id="25" name="吹き出し: 角を丸めた四角形 24">
-            <a:extLst>
-              <a:ext uri="{FF2B5EF4-FFF2-40B4-BE49-F238E27FC236}">
-                <a16:creationId xmlns:a16="http://schemas.microsoft.com/office/drawing/2014/main" id="{FEF35414-644D-4087-8D9F-2C1F655E185A}"/>
-              </a:ext>
-            </a:extLst>
-          </p:cNvPr>
-          <p:cNvSpPr/>
-          <p:nvPr/>
-        </p:nvSpPr>
-        <p:spPr>
-          <a:xfrm>
-            <a:off x="2909515" y="2333309"/>
-            <a:ext cx="5136215" cy="1229488"/>
-          </a:xfrm>
-          <a:prstGeom prst="wedgeRoundRectCallout">
-            <a:avLst>
-              <a:gd name="adj1" fmla="val 57976"/>
-              <a:gd name="adj2" fmla="val -13744"/>
-              <a:gd name="adj3" fmla="val 16667"/>
-            </a:avLst>
-          </a:prstGeom>
-          <a:solidFill>
-            <a:schemeClr val="bg1"/>
-          </a:solidFill>
-          <a:ln w="38100">
-            <a:solidFill>
-              <a:srgbClr val="FF0000"/>
-            </a:solidFill>
-          </a:ln>
-        </p:spPr>
-        <p:style>
-          <a:lnRef idx="2">
-            <a:schemeClr val="accent1">
-              <a:shade val="50000"/>
-            </a:schemeClr>
-          </a:lnRef>
-          <a:fillRef idx="1">
-            <a:schemeClr val="accent1"/>
-          </a:fillRef>
-          <a:effectRef idx="0">
-            <a:schemeClr val="accent1"/>
-          </a:effectRef>
-          <a:fontRef idx="minor">
-            <a:schemeClr val="lt1"/>
-          </a:fontRef>
-        </p:style>
-        <p:txBody>
-          <a:bodyPr rtlCol="0" anchor="ctr"/>
-          <a:lstStyle/>
-          <a:p>
-            <a:pPr algn="ctr"/>
-            <a:endParaRPr kumimoji="1" lang="ja-JP" altLang="en-US"/>
-          </a:p>
-        </p:txBody>
-      </p:sp>
-      <p:sp>
-        <p:nvSpPr>
-          <p:cNvPr id="26" name="コンテンツ プレースホルダー 2">
-            <a:extLst>
-              <a:ext uri="{FF2B5EF4-FFF2-40B4-BE49-F238E27FC236}">
-                <a16:creationId xmlns:a16="http://schemas.microsoft.com/office/drawing/2014/main" id="{DD9D7AD2-7CEE-4AA3-BBAF-08108C21E597}"/>
-              </a:ext>
-            </a:extLst>
-          </p:cNvPr>
-          <p:cNvSpPr txBox="1">
-            <a:spLocks/>
-          </p:cNvSpPr>
-          <p:nvPr/>
-        </p:nvSpPr>
-        <p:spPr>
-          <a:xfrm>
-            <a:off x="2990198" y="2465698"/>
-            <a:ext cx="4915779" cy="1017999"/>
-          </a:xfrm>
-          <a:prstGeom prst="rect">
-            <a:avLst/>
-          </a:prstGeom>
-        </p:spPr>
-        <p:txBody>
-          <a:bodyPr vert="horz" lIns="91440" tIns="45720" rIns="91440" bIns="45720" rtlCol="0">
-            <a:normAutofit/>
-          </a:bodyPr>
-          <a:lstStyle>
-            <a:lvl1pPr marL="228600" indent="-228600" algn="l" defTabSz="914400" rtl="0" eaLnBrk="1" latinLnBrk="0" hangingPunct="1">
-              <a:lnSpc>
-                <a:spcPct val="90000"/>
-              </a:lnSpc>
-              <a:spcBef>
-                <a:spcPts val="1000"/>
-              </a:spcBef>
-              <a:buFont typeface="Arial" panose="020B0604020202020204" pitchFamily="34" charset="0"/>
-              <a:buChar char="•"/>
-              <a:defRPr kumimoji="1" sz="2800" kern="1200">
-                <a:solidFill>
-                  <a:schemeClr val="tx1"/>
-                </a:solidFill>
-                <a:latin typeface="+mn-lt"/>
-                <a:ea typeface="+mn-ea"/>
-                <a:cs typeface="+mn-cs"/>
-              </a:defRPr>
-            </a:lvl1pPr>
-            <a:lvl2pPr marL="685800" indent="-228600" algn="l" defTabSz="914400" rtl="0" eaLnBrk="1" latinLnBrk="0" hangingPunct="1">
-              <a:lnSpc>
-                <a:spcPct val="90000"/>
-              </a:lnSpc>
-              <a:spcBef>
-                <a:spcPts val="500"/>
-              </a:spcBef>
-              <a:buFont typeface="Arial" panose="020B0604020202020204" pitchFamily="34" charset="0"/>
-              <a:buChar char="•"/>
-              <a:defRPr kumimoji="1" sz="2400" kern="1200">
-                <a:solidFill>
-                  <a:schemeClr val="tx1"/>
-                </a:solidFill>
-                <a:latin typeface="+mn-lt"/>
-                <a:ea typeface="+mn-ea"/>
-                <a:cs typeface="+mn-cs"/>
-              </a:defRPr>
-            </a:lvl2pPr>
-            <a:lvl3pPr marL="1143000" indent="-228600" algn="l" defTabSz="914400" rtl="0" eaLnBrk="1" latinLnBrk="0" hangingPunct="1">
-              <a:lnSpc>
-                <a:spcPct val="90000"/>
-              </a:lnSpc>
-              <a:spcBef>
-                <a:spcPts val="500"/>
-              </a:spcBef>
-              <a:buFont typeface="Arial" panose="020B0604020202020204" pitchFamily="34" charset="0"/>
-              <a:buChar char="•"/>
-              <a:defRPr kumimoji="1" sz="2000" kern="1200">
-                <a:solidFill>
-                  <a:schemeClr val="tx1"/>
-                </a:solidFill>
-                <a:latin typeface="+mn-lt"/>
-                <a:ea typeface="+mn-ea"/>
-                <a:cs typeface="+mn-cs"/>
-              </a:defRPr>
-            </a:lvl3pPr>
-            <a:lvl4pPr marL="1600200" indent="-228600" algn="l" defTabSz="914400" rtl="0" eaLnBrk="1" latinLnBrk="0" hangingPunct="1">
-              <a:lnSpc>
-                <a:spcPct val="90000"/>
-              </a:lnSpc>
-              <a:spcBef>
-                <a:spcPts val="500"/>
-              </a:spcBef>
-              <a:buFont typeface="Arial" panose="020B0604020202020204" pitchFamily="34" charset="0"/>
-              <a:buChar char="•"/>
-              <a:defRPr kumimoji="1" sz="1800" kern="1200">
-                <a:solidFill>
-                  <a:schemeClr val="tx1"/>
-                </a:solidFill>
-                <a:latin typeface="+mn-lt"/>
-                <a:ea typeface="+mn-ea"/>
-                <a:cs typeface="+mn-cs"/>
-              </a:defRPr>
-            </a:lvl4pPr>
-            <a:lvl5pPr marL="2057400" indent="-228600" algn="l" defTabSz="914400" rtl="0" eaLnBrk="1" latinLnBrk="0" hangingPunct="1">
-              <a:lnSpc>
-                <a:spcPct val="90000"/>
-              </a:lnSpc>
-              <a:spcBef>
-                <a:spcPts val="500"/>
-              </a:spcBef>
-              <a:buFont typeface="Arial" panose="020B0604020202020204" pitchFamily="34" charset="0"/>
-              <a:buChar char="•"/>
-              <a:defRPr kumimoji="1" sz="1800" kern="1200">
-                <a:solidFill>
-                  <a:schemeClr val="tx1"/>
-                </a:solidFill>
-                <a:latin typeface="+mn-lt"/>
-                <a:ea typeface="+mn-ea"/>
-                <a:cs typeface="+mn-cs"/>
-              </a:defRPr>
-            </a:lvl5pPr>
-            <a:lvl6pPr marL="2514600" indent="-228600" algn="l" defTabSz="914400" rtl="0" eaLnBrk="1" latinLnBrk="0" hangingPunct="1">
-              <a:lnSpc>
-                <a:spcPct val="90000"/>
-              </a:lnSpc>
-              <a:spcBef>
-                <a:spcPts val="500"/>
-              </a:spcBef>
-              <a:buFont typeface="Arial" panose="020B0604020202020204" pitchFamily="34" charset="0"/>
-              <a:buChar char="•"/>
-              <a:defRPr kumimoji="1" sz="1800" kern="1200">
-                <a:solidFill>
-                  <a:schemeClr val="tx1"/>
-                </a:solidFill>
-                <a:latin typeface="+mn-lt"/>
-                <a:ea typeface="+mn-ea"/>
-                <a:cs typeface="+mn-cs"/>
-              </a:defRPr>
-            </a:lvl6pPr>
-            <a:lvl7pPr marL="2971800" indent="-228600" algn="l" defTabSz="914400" rtl="0" eaLnBrk="1" latinLnBrk="0" hangingPunct="1">
-              <a:lnSpc>
-                <a:spcPct val="90000"/>
-              </a:lnSpc>
-              <a:spcBef>
-                <a:spcPts val="500"/>
-              </a:spcBef>
-              <a:buFont typeface="Arial" panose="020B0604020202020204" pitchFamily="34" charset="0"/>
-              <a:buChar char="•"/>
-              <a:defRPr kumimoji="1" sz="1800" kern="1200">
-                <a:solidFill>
-                  <a:schemeClr val="tx1"/>
-                </a:solidFill>
-                <a:latin typeface="+mn-lt"/>
-                <a:ea typeface="+mn-ea"/>
-                <a:cs typeface="+mn-cs"/>
-              </a:defRPr>
-            </a:lvl7pPr>
-            <a:lvl8pPr marL="3429000" indent="-228600" algn="l" defTabSz="914400" rtl="0" eaLnBrk="1" latinLnBrk="0" hangingPunct="1">
-              <a:lnSpc>
-                <a:spcPct val="90000"/>
-              </a:lnSpc>
-              <a:spcBef>
-                <a:spcPts val="500"/>
-              </a:spcBef>
-              <a:buFont typeface="Arial" panose="020B0604020202020204" pitchFamily="34" charset="0"/>
-              <a:buChar char="•"/>
-              <a:defRPr kumimoji="1" sz="1800" kern="1200">
-                <a:solidFill>
-                  <a:schemeClr val="tx1"/>
-                </a:solidFill>
-                <a:latin typeface="+mn-lt"/>
-                <a:ea typeface="+mn-ea"/>
-                <a:cs typeface="+mn-cs"/>
-              </a:defRPr>
-            </a:lvl8pPr>
-            <a:lvl9pPr marL="3886200" indent="-228600" algn="l" defTabSz="914400" rtl="0" eaLnBrk="1" latinLnBrk="0" hangingPunct="1">
-              <a:lnSpc>
-                <a:spcPct val="90000"/>
-              </a:lnSpc>
-              <a:spcBef>
-                <a:spcPts val="500"/>
-              </a:spcBef>
-              <a:buFont typeface="Arial" panose="020B0604020202020204" pitchFamily="34" charset="0"/>
-              <a:buChar char="•"/>
-              <a:defRPr kumimoji="1" sz="1800" kern="1200">
-                <a:solidFill>
-                  <a:schemeClr val="tx1"/>
-                </a:solidFill>
-                <a:latin typeface="+mn-lt"/>
-                <a:ea typeface="+mn-ea"/>
-                <a:cs typeface="+mn-cs"/>
-              </a:defRPr>
-            </a:lvl9pPr>
-          </a:lstStyle>
-          <a:p>
-            <a:pPr marL="0" indent="0" algn="ctr">
-              <a:buNone/>
-            </a:pPr>
-            <a:r>
-              <a:rPr lang="ja-JP" altLang="en-US" sz="2200" b="1" dirty="0">
-                <a:solidFill>
-                  <a:srgbClr val="FF0000"/>
-                </a:solidFill>
-              </a:rPr>
-              <a:t>多次元的な環境の変化や新規の環境ストレスに対する反応規格の適応的意義はなぞ</a:t>
-            </a:r>
-            <a:endParaRPr lang="en-US" altLang="ja-JP" sz="2200" b="1" dirty="0">
-              <a:solidFill>
-                <a:srgbClr val="FF0000"/>
-              </a:solidFill>
-            </a:endParaRPr>
-          </a:p>
-        </p:txBody>
-      </p:sp>
-      <p:sp>
-        <p:nvSpPr>
-          <p:cNvPr id="28" name="コンテンツ プレースホルダー 2">
-            <a:extLst>
-              <a:ext uri="{FF2B5EF4-FFF2-40B4-BE49-F238E27FC236}">
-                <a16:creationId xmlns:a16="http://schemas.microsoft.com/office/drawing/2014/main" id="{1BCCC8AD-CA3E-4994-95B2-670F9C7968C0}"/>
-              </a:ext>
-            </a:extLst>
-          </p:cNvPr>
-          <p:cNvSpPr txBox="1">
-            <a:spLocks/>
-          </p:cNvSpPr>
-          <p:nvPr/>
-        </p:nvSpPr>
-        <p:spPr>
-          <a:xfrm>
-            <a:off x="473328" y="5503074"/>
-            <a:ext cx="7687682" cy="542922"/>
-          </a:xfrm>
-          <a:prstGeom prst="rect">
-            <a:avLst/>
-          </a:prstGeom>
-        </p:spPr>
-        <p:txBody>
-          <a:bodyPr vert="horz" lIns="91440" tIns="45720" rIns="91440" bIns="45720" rtlCol="0">
-            <a:normAutofit/>
-          </a:bodyPr>
-          <a:lstStyle>
-            <a:lvl1pPr marL="228600" indent="-228600" algn="l" defTabSz="914400" rtl="0" eaLnBrk="1" latinLnBrk="0" hangingPunct="1">
-              <a:lnSpc>
-                <a:spcPct val="90000"/>
-              </a:lnSpc>
-              <a:spcBef>
-                <a:spcPts val="1000"/>
-              </a:spcBef>
-              <a:buFont typeface="Arial" panose="020B0604020202020204" pitchFamily="34" charset="0"/>
-              <a:buChar char="•"/>
-              <a:defRPr kumimoji="1" sz="2800" kern="1200">
-                <a:solidFill>
-                  <a:schemeClr val="tx1"/>
-                </a:solidFill>
-                <a:latin typeface="+mn-lt"/>
-                <a:ea typeface="+mn-ea"/>
-                <a:cs typeface="+mn-cs"/>
-              </a:defRPr>
-            </a:lvl1pPr>
-            <a:lvl2pPr marL="685800" indent="-228600" algn="l" defTabSz="914400" rtl="0" eaLnBrk="1" latinLnBrk="0" hangingPunct="1">
-              <a:lnSpc>
-                <a:spcPct val="90000"/>
-              </a:lnSpc>
-              <a:spcBef>
-                <a:spcPts val="500"/>
-              </a:spcBef>
-              <a:buFont typeface="Arial" panose="020B0604020202020204" pitchFamily="34" charset="0"/>
-              <a:buChar char="•"/>
-              <a:defRPr kumimoji="1" sz="2400" kern="1200">
-                <a:solidFill>
-                  <a:schemeClr val="tx1"/>
-                </a:solidFill>
-                <a:latin typeface="+mn-lt"/>
-                <a:ea typeface="+mn-ea"/>
-                <a:cs typeface="+mn-cs"/>
-              </a:defRPr>
-            </a:lvl2pPr>
-            <a:lvl3pPr marL="1143000" indent="-228600" algn="l" defTabSz="914400" rtl="0" eaLnBrk="1" latinLnBrk="0" hangingPunct="1">
-              <a:lnSpc>
-                <a:spcPct val="90000"/>
-              </a:lnSpc>
-              <a:spcBef>
-                <a:spcPts val="500"/>
-              </a:spcBef>
-              <a:buFont typeface="Arial" panose="020B0604020202020204" pitchFamily="34" charset="0"/>
-              <a:buChar char="•"/>
-              <a:defRPr kumimoji="1" sz="2000" kern="1200">
-                <a:solidFill>
-                  <a:schemeClr val="tx1"/>
-                </a:solidFill>
-                <a:latin typeface="+mn-lt"/>
-                <a:ea typeface="+mn-ea"/>
-                <a:cs typeface="+mn-cs"/>
-              </a:defRPr>
-            </a:lvl3pPr>
-            <a:lvl4pPr marL="1600200" indent="-228600" algn="l" defTabSz="914400" rtl="0" eaLnBrk="1" latinLnBrk="0" hangingPunct="1">
-              <a:lnSpc>
-                <a:spcPct val="90000"/>
-              </a:lnSpc>
-              <a:spcBef>
-                <a:spcPts val="500"/>
-              </a:spcBef>
-              <a:buFont typeface="Arial" panose="020B0604020202020204" pitchFamily="34" charset="0"/>
-              <a:buChar char="•"/>
-              <a:defRPr kumimoji="1" sz="1800" kern="1200">
-                <a:solidFill>
-                  <a:schemeClr val="tx1"/>
-                </a:solidFill>
-                <a:latin typeface="+mn-lt"/>
-                <a:ea typeface="+mn-ea"/>
-                <a:cs typeface="+mn-cs"/>
-              </a:defRPr>
-            </a:lvl4pPr>
-            <a:lvl5pPr marL="2057400" indent="-228600" algn="l" defTabSz="914400" rtl="0" eaLnBrk="1" latinLnBrk="0" hangingPunct="1">
-              <a:lnSpc>
-                <a:spcPct val="90000"/>
-              </a:lnSpc>
-              <a:spcBef>
-                <a:spcPts val="500"/>
-              </a:spcBef>
-              <a:buFont typeface="Arial" panose="020B0604020202020204" pitchFamily="34" charset="0"/>
-              <a:buChar char="•"/>
-              <a:defRPr kumimoji="1" sz="1800" kern="1200">
-                <a:solidFill>
-                  <a:schemeClr val="tx1"/>
-                </a:solidFill>
-                <a:latin typeface="+mn-lt"/>
-                <a:ea typeface="+mn-ea"/>
-                <a:cs typeface="+mn-cs"/>
-              </a:defRPr>
-            </a:lvl5pPr>
-            <a:lvl6pPr marL="2514600" indent="-228600" algn="l" defTabSz="914400" rtl="0" eaLnBrk="1" latinLnBrk="0" hangingPunct="1">
-              <a:lnSpc>
-                <a:spcPct val="90000"/>
-              </a:lnSpc>
-              <a:spcBef>
-                <a:spcPts val="500"/>
-              </a:spcBef>
-              <a:buFont typeface="Arial" panose="020B0604020202020204" pitchFamily="34" charset="0"/>
-              <a:buChar char="•"/>
-              <a:defRPr kumimoji="1" sz="1800" kern="1200">
-                <a:solidFill>
-                  <a:schemeClr val="tx1"/>
-                </a:solidFill>
-                <a:latin typeface="+mn-lt"/>
-                <a:ea typeface="+mn-ea"/>
-                <a:cs typeface="+mn-cs"/>
-              </a:defRPr>
-            </a:lvl6pPr>
-            <a:lvl7pPr marL="2971800" indent="-228600" algn="l" defTabSz="914400" rtl="0" eaLnBrk="1" latinLnBrk="0" hangingPunct="1">
-              <a:lnSpc>
-                <a:spcPct val="90000"/>
-              </a:lnSpc>
-              <a:spcBef>
-                <a:spcPts val="500"/>
-              </a:spcBef>
-              <a:buFont typeface="Arial" panose="020B0604020202020204" pitchFamily="34" charset="0"/>
-              <a:buChar char="•"/>
-              <a:defRPr kumimoji="1" sz="1800" kern="1200">
-                <a:solidFill>
-                  <a:schemeClr val="tx1"/>
-                </a:solidFill>
-                <a:latin typeface="+mn-lt"/>
-                <a:ea typeface="+mn-ea"/>
-                <a:cs typeface="+mn-cs"/>
-              </a:defRPr>
-            </a:lvl7pPr>
-            <a:lvl8pPr marL="3429000" indent="-228600" algn="l" defTabSz="914400" rtl="0" eaLnBrk="1" latinLnBrk="0" hangingPunct="1">
-              <a:lnSpc>
-                <a:spcPct val="90000"/>
-              </a:lnSpc>
-              <a:spcBef>
-                <a:spcPts val="500"/>
-              </a:spcBef>
-              <a:buFont typeface="Arial" panose="020B0604020202020204" pitchFamily="34" charset="0"/>
-              <a:buChar char="•"/>
-              <a:defRPr kumimoji="1" sz="1800" kern="1200">
-                <a:solidFill>
-                  <a:schemeClr val="tx1"/>
-                </a:solidFill>
-                <a:latin typeface="+mn-lt"/>
-                <a:ea typeface="+mn-ea"/>
-                <a:cs typeface="+mn-cs"/>
-              </a:defRPr>
-            </a:lvl8pPr>
-            <a:lvl9pPr marL="3886200" indent="-228600" algn="l" defTabSz="914400" rtl="0" eaLnBrk="1" latinLnBrk="0" hangingPunct="1">
-              <a:lnSpc>
-                <a:spcPct val="90000"/>
-              </a:lnSpc>
-              <a:spcBef>
-                <a:spcPts val="500"/>
-              </a:spcBef>
-              <a:buFont typeface="Arial" panose="020B0604020202020204" pitchFamily="34" charset="0"/>
-              <a:buChar char="•"/>
-              <a:defRPr kumimoji="1" sz="1800" kern="1200">
-                <a:solidFill>
-                  <a:schemeClr val="tx1"/>
-                </a:solidFill>
-                <a:latin typeface="+mn-lt"/>
-                <a:ea typeface="+mn-ea"/>
-                <a:cs typeface="+mn-cs"/>
-              </a:defRPr>
-            </a:lvl9pPr>
-          </a:lstStyle>
-          <a:p>
-            <a:pPr marL="457200" indent="-457200">
-              <a:buFont typeface="+mj-lt"/>
-              <a:buAutoNum type="arabicPeriod" startAt="3"/>
-            </a:pPr>
-            <a:r>
-              <a:rPr lang="ja-JP" altLang="en-US" sz="2200" b="1" dirty="0">
-                <a:solidFill>
-                  <a:srgbClr val="0070C0"/>
-                </a:solidFill>
-              </a:rPr>
-              <a:t>非適応的な可塑性形質</a:t>
-            </a:r>
-            <a:endParaRPr lang="en-US" altLang="ja-JP" sz="2400" dirty="0">
-              <a:solidFill>
-                <a:srgbClr val="0070C0"/>
-              </a:solidFill>
-            </a:endParaRPr>
-          </a:p>
-          <a:p>
-            <a:pPr marL="457200" indent="-457200">
-              <a:buFont typeface="+mj-lt"/>
-              <a:buAutoNum type="arabicPeriod" startAt="3"/>
-            </a:pPr>
-            <a:endParaRPr lang="en-US" altLang="ja-JP" sz="2200" b="1" dirty="0">
-              <a:solidFill>
-                <a:srgbClr val="0070C0"/>
-              </a:solidFill>
-            </a:endParaRPr>
-          </a:p>
-        </p:txBody>
-      </p:sp>
     </p:spTree>
     <p:extLst>
       <p:ext uri="{BB962C8B-B14F-4D97-AF65-F5344CB8AC3E}">
@@ -11269,7 +11504,7 @@
                                           </p:stCondLst>
                                         </p:cTn>
                                         <p:tgtEl>
-                                          <p:spTgt spid="16"/>
+                                          <p:spTgt spid="27"/>
                                         </p:tgtEl>
                                         <p:attrNameLst>
                                           <p:attrName>style.visibility</p:attrName>
@@ -11282,33 +11517,15 @@
                                   </p:childTnLst>
                                 </p:cTn>
                               </p:par>
-                            </p:childTnLst>
-                          </p:cTn>
-                        </p:par>
-                      </p:childTnLst>
-                    </p:cTn>
-                  </p:par>
-                  <p:par>
-                    <p:cTn id="9" fill="hold">
-                      <p:stCondLst>
-                        <p:cond delay="indefinite"/>
-                      </p:stCondLst>
-                      <p:childTnLst>
-                        <p:par>
-                          <p:cTn id="10" fill="hold">
-                            <p:stCondLst>
-                              <p:cond delay="0"/>
-                            </p:stCondLst>
-                            <p:childTnLst>
                               <p:par>
-                                <p:cTn id="11" presetID="1" presetClass="entr" presetSubtype="0" fill="hold" grpId="0" nodeType="clickEffect">
+                                <p:cTn id="9" presetID="1" presetClass="entr" presetSubtype="0" fill="hold" grpId="0" nodeType="withEffect">
                                   <p:stCondLst>
                                     <p:cond delay="0"/>
                                   </p:stCondLst>
                                   <p:childTnLst>
                                     <p:set>
                                       <p:cBhvr>
-                                        <p:cTn id="12" dur="1" fill="hold">
+                                        <p:cTn id="10" dur="1" fill="hold">
                                           <p:stCondLst>
                                             <p:cond delay="0"/>
                                           </p:stCondLst>
@@ -11334,19 +11551,46 @@
                     </p:cTn>
                   </p:par>
                   <p:par>
-                    <p:cTn id="13" fill="hold">
+                    <p:cTn id="11" fill="hold">
                       <p:stCondLst>
                         <p:cond delay="indefinite"/>
                       </p:stCondLst>
                       <p:childTnLst>
                         <p:par>
-                          <p:cTn id="14" fill="hold">
+                          <p:cTn id="12" fill="hold">
                             <p:stCondLst>
                               <p:cond delay="0"/>
                             </p:stCondLst>
                             <p:childTnLst>
                               <p:par>
-                                <p:cTn id="15" presetID="1" presetClass="entr" presetSubtype="0" fill="hold" grpId="0" nodeType="clickEffect">
+                                <p:cTn id="13" presetID="1" presetClass="entr" presetSubtype="0" fill="hold" grpId="0" nodeType="clickEffect">
+                                  <p:stCondLst>
+                                    <p:cond delay="0"/>
+                                  </p:stCondLst>
+                                  <p:childTnLst>
+                                    <p:set>
+                                      <p:cBhvr>
+                                        <p:cTn id="14" dur="1" fill="hold">
+                                          <p:stCondLst>
+                                            <p:cond delay="0"/>
+                                          </p:stCondLst>
+                                        </p:cTn>
+                                        <p:tgtEl>
+                                          <p:spTgt spid="14"/>
+                                        </p:tgtEl>
+                                        <p:attrNameLst>
+                                          <p:attrName>style.visibility</p:attrName>
+                                        </p:attrNameLst>
+                                      </p:cBhvr>
+                                      <p:to>
+                                        <p:strVal val="visible"/>
+                                      </p:to>
+                                    </p:set>
+                                  </p:childTnLst>
+                                </p:cTn>
+                              </p:par>
+                              <p:par>
+                                <p:cTn id="15" presetID="1" presetClass="entr" presetSubtype="0" fill="hold" grpId="0" nodeType="withEffect">
                                   <p:stCondLst>
                                     <p:cond delay="0"/>
                                   </p:stCondLst>
@@ -11359,7 +11603,7 @@
                                           </p:stCondLst>
                                         </p:cTn>
                                         <p:tgtEl>
-                                          <p:spTgt spid="14"/>
+                                          <p:spTgt spid="15"/>
                                         </p:tgtEl>
                                         <p:attrNameLst>
                                           <p:attrName>style.visibility</p:attrName>
@@ -11386,7 +11630,7 @@
                                           </p:stCondLst>
                                         </p:cTn>
                                         <p:tgtEl>
-                                          <p:spTgt spid="15"/>
+                                          <p:spTgt spid="17"/>
                                         </p:tgtEl>
                                         <p:attrNameLst>
                                           <p:attrName>style.visibility</p:attrName>
@@ -11413,7 +11657,7 @@
                                           </p:stCondLst>
                                         </p:cTn>
                                         <p:tgtEl>
-                                          <p:spTgt spid="17"/>
+                                          <p:spTgt spid="18"/>
                                         </p:tgtEl>
                                         <p:attrNameLst>
                                           <p:attrName>style.visibility</p:attrName>
@@ -11440,33 +11684,6 @@
                                           </p:stCondLst>
                                         </p:cTn>
                                         <p:tgtEl>
-                                          <p:spTgt spid="18"/>
-                                        </p:tgtEl>
-                                        <p:attrNameLst>
-                                          <p:attrName>style.visibility</p:attrName>
-                                        </p:attrNameLst>
-                                      </p:cBhvr>
-                                      <p:to>
-                                        <p:strVal val="visible"/>
-                                      </p:to>
-                                    </p:set>
-                                  </p:childTnLst>
-                                </p:cTn>
-                              </p:par>
-                              <p:par>
-                                <p:cTn id="23" presetID="1" presetClass="entr" presetSubtype="0" fill="hold" grpId="0" nodeType="withEffect">
-                                  <p:stCondLst>
-                                    <p:cond delay="0"/>
-                                  </p:stCondLst>
-                                  <p:childTnLst>
-                                    <p:set>
-                                      <p:cBhvr>
-                                        <p:cTn id="24" dur="1" fill="hold">
-                                          <p:stCondLst>
-                                            <p:cond delay="0"/>
-                                          </p:stCondLst>
-                                        </p:cTn>
-                                        <p:tgtEl>
                                           <p:spTgt spid="28"/>
                                         </p:tgtEl>
                                         <p:attrNameLst>
@@ -11487,19 +11704,46 @@
                     </p:cTn>
                   </p:par>
                   <p:par>
-                    <p:cTn id="25" fill="hold">
+                    <p:cTn id="23" fill="hold">
                       <p:stCondLst>
                         <p:cond delay="indefinite"/>
                       </p:stCondLst>
                       <p:childTnLst>
                         <p:par>
-                          <p:cTn id="26" fill="hold">
+                          <p:cTn id="24" fill="hold">
                             <p:stCondLst>
                               <p:cond delay="0"/>
                             </p:stCondLst>
                             <p:childTnLst>
                               <p:par>
-                                <p:cTn id="27" presetID="1" presetClass="entr" presetSubtype="0" fill="hold" grpId="0" nodeType="clickEffect">
+                                <p:cTn id="25" presetID="1" presetClass="entr" presetSubtype="0" fill="hold" grpId="0" nodeType="clickEffect">
+                                  <p:stCondLst>
+                                    <p:cond delay="0"/>
+                                  </p:stCondLst>
+                                  <p:childTnLst>
+                                    <p:set>
+                                      <p:cBhvr>
+                                        <p:cTn id="26" dur="1" fill="hold">
+                                          <p:stCondLst>
+                                            <p:cond delay="0"/>
+                                          </p:stCondLst>
+                                        </p:cTn>
+                                        <p:tgtEl>
+                                          <p:spTgt spid="19"/>
+                                        </p:tgtEl>
+                                        <p:attrNameLst>
+                                          <p:attrName>style.visibility</p:attrName>
+                                        </p:attrNameLst>
+                                      </p:cBhvr>
+                                      <p:to>
+                                        <p:strVal val="visible"/>
+                                      </p:to>
+                                    </p:set>
+                                  </p:childTnLst>
+                                </p:cTn>
+                              </p:par>
+                              <p:par>
+                                <p:cTn id="27" presetID="1" presetClass="entr" presetSubtype="0" fill="hold" grpId="0" nodeType="withEffect">
                                   <p:stCondLst>
                                     <p:cond delay="0"/>
                                   </p:stCondLst>
@@ -11512,7 +11756,7 @@
                                           </p:stCondLst>
                                         </p:cTn>
                                         <p:tgtEl>
-                                          <p:spTgt spid="19"/>
+                                          <p:spTgt spid="22"/>
                                         </p:tgtEl>
                                         <p:attrNameLst>
                                           <p:attrName>style.visibility</p:attrName>
@@ -11539,7 +11783,7 @@
                                           </p:stCondLst>
                                         </p:cTn>
                                         <p:tgtEl>
-                                          <p:spTgt spid="22"/>
+                                          <p:spTgt spid="21"/>
                                         </p:tgtEl>
                                         <p:attrNameLst>
                                           <p:attrName>style.visibility</p:attrName>
@@ -11566,7 +11810,7 @@
                                           </p:stCondLst>
                                         </p:cTn>
                                         <p:tgtEl>
-                                          <p:spTgt spid="21"/>
+                                          <p:spTgt spid="24"/>
                                         </p:tgtEl>
                                         <p:attrNameLst>
                                           <p:attrName>style.visibility</p:attrName>
@@ -11593,7 +11837,7 @@
                                           </p:stCondLst>
                                         </p:cTn>
                                         <p:tgtEl>
-                                          <p:spTgt spid="24"/>
+                                          <p:spTgt spid="26"/>
                                         </p:tgtEl>
                                         <p:attrNameLst>
                                           <p:attrName>style.visibility</p:attrName>
@@ -11615,33 +11859,6 @@
                                     <p:set>
                                       <p:cBhvr>
                                         <p:cTn id="36" dur="1" fill="hold">
-                                          <p:stCondLst>
-                                            <p:cond delay="0"/>
-                                          </p:stCondLst>
-                                        </p:cTn>
-                                        <p:tgtEl>
-                                          <p:spTgt spid="26"/>
-                                        </p:tgtEl>
-                                        <p:attrNameLst>
-                                          <p:attrName>style.visibility</p:attrName>
-                                        </p:attrNameLst>
-                                      </p:cBhvr>
-                                      <p:to>
-                                        <p:strVal val="visible"/>
-                                      </p:to>
-                                    </p:set>
-                                  </p:childTnLst>
-                                </p:cTn>
-                              </p:par>
-                              <p:par>
-                                <p:cTn id="37" presetID="1" presetClass="entr" presetSubtype="0" fill="hold" grpId="0" nodeType="withEffect">
-                                  <p:stCondLst>
-                                    <p:cond delay="0"/>
-                                  </p:stCondLst>
-                                  <p:childTnLst>
-                                    <p:set>
-                                      <p:cBhvr>
-                                        <p:cTn id="38" dur="1" fill="hold">
                                           <p:stCondLst>
                                             <p:cond delay="0"/>
                                           </p:stCondLst>
@@ -21907,8 +22124,8 @@
         </p:nvSpPr>
         <p:spPr>
           <a:xfrm>
-            <a:off x="204747" y="1581141"/>
-            <a:ext cx="4113946" cy="1495153"/>
+            <a:off x="103777" y="1561215"/>
+            <a:ext cx="4344503" cy="1622002"/>
           </a:xfrm>
           <a:prstGeom prst="rect">
             <a:avLst/>
@@ -21916,7 +22133,7 @@
         </p:spPr>
         <p:txBody>
           <a:bodyPr vert="horz" lIns="91440" tIns="45720" rIns="91440" bIns="45720" rtlCol="0">
-            <a:normAutofit fontScale="92500" lnSpcReduction="10000"/>
+            <a:normAutofit fontScale="92500"/>
           </a:bodyPr>
           <a:lstStyle>
             <a:lvl1pPr marL="228600" indent="-228600" algn="l" defTabSz="914400" rtl="0" eaLnBrk="1" latinLnBrk="0" hangingPunct="1">
@@ -22153,7 +22370,7 @@
                   <a:srgbClr val="C00000"/>
                 </a:solidFill>
               </a:rPr>
-              <a:t>遺伝的多様性による進化の促進</a:t>
+              <a:t>遺伝的多様性による進化応答の促進</a:t>
             </a:r>
             <a:r>
               <a:rPr lang="en-US" altLang="ja-JP" sz="2000" dirty="0">

</xml_diff>